<commit_message>
feat: Provide end-to-end scenario with deployment (#1)
</commit_message>
<xml_diff>
--- a/media/schematics.pptx
+++ b/media/schematics.pptx
@@ -6,6 +6,7 @@
   </p:sldMasterIdLst>
   <p:sldIdLst>
     <p:sldId id="256" r:id="rId2"/>
+    <p:sldId id="258" r:id="rId3"/>
   </p:sldIdLst>
   <p:sldSz cx="12192000" cy="6858000"/>
   <p:notesSz cx="6858000" cy="9144000"/>
@@ -104,7 +105,4362 @@
       </a:defRPr>
     </a:lvl9pPr>
   </p:defaultTextStyle>
+  <p:extLst>
+    <p:ext uri="{EFAFB233-063F-42B5-8137-9DF3F51BA10A}">
+      <p15:sldGuideLst xmlns:p15="http://schemas.microsoft.com/office/powerpoint/2012/main"/>
+    </p:ext>
+  </p:extLst>
 </p:presentation>
+</file>
+
+<file path=ppt/diagrams/colors1.xml><?xml version="1.0" encoding="utf-8"?>
+<dgm:colorsDef xmlns:dgm="http://schemas.openxmlformats.org/drawingml/2006/diagram" xmlns:a="http://schemas.openxmlformats.org/drawingml/2006/main" uniqueId="urn:microsoft.com/office/officeart/2005/8/colors/accent1_2">
+  <dgm:title val=""/>
+  <dgm:desc val=""/>
+  <dgm:catLst>
+    <dgm:cat type="accent1" pri="11200"/>
+  </dgm:catLst>
+  <dgm:styleLbl name="node0">
+    <dgm:fillClrLst meth="repeat">
+      <a:schemeClr val="accent1"/>
+    </dgm:fillClrLst>
+    <dgm:linClrLst meth="repeat">
+      <a:schemeClr val="lt1"/>
+    </dgm:linClrLst>
+    <dgm:effectClrLst/>
+    <dgm:txLinClrLst/>
+    <dgm:txFillClrLst/>
+    <dgm:txEffectClrLst/>
+  </dgm:styleLbl>
+  <dgm:styleLbl name="alignNode1">
+    <dgm:fillClrLst meth="repeat">
+      <a:schemeClr val="accent1"/>
+    </dgm:fillClrLst>
+    <dgm:linClrLst meth="repeat">
+      <a:schemeClr val="accent1"/>
+    </dgm:linClrLst>
+    <dgm:effectClrLst/>
+    <dgm:txLinClrLst/>
+    <dgm:txFillClrLst/>
+    <dgm:txEffectClrLst/>
+  </dgm:styleLbl>
+  <dgm:styleLbl name="node1">
+    <dgm:fillClrLst meth="repeat">
+      <a:schemeClr val="accent1"/>
+    </dgm:fillClrLst>
+    <dgm:linClrLst meth="repeat">
+      <a:schemeClr val="lt1"/>
+    </dgm:linClrLst>
+    <dgm:effectClrLst/>
+    <dgm:txLinClrLst/>
+    <dgm:txFillClrLst/>
+    <dgm:txEffectClrLst/>
+  </dgm:styleLbl>
+  <dgm:styleLbl name="lnNode1">
+    <dgm:fillClrLst meth="repeat">
+      <a:schemeClr val="accent1"/>
+    </dgm:fillClrLst>
+    <dgm:linClrLst meth="repeat">
+      <a:schemeClr val="lt1"/>
+    </dgm:linClrLst>
+    <dgm:effectClrLst/>
+    <dgm:txLinClrLst/>
+    <dgm:txFillClrLst/>
+    <dgm:txEffectClrLst/>
+  </dgm:styleLbl>
+  <dgm:styleLbl name="vennNode1">
+    <dgm:fillClrLst meth="repeat">
+      <a:schemeClr val="accent1">
+        <a:alpha val="50000"/>
+      </a:schemeClr>
+    </dgm:fillClrLst>
+    <dgm:linClrLst meth="repeat">
+      <a:schemeClr val="lt1"/>
+    </dgm:linClrLst>
+    <dgm:effectClrLst/>
+    <dgm:txLinClrLst/>
+    <dgm:txFillClrLst/>
+    <dgm:txEffectClrLst/>
+  </dgm:styleLbl>
+  <dgm:styleLbl name="node2">
+    <dgm:fillClrLst meth="repeat">
+      <a:schemeClr val="accent1"/>
+    </dgm:fillClrLst>
+    <dgm:linClrLst meth="repeat">
+      <a:schemeClr val="lt1"/>
+    </dgm:linClrLst>
+    <dgm:effectClrLst/>
+    <dgm:txLinClrLst/>
+    <dgm:txFillClrLst/>
+    <dgm:txEffectClrLst/>
+  </dgm:styleLbl>
+  <dgm:styleLbl name="node3">
+    <dgm:fillClrLst meth="repeat">
+      <a:schemeClr val="accent1"/>
+    </dgm:fillClrLst>
+    <dgm:linClrLst meth="repeat">
+      <a:schemeClr val="lt1"/>
+    </dgm:linClrLst>
+    <dgm:effectClrLst/>
+    <dgm:txLinClrLst/>
+    <dgm:txFillClrLst/>
+    <dgm:txEffectClrLst/>
+  </dgm:styleLbl>
+  <dgm:styleLbl name="node4">
+    <dgm:fillClrLst meth="repeat">
+      <a:schemeClr val="accent1"/>
+    </dgm:fillClrLst>
+    <dgm:linClrLst meth="repeat">
+      <a:schemeClr val="lt1"/>
+    </dgm:linClrLst>
+    <dgm:effectClrLst/>
+    <dgm:txLinClrLst/>
+    <dgm:txFillClrLst/>
+    <dgm:txEffectClrLst/>
+  </dgm:styleLbl>
+  <dgm:styleLbl name="fgImgPlace1">
+    <dgm:fillClrLst meth="repeat">
+      <a:schemeClr val="accent1">
+        <a:tint val="50000"/>
+      </a:schemeClr>
+    </dgm:fillClrLst>
+    <dgm:linClrLst meth="repeat">
+      <a:schemeClr val="lt1"/>
+    </dgm:linClrLst>
+    <dgm:effectClrLst/>
+    <dgm:txLinClrLst/>
+    <dgm:txFillClrLst meth="repeat">
+      <a:schemeClr val="lt1"/>
+    </dgm:txFillClrLst>
+    <dgm:txEffectClrLst/>
+  </dgm:styleLbl>
+  <dgm:styleLbl name="alignImgPlace1">
+    <dgm:fillClrLst meth="repeat">
+      <a:schemeClr val="accent1">
+        <a:tint val="50000"/>
+      </a:schemeClr>
+    </dgm:fillClrLst>
+    <dgm:linClrLst meth="repeat">
+      <a:schemeClr val="lt1"/>
+    </dgm:linClrLst>
+    <dgm:effectClrLst/>
+    <dgm:txLinClrLst/>
+    <dgm:txFillClrLst meth="repeat">
+      <a:schemeClr val="lt1"/>
+    </dgm:txFillClrLst>
+    <dgm:txEffectClrLst/>
+  </dgm:styleLbl>
+  <dgm:styleLbl name="bgImgPlace1">
+    <dgm:fillClrLst meth="repeat">
+      <a:schemeClr val="accent1">
+        <a:tint val="50000"/>
+      </a:schemeClr>
+    </dgm:fillClrLst>
+    <dgm:linClrLst meth="repeat">
+      <a:schemeClr val="lt1"/>
+    </dgm:linClrLst>
+    <dgm:effectClrLst/>
+    <dgm:txLinClrLst/>
+    <dgm:txFillClrLst meth="repeat">
+      <a:schemeClr val="lt1"/>
+    </dgm:txFillClrLst>
+    <dgm:txEffectClrLst/>
+  </dgm:styleLbl>
+  <dgm:styleLbl name="sibTrans2D1">
+    <dgm:fillClrLst meth="repeat">
+      <a:schemeClr val="accent1">
+        <a:tint val="60000"/>
+      </a:schemeClr>
+    </dgm:fillClrLst>
+    <dgm:linClrLst meth="repeat">
+      <a:schemeClr val="accent1">
+        <a:tint val="60000"/>
+      </a:schemeClr>
+    </dgm:linClrLst>
+    <dgm:effectClrLst/>
+    <dgm:txLinClrLst/>
+    <dgm:txFillClrLst/>
+    <dgm:txEffectClrLst/>
+  </dgm:styleLbl>
+  <dgm:styleLbl name="fgSibTrans2D1">
+    <dgm:fillClrLst meth="repeat">
+      <a:schemeClr val="accent1">
+        <a:tint val="60000"/>
+      </a:schemeClr>
+    </dgm:fillClrLst>
+    <dgm:linClrLst meth="repeat">
+      <a:schemeClr val="accent1">
+        <a:tint val="60000"/>
+      </a:schemeClr>
+    </dgm:linClrLst>
+    <dgm:effectClrLst/>
+    <dgm:txLinClrLst/>
+    <dgm:txFillClrLst/>
+    <dgm:txEffectClrLst/>
+  </dgm:styleLbl>
+  <dgm:styleLbl name="bgSibTrans2D1">
+    <dgm:fillClrLst meth="repeat">
+      <a:schemeClr val="accent1">
+        <a:tint val="60000"/>
+      </a:schemeClr>
+    </dgm:fillClrLst>
+    <dgm:linClrLst meth="repeat">
+      <a:schemeClr val="accent1">
+        <a:tint val="60000"/>
+      </a:schemeClr>
+    </dgm:linClrLst>
+    <dgm:effectClrLst/>
+    <dgm:txLinClrLst/>
+    <dgm:txFillClrLst/>
+    <dgm:txEffectClrLst/>
+  </dgm:styleLbl>
+  <dgm:styleLbl name="sibTrans1D1">
+    <dgm:fillClrLst meth="repeat">
+      <a:schemeClr val="accent1"/>
+    </dgm:fillClrLst>
+    <dgm:linClrLst meth="repeat">
+      <a:schemeClr val="accent1"/>
+    </dgm:linClrLst>
+    <dgm:effectClrLst/>
+    <dgm:txLinClrLst/>
+    <dgm:txFillClrLst meth="repeat">
+      <a:schemeClr val="tx1"/>
+    </dgm:txFillClrLst>
+    <dgm:txEffectClrLst/>
+  </dgm:styleLbl>
+  <dgm:styleLbl name="callout">
+    <dgm:fillClrLst meth="repeat">
+      <a:schemeClr val="accent1"/>
+    </dgm:fillClrLst>
+    <dgm:linClrLst meth="repeat">
+      <a:schemeClr val="accent1">
+        <a:tint val="50000"/>
+      </a:schemeClr>
+    </dgm:linClrLst>
+    <dgm:effectClrLst/>
+    <dgm:txLinClrLst/>
+    <dgm:txFillClrLst meth="repeat">
+      <a:schemeClr val="tx1"/>
+    </dgm:txFillClrLst>
+    <dgm:txEffectClrLst/>
+  </dgm:styleLbl>
+  <dgm:styleLbl name="asst0">
+    <dgm:fillClrLst meth="repeat">
+      <a:schemeClr val="accent1"/>
+    </dgm:fillClrLst>
+    <dgm:linClrLst meth="repeat">
+      <a:schemeClr val="lt1"/>
+    </dgm:linClrLst>
+    <dgm:effectClrLst/>
+    <dgm:txLinClrLst/>
+    <dgm:txFillClrLst/>
+    <dgm:txEffectClrLst/>
+  </dgm:styleLbl>
+  <dgm:styleLbl name="asst1">
+    <dgm:fillClrLst meth="repeat">
+      <a:schemeClr val="accent1"/>
+    </dgm:fillClrLst>
+    <dgm:linClrLst meth="repeat">
+      <a:schemeClr val="lt1"/>
+    </dgm:linClrLst>
+    <dgm:effectClrLst/>
+    <dgm:txLinClrLst/>
+    <dgm:txFillClrLst/>
+    <dgm:txEffectClrLst/>
+  </dgm:styleLbl>
+  <dgm:styleLbl name="asst2">
+    <dgm:fillClrLst meth="repeat">
+      <a:schemeClr val="accent1"/>
+    </dgm:fillClrLst>
+    <dgm:linClrLst meth="repeat">
+      <a:schemeClr val="lt1"/>
+    </dgm:linClrLst>
+    <dgm:effectClrLst/>
+    <dgm:txLinClrLst/>
+    <dgm:txFillClrLst/>
+    <dgm:txEffectClrLst/>
+  </dgm:styleLbl>
+  <dgm:styleLbl name="asst3">
+    <dgm:fillClrLst meth="repeat">
+      <a:schemeClr val="accent1"/>
+    </dgm:fillClrLst>
+    <dgm:linClrLst meth="repeat">
+      <a:schemeClr val="lt1"/>
+    </dgm:linClrLst>
+    <dgm:effectClrLst/>
+    <dgm:txLinClrLst/>
+    <dgm:txFillClrLst/>
+    <dgm:txEffectClrLst/>
+  </dgm:styleLbl>
+  <dgm:styleLbl name="asst4">
+    <dgm:fillClrLst meth="repeat">
+      <a:schemeClr val="accent1"/>
+    </dgm:fillClrLst>
+    <dgm:linClrLst meth="repeat">
+      <a:schemeClr val="lt1"/>
+    </dgm:linClrLst>
+    <dgm:effectClrLst/>
+    <dgm:txLinClrLst/>
+    <dgm:txFillClrLst/>
+    <dgm:txEffectClrLst/>
+  </dgm:styleLbl>
+  <dgm:styleLbl name="parChTrans2D1">
+    <dgm:fillClrLst meth="repeat">
+      <a:schemeClr val="accent1">
+        <a:tint val="60000"/>
+      </a:schemeClr>
+    </dgm:fillClrLst>
+    <dgm:linClrLst meth="repeat">
+      <a:schemeClr val="accent1">
+        <a:tint val="60000"/>
+      </a:schemeClr>
+    </dgm:linClrLst>
+    <dgm:effectClrLst/>
+    <dgm:txLinClrLst/>
+    <dgm:txFillClrLst meth="repeat">
+      <a:schemeClr val="lt1"/>
+    </dgm:txFillClrLst>
+    <dgm:txEffectClrLst/>
+  </dgm:styleLbl>
+  <dgm:styleLbl name="parChTrans2D2">
+    <dgm:fillClrLst meth="repeat">
+      <a:schemeClr val="accent1"/>
+    </dgm:fillClrLst>
+    <dgm:linClrLst meth="repeat">
+      <a:schemeClr val="accent1"/>
+    </dgm:linClrLst>
+    <dgm:effectClrLst/>
+    <dgm:txLinClrLst/>
+    <dgm:txFillClrLst meth="repeat">
+      <a:schemeClr val="lt1"/>
+    </dgm:txFillClrLst>
+    <dgm:txEffectClrLst/>
+  </dgm:styleLbl>
+  <dgm:styleLbl name="parChTrans2D3">
+    <dgm:fillClrLst meth="repeat">
+      <a:schemeClr val="accent1"/>
+    </dgm:fillClrLst>
+    <dgm:linClrLst meth="repeat">
+      <a:schemeClr val="accent1"/>
+    </dgm:linClrLst>
+    <dgm:effectClrLst/>
+    <dgm:txLinClrLst/>
+    <dgm:txFillClrLst meth="repeat">
+      <a:schemeClr val="lt1"/>
+    </dgm:txFillClrLst>
+    <dgm:txEffectClrLst/>
+  </dgm:styleLbl>
+  <dgm:styleLbl name="parChTrans2D4">
+    <dgm:fillClrLst meth="repeat">
+      <a:schemeClr val="accent1"/>
+    </dgm:fillClrLst>
+    <dgm:linClrLst meth="repeat">
+      <a:schemeClr val="accent1"/>
+    </dgm:linClrLst>
+    <dgm:effectClrLst/>
+    <dgm:txLinClrLst/>
+    <dgm:txFillClrLst meth="repeat">
+      <a:schemeClr val="lt1"/>
+    </dgm:txFillClrLst>
+    <dgm:txEffectClrLst/>
+  </dgm:styleLbl>
+  <dgm:styleLbl name="parChTrans1D1">
+    <dgm:fillClrLst meth="repeat">
+      <a:schemeClr val="accent1"/>
+    </dgm:fillClrLst>
+    <dgm:linClrLst meth="repeat">
+      <a:schemeClr val="accent1">
+        <a:shade val="60000"/>
+      </a:schemeClr>
+    </dgm:linClrLst>
+    <dgm:effectClrLst/>
+    <dgm:txLinClrLst/>
+    <dgm:txFillClrLst meth="repeat">
+      <a:schemeClr val="tx1"/>
+    </dgm:txFillClrLst>
+    <dgm:txEffectClrLst/>
+  </dgm:styleLbl>
+  <dgm:styleLbl name="parChTrans1D2">
+    <dgm:fillClrLst meth="repeat">
+      <a:schemeClr val="accent1"/>
+    </dgm:fillClrLst>
+    <dgm:linClrLst meth="repeat">
+      <a:schemeClr val="accent1">
+        <a:shade val="60000"/>
+      </a:schemeClr>
+    </dgm:linClrLst>
+    <dgm:effectClrLst/>
+    <dgm:txLinClrLst/>
+    <dgm:txFillClrLst meth="repeat">
+      <a:schemeClr val="tx1"/>
+    </dgm:txFillClrLst>
+    <dgm:txEffectClrLst/>
+  </dgm:styleLbl>
+  <dgm:styleLbl name="parChTrans1D3">
+    <dgm:fillClrLst meth="repeat">
+      <a:schemeClr val="accent1"/>
+    </dgm:fillClrLst>
+    <dgm:linClrLst meth="repeat">
+      <a:schemeClr val="accent1">
+        <a:shade val="80000"/>
+      </a:schemeClr>
+    </dgm:linClrLst>
+    <dgm:effectClrLst/>
+    <dgm:txLinClrLst/>
+    <dgm:txFillClrLst meth="repeat">
+      <a:schemeClr val="tx1"/>
+    </dgm:txFillClrLst>
+    <dgm:txEffectClrLst/>
+  </dgm:styleLbl>
+  <dgm:styleLbl name="parChTrans1D4">
+    <dgm:fillClrLst meth="repeat">
+      <a:schemeClr val="accent1"/>
+    </dgm:fillClrLst>
+    <dgm:linClrLst meth="repeat">
+      <a:schemeClr val="accent1">
+        <a:shade val="80000"/>
+      </a:schemeClr>
+    </dgm:linClrLst>
+    <dgm:effectClrLst/>
+    <dgm:txLinClrLst/>
+    <dgm:txFillClrLst meth="repeat">
+      <a:schemeClr val="tx1"/>
+    </dgm:txFillClrLst>
+    <dgm:txEffectClrLst/>
+  </dgm:styleLbl>
+  <dgm:styleLbl name="fgAcc1">
+    <dgm:fillClrLst meth="repeat">
+      <a:schemeClr val="lt1">
+        <a:alpha val="90000"/>
+      </a:schemeClr>
+    </dgm:fillClrLst>
+    <dgm:linClrLst meth="repeat">
+      <a:schemeClr val="accent1"/>
+    </dgm:linClrLst>
+    <dgm:effectClrLst/>
+    <dgm:txLinClrLst/>
+    <dgm:txFillClrLst meth="repeat">
+      <a:schemeClr val="dk1"/>
+    </dgm:txFillClrLst>
+    <dgm:txEffectClrLst/>
+  </dgm:styleLbl>
+  <dgm:styleLbl name="conFgAcc1">
+    <dgm:fillClrLst meth="repeat">
+      <a:schemeClr val="lt1">
+        <a:alpha val="90000"/>
+      </a:schemeClr>
+    </dgm:fillClrLst>
+    <dgm:linClrLst meth="repeat">
+      <a:schemeClr val="accent1"/>
+    </dgm:linClrLst>
+    <dgm:effectClrLst/>
+    <dgm:txLinClrLst/>
+    <dgm:txFillClrLst meth="repeat">
+      <a:schemeClr val="dk1"/>
+    </dgm:txFillClrLst>
+    <dgm:txEffectClrLst/>
+  </dgm:styleLbl>
+  <dgm:styleLbl name="alignAcc1">
+    <dgm:fillClrLst meth="repeat">
+      <a:schemeClr val="lt1">
+        <a:alpha val="90000"/>
+      </a:schemeClr>
+    </dgm:fillClrLst>
+    <dgm:linClrLst meth="repeat">
+      <a:schemeClr val="accent1"/>
+    </dgm:linClrLst>
+    <dgm:effectClrLst/>
+    <dgm:txLinClrLst/>
+    <dgm:txFillClrLst meth="repeat">
+      <a:schemeClr val="dk1"/>
+    </dgm:txFillClrLst>
+    <dgm:txEffectClrLst/>
+  </dgm:styleLbl>
+  <dgm:styleLbl name="trAlignAcc1">
+    <dgm:fillClrLst meth="repeat">
+      <a:schemeClr val="lt1">
+        <a:alpha val="40000"/>
+      </a:schemeClr>
+    </dgm:fillClrLst>
+    <dgm:linClrLst meth="repeat">
+      <a:schemeClr val="accent1"/>
+    </dgm:linClrLst>
+    <dgm:effectClrLst/>
+    <dgm:txLinClrLst/>
+    <dgm:txFillClrLst meth="repeat">
+      <a:schemeClr val="dk1"/>
+    </dgm:txFillClrLst>
+    <dgm:txEffectClrLst/>
+  </dgm:styleLbl>
+  <dgm:styleLbl name="bgAcc1">
+    <dgm:fillClrLst meth="repeat">
+      <a:schemeClr val="lt1">
+        <a:alpha val="90000"/>
+      </a:schemeClr>
+    </dgm:fillClrLst>
+    <dgm:linClrLst meth="repeat">
+      <a:schemeClr val="accent1"/>
+    </dgm:linClrLst>
+    <dgm:effectClrLst/>
+    <dgm:txLinClrLst/>
+    <dgm:txFillClrLst meth="repeat">
+      <a:schemeClr val="dk1"/>
+    </dgm:txFillClrLst>
+    <dgm:txEffectClrLst/>
+  </dgm:styleLbl>
+  <dgm:styleLbl name="solidFgAcc1">
+    <dgm:fillClrLst meth="repeat">
+      <a:schemeClr val="lt1"/>
+    </dgm:fillClrLst>
+    <dgm:linClrLst meth="repeat">
+      <a:schemeClr val="accent1"/>
+    </dgm:linClrLst>
+    <dgm:effectClrLst/>
+    <dgm:txLinClrLst/>
+    <dgm:txFillClrLst meth="repeat">
+      <a:schemeClr val="dk1"/>
+    </dgm:txFillClrLst>
+    <dgm:txEffectClrLst/>
+  </dgm:styleLbl>
+  <dgm:styleLbl name="solidAlignAcc1">
+    <dgm:fillClrLst meth="repeat">
+      <a:schemeClr val="lt1"/>
+    </dgm:fillClrLst>
+    <dgm:linClrLst meth="repeat">
+      <a:schemeClr val="accent1"/>
+    </dgm:linClrLst>
+    <dgm:effectClrLst/>
+    <dgm:txLinClrLst/>
+    <dgm:txFillClrLst meth="repeat">
+      <a:schemeClr val="dk1"/>
+    </dgm:txFillClrLst>
+    <dgm:txEffectClrLst/>
+  </dgm:styleLbl>
+  <dgm:styleLbl name="solidBgAcc1">
+    <dgm:fillClrLst meth="repeat">
+      <a:schemeClr val="lt1"/>
+    </dgm:fillClrLst>
+    <dgm:linClrLst meth="repeat">
+      <a:schemeClr val="accent1"/>
+    </dgm:linClrLst>
+    <dgm:effectClrLst/>
+    <dgm:txLinClrLst/>
+    <dgm:txFillClrLst meth="repeat">
+      <a:schemeClr val="dk1"/>
+    </dgm:txFillClrLst>
+    <dgm:txEffectClrLst/>
+  </dgm:styleLbl>
+  <dgm:styleLbl name="fgAccFollowNode1">
+    <dgm:fillClrLst meth="repeat">
+      <a:schemeClr val="accent1">
+        <a:alpha val="90000"/>
+        <a:tint val="40000"/>
+      </a:schemeClr>
+    </dgm:fillClrLst>
+    <dgm:linClrLst meth="repeat">
+      <a:schemeClr val="accent1">
+        <a:alpha val="90000"/>
+        <a:tint val="40000"/>
+      </a:schemeClr>
+    </dgm:linClrLst>
+    <dgm:effectClrLst/>
+    <dgm:txLinClrLst/>
+    <dgm:txFillClrLst meth="repeat">
+      <a:schemeClr val="dk1"/>
+    </dgm:txFillClrLst>
+    <dgm:txEffectClrLst/>
+  </dgm:styleLbl>
+  <dgm:styleLbl name="alignAccFollowNode1">
+    <dgm:fillClrLst meth="repeat">
+      <a:schemeClr val="accent1">
+        <a:alpha val="90000"/>
+        <a:tint val="40000"/>
+      </a:schemeClr>
+    </dgm:fillClrLst>
+    <dgm:linClrLst meth="repeat">
+      <a:schemeClr val="accent1">
+        <a:alpha val="90000"/>
+        <a:tint val="40000"/>
+      </a:schemeClr>
+    </dgm:linClrLst>
+    <dgm:effectClrLst/>
+    <dgm:txLinClrLst/>
+    <dgm:txFillClrLst meth="repeat">
+      <a:schemeClr val="dk1"/>
+    </dgm:txFillClrLst>
+    <dgm:txEffectClrLst/>
+  </dgm:styleLbl>
+  <dgm:styleLbl name="bgAccFollowNode1">
+    <dgm:fillClrLst meth="repeat">
+      <a:schemeClr val="accent1">
+        <a:alpha val="90000"/>
+        <a:tint val="40000"/>
+      </a:schemeClr>
+    </dgm:fillClrLst>
+    <dgm:linClrLst meth="repeat">
+      <a:schemeClr val="accent1">
+        <a:alpha val="90000"/>
+        <a:tint val="40000"/>
+      </a:schemeClr>
+    </dgm:linClrLst>
+    <dgm:effectClrLst/>
+    <dgm:txLinClrLst/>
+    <dgm:txFillClrLst meth="repeat">
+      <a:schemeClr val="dk1"/>
+    </dgm:txFillClrLst>
+    <dgm:txEffectClrLst/>
+  </dgm:styleLbl>
+  <dgm:styleLbl name="fgAcc0">
+    <dgm:fillClrLst meth="repeat">
+      <a:schemeClr val="lt1">
+        <a:alpha val="90000"/>
+      </a:schemeClr>
+    </dgm:fillClrLst>
+    <dgm:linClrLst meth="repeat">
+      <a:schemeClr val="accent1"/>
+    </dgm:linClrLst>
+    <dgm:effectClrLst/>
+    <dgm:txLinClrLst/>
+    <dgm:txFillClrLst meth="repeat">
+      <a:schemeClr val="dk1"/>
+    </dgm:txFillClrLst>
+    <dgm:txEffectClrLst/>
+  </dgm:styleLbl>
+  <dgm:styleLbl name="fgAcc2">
+    <dgm:fillClrLst meth="repeat">
+      <a:schemeClr val="lt1">
+        <a:alpha val="90000"/>
+      </a:schemeClr>
+    </dgm:fillClrLst>
+    <dgm:linClrLst meth="repeat">
+      <a:schemeClr val="accent1"/>
+    </dgm:linClrLst>
+    <dgm:effectClrLst/>
+    <dgm:txLinClrLst/>
+    <dgm:txFillClrLst meth="repeat">
+      <a:schemeClr val="dk1"/>
+    </dgm:txFillClrLst>
+    <dgm:txEffectClrLst/>
+  </dgm:styleLbl>
+  <dgm:styleLbl name="fgAcc3">
+    <dgm:fillClrLst meth="repeat">
+      <a:schemeClr val="lt1">
+        <a:alpha val="90000"/>
+      </a:schemeClr>
+    </dgm:fillClrLst>
+    <dgm:linClrLst meth="repeat">
+      <a:schemeClr val="accent1"/>
+    </dgm:linClrLst>
+    <dgm:effectClrLst/>
+    <dgm:txLinClrLst/>
+    <dgm:txFillClrLst meth="repeat">
+      <a:schemeClr val="dk1"/>
+    </dgm:txFillClrLst>
+    <dgm:txEffectClrLst/>
+  </dgm:styleLbl>
+  <dgm:styleLbl name="fgAcc4">
+    <dgm:fillClrLst meth="repeat">
+      <a:schemeClr val="lt1">
+        <a:alpha val="90000"/>
+      </a:schemeClr>
+    </dgm:fillClrLst>
+    <dgm:linClrLst meth="repeat">
+      <a:schemeClr val="accent1"/>
+    </dgm:linClrLst>
+    <dgm:effectClrLst/>
+    <dgm:txLinClrLst/>
+    <dgm:txFillClrLst meth="repeat">
+      <a:schemeClr val="dk1"/>
+    </dgm:txFillClrLst>
+    <dgm:txEffectClrLst/>
+  </dgm:styleLbl>
+  <dgm:styleLbl name="bgShp">
+    <dgm:fillClrLst meth="repeat">
+      <a:schemeClr val="accent1">
+        <a:tint val="40000"/>
+      </a:schemeClr>
+    </dgm:fillClrLst>
+    <dgm:linClrLst meth="repeat">
+      <a:schemeClr val="accent1"/>
+    </dgm:linClrLst>
+    <dgm:effectClrLst/>
+    <dgm:txLinClrLst/>
+    <dgm:txFillClrLst meth="repeat">
+      <a:schemeClr val="dk1"/>
+    </dgm:txFillClrLst>
+    <dgm:txEffectClrLst/>
+  </dgm:styleLbl>
+  <dgm:styleLbl name="dkBgShp">
+    <dgm:fillClrLst meth="repeat">
+      <a:schemeClr val="accent1">
+        <a:shade val="80000"/>
+      </a:schemeClr>
+    </dgm:fillClrLst>
+    <dgm:linClrLst meth="repeat">
+      <a:schemeClr val="accent1"/>
+    </dgm:linClrLst>
+    <dgm:effectClrLst/>
+    <dgm:txLinClrLst/>
+    <dgm:txFillClrLst meth="repeat">
+      <a:schemeClr val="lt1"/>
+    </dgm:txFillClrLst>
+    <dgm:txEffectClrLst/>
+  </dgm:styleLbl>
+  <dgm:styleLbl name="trBgShp">
+    <dgm:fillClrLst meth="repeat">
+      <a:schemeClr val="accent1">
+        <a:tint val="50000"/>
+        <a:alpha val="40000"/>
+      </a:schemeClr>
+    </dgm:fillClrLst>
+    <dgm:linClrLst meth="repeat">
+      <a:schemeClr val="accent1"/>
+    </dgm:linClrLst>
+    <dgm:effectClrLst/>
+    <dgm:txLinClrLst/>
+    <dgm:txFillClrLst meth="repeat">
+      <a:schemeClr val="lt1"/>
+    </dgm:txFillClrLst>
+    <dgm:txEffectClrLst/>
+  </dgm:styleLbl>
+  <dgm:styleLbl name="fgShp">
+    <dgm:fillClrLst meth="repeat">
+      <a:schemeClr val="accent1">
+        <a:tint val="60000"/>
+      </a:schemeClr>
+    </dgm:fillClrLst>
+    <dgm:linClrLst meth="repeat">
+      <a:schemeClr val="lt1"/>
+    </dgm:linClrLst>
+    <dgm:effectClrLst/>
+    <dgm:txLinClrLst/>
+    <dgm:txFillClrLst meth="repeat">
+      <a:schemeClr val="dk1"/>
+    </dgm:txFillClrLst>
+    <dgm:txEffectClrLst/>
+  </dgm:styleLbl>
+  <dgm:styleLbl name="revTx">
+    <dgm:fillClrLst meth="repeat">
+      <a:schemeClr val="lt1">
+        <a:alpha val="0"/>
+      </a:schemeClr>
+    </dgm:fillClrLst>
+    <dgm:linClrLst meth="repeat">
+      <a:schemeClr val="dk1">
+        <a:alpha val="0"/>
+      </a:schemeClr>
+    </dgm:linClrLst>
+    <dgm:effectClrLst/>
+    <dgm:txLinClrLst/>
+    <dgm:txFillClrLst meth="repeat">
+      <a:schemeClr val="tx1"/>
+    </dgm:txFillClrLst>
+    <dgm:txEffectClrLst/>
+  </dgm:styleLbl>
+</dgm:colorsDef>
+</file>
+
+<file path=ppt/diagrams/data1.xml><?xml version="1.0" encoding="utf-8"?>
+<dgm:dataModel xmlns:dgm="http://schemas.openxmlformats.org/drawingml/2006/diagram" xmlns:a="http://schemas.openxmlformats.org/drawingml/2006/main">
+  <dgm:ptLst>
+    <dgm:pt modelId="{68AE08E0-E415-47EB-B7FC-3EF1BC578E08}" type="doc">
+      <dgm:prSet loTypeId="urn:microsoft.com/office/officeart/2005/8/layout/hProcess4" loCatId="process" qsTypeId="urn:microsoft.com/office/officeart/2005/8/quickstyle/simple1" qsCatId="simple" csTypeId="urn:microsoft.com/office/officeart/2005/8/colors/accent1_2" csCatId="accent1" phldr="1"/>
+      <dgm:spPr/>
+    </dgm:pt>
+    <dgm:pt modelId="{A4603825-BB61-432A-8F06-5F970A9932C5}">
+      <dgm:prSet phldrT="[Text]" custT="1"/>
+      <dgm:spPr/>
+      <dgm:t>
+        <a:bodyPr/>
+        <a:lstStyle/>
+        <a:p>
+          <a:r>
+            <a:rPr lang="en-US" sz="1400" dirty="0">
+              <a:latin typeface="Segoe UI Semibold" panose="020B0702040204020203" pitchFamily="34" charset="0"/>
+              <a:cs typeface="Segoe UI Semibold" panose="020B0702040204020203" pitchFamily="34" charset="0"/>
+            </a:rPr>
+            <a:t>Provision Azure API Management</a:t>
+          </a:r>
+          <a:endParaRPr lang="en-BE" sz="1400" dirty="0">
+            <a:latin typeface="Segoe UI Semibold" panose="020B0702040204020203" pitchFamily="34" charset="0"/>
+            <a:cs typeface="Segoe UI Semibold" panose="020B0702040204020203" pitchFamily="34" charset="0"/>
+          </a:endParaRPr>
+        </a:p>
+      </dgm:t>
+    </dgm:pt>
+    <dgm:pt modelId="{3A63D072-00E4-47CA-96CA-7288A74472A9}" type="parTrans" cxnId="{7D4D4542-AE69-4C15-9A46-777A551AA0D5}">
+      <dgm:prSet/>
+      <dgm:spPr/>
+      <dgm:t>
+        <a:bodyPr/>
+        <a:lstStyle/>
+        <a:p>
+          <a:endParaRPr lang="en-BE"/>
+        </a:p>
+      </dgm:t>
+    </dgm:pt>
+    <dgm:pt modelId="{57370174-7EEF-4902-9395-7FFC0C927098}" type="sibTrans" cxnId="{7D4D4542-AE69-4C15-9A46-777A551AA0D5}">
+      <dgm:prSet/>
+      <dgm:spPr/>
+      <dgm:t>
+        <a:bodyPr/>
+        <a:lstStyle/>
+        <a:p>
+          <a:endParaRPr lang="en-BE"/>
+        </a:p>
+      </dgm:t>
+    </dgm:pt>
+    <dgm:pt modelId="{26ADAB84-49BD-4B4C-8CC7-884DCCEE1D4D}">
+      <dgm:prSet phldrT="[Text]"/>
+      <dgm:spPr/>
+      <dgm:t>
+        <a:bodyPr/>
+        <a:lstStyle/>
+        <a:p>
+          <a:r>
+            <a:rPr lang="en-US" dirty="0">
+              <a:latin typeface="Segoe UI" panose="020B0502040204020203" pitchFamily="34" charset="0"/>
+              <a:cs typeface="Segoe UI" panose="020B0502040204020203" pitchFamily="34" charset="0"/>
+            </a:rPr>
+            <a:t>Manage service instance</a:t>
+          </a:r>
+          <a:endParaRPr lang="en-BE" dirty="0">
+            <a:latin typeface="Segoe UI" panose="020B0502040204020203" pitchFamily="34" charset="0"/>
+            <a:cs typeface="Segoe UI" panose="020B0502040204020203" pitchFamily="34" charset="0"/>
+          </a:endParaRPr>
+        </a:p>
+      </dgm:t>
+    </dgm:pt>
+    <dgm:pt modelId="{238C1DA0-5B5D-470F-B66C-0BAD84CCC45B}" type="parTrans" cxnId="{CCE49C1A-3070-47B3-8217-436E3CEF10E7}">
+      <dgm:prSet/>
+      <dgm:spPr/>
+      <dgm:t>
+        <a:bodyPr/>
+        <a:lstStyle/>
+        <a:p>
+          <a:endParaRPr lang="en-BE"/>
+        </a:p>
+      </dgm:t>
+    </dgm:pt>
+    <dgm:pt modelId="{D29A9490-82AB-40E6-BCE3-AE75C715B454}" type="sibTrans" cxnId="{CCE49C1A-3070-47B3-8217-436E3CEF10E7}">
+      <dgm:prSet/>
+      <dgm:spPr/>
+      <dgm:t>
+        <a:bodyPr/>
+        <a:lstStyle/>
+        <a:p>
+          <a:endParaRPr lang="en-BE"/>
+        </a:p>
+      </dgm:t>
+    </dgm:pt>
+    <dgm:pt modelId="{1A3558C8-FDB5-4285-AEFF-075D33878860}">
+      <dgm:prSet phldrT="[Text]"/>
+      <dgm:spPr/>
+      <dgm:t>
+        <a:bodyPr/>
+        <a:lstStyle/>
+        <a:p>
+          <a:r>
+            <a:rPr lang="en-US" dirty="0">
+              <a:latin typeface="Segoe UI" panose="020B0502040204020203" pitchFamily="34" charset="0"/>
+              <a:cs typeface="Segoe UI" panose="020B0502040204020203" pitchFamily="34" charset="0"/>
+            </a:rPr>
+            <a:t>Manage self-hosted gateway</a:t>
+          </a:r>
+          <a:endParaRPr lang="en-BE" dirty="0">
+            <a:latin typeface="Segoe UI" panose="020B0502040204020203" pitchFamily="34" charset="0"/>
+            <a:cs typeface="Segoe UI" panose="020B0502040204020203" pitchFamily="34" charset="0"/>
+          </a:endParaRPr>
+        </a:p>
+      </dgm:t>
+    </dgm:pt>
+    <dgm:pt modelId="{8A03750F-84D1-4271-B3F5-A2BFB40ED06B}" type="parTrans" cxnId="{349E2368-F4F0-4936-B136-FE6E26D14672}">
+      <dgm:prSet/>
+      <dgm:spPr/>
+      <dgm:t>
+        <a:bodyPr/>
+        <a:lstStyle/>
+        <a:p>
+          <a:endParaRPr lang="en-BE"/>
+        </a:p>
+      </dgm:t>
+    </dgm:pt>
+    <dgm:pt modelId="{FC13C2AC-6412-4473-B019-2391E231AA18}" type="sibTrans" cxnId="{349E2368-F4F0-4936-B136-FE6E26D14672}">
+      <dgm:prSet/>
+      <dgm:spPr/>
+      <dgm:t>
+        <a:bodyPr/>
+        <a:lstStyle/>
+        <a:p>
+          <a:endParaRPr lang="en-BE"/>
+        </a:p>
+      </dgm:t>
+    </dgm:pt>
+    <dgm:pt modelId="{6D034FA8-27AB-43C0-B510-4E4250910451}">
+      <dgm:prSet phldrT="[Text]" custT="1"/>
+      <dgm:spPr>
+        <a:solidFill>
+          <a:srgbClr val="4472C4">
+            <a:hueOff val="0"/>
+            <a:satOff val="0"/>
+            <a:lumOff val="0"/>
+            <a:alphaOff val="0"/>
+          </a:srgbClr>
+        </a:solidFill>
+        <a:ln w="12700" cap="flat" cmpd="sng" algn="ctr">
+          <a:solidFill>
+            <a:prstClr val="white">
+              <a:hueOff val="0"/>
+              <a:satOff val="0"/>
+              <a:lumOff val="0"/>
+              <a:alphaOff val="0"/>
+            </a:prstClr>
+          </a:solidFill>
+          <a:prstDash val="solid"/>
+          <a:miter lim="800000"/>
+        </a:ln>
+        <a:effectLst/>
+      </dgm:spPr>
+      <dgm:t>
+        <a:bodyPr spcFirstLastPara="0" vert="horz" wrap="square" lIns="28575" tIns="19050" rIns="28575" bIns="19050" numCol="1" spcCol="1270" anchor="ctr" anchorCtr="0"/>
+        <a:lstStyle/>
+        <a:p>
+          <a:pPr marL="0" lvl="0" indent="0" algn="ctr" defTabSz="666750">
+            <a:lnSpc>
+              <a:spcPct val="90000"/>
+            </a:lnSpc>
+            <a:spcBef>
+              <a:spcPct val="0"/>
+            </a:spcBef>
+            <a:spcAft>
+              <a:spcPct val="35000"/>
+            </a:spcAft>
+            <a:buNone/>
+          </a:pPr>
+          <a:r>
+            <a:rPr lang="en-US" sz="1400" kern="1200" dirty="0">
+              <a:solidFill>
+                <a:prstClr val="white"/>
+              </a:solidFill>
+              <a:latin typeface="Segoe UI Semibold" panose="020B0702040204020203" pitchFamily="34" charset="0"/>
+              <a:ea typeface="+mn-ea"/>
+              <a:cs typeface="Segoe UI Semibold" panose="020B0702040204020203" pitchFamily="34" charset="0"/>
+            </a:rPr>
+            <a:t>Provision infrastructure</a:t>
+          </a:r>
+          <a:endParaRPr lang="en-BE" sz="1400" kern="1200" dirty="0">
+            <a:solidFill>
+              <a:prstClr val="white"/>
+            </a:solidFill>
+            <a:latin typeface="Segoe UI Semibold" panose="020B0702040204020203" pitchFamily="34" charset="0"/>
+            <a:ea typeface="+mn-ea"/>
+            <a:cs typeface="Segoe UI Semibold" panose="020B0702040204020203" pitchFamily="34" charset="0"/>
+          </a:endParaRPr>
+        </a:p>
+      </dgm:t>
+    </dgm:pt>
+    <dgm:pt modelId="{7733215E-8256-4432-B965-2690CB8937F7}" type="parTrans" cxnId="{660F0701-BFBB-490D-B88B-C2F60DCCE05F}">
+      <dgm:prSet/>
+      <dgm:spPr/>
+      <dgm:t>
+        <a:bodyPr/>
+        <a:lstStyle/>
+        <a:p>
+          <a:endParaRPr lang="en-BE"/>
+        </a:p>
+      </dgm:t>
+    </dgm:pt>
+    <dgm:pt modelId="{0F1F0829-5BC4-4989-A603-77C27B721151}" type="sibTrans" cxnId="{660F0701-BFBB-490D-B88B-C2F60DCCE05F}">
+      <dgm:prSet/>
+      <dgm:spPr/>
+      <dgm:t>
+        <a:bodyPr/>
+        <a:lstStyle/>
+        <a:p>
+          <a:endParaRPr lang="en-BE"/>
+        </a:p>
+      </dgm:t>
+    </dgm:pt>
+    <dgm:pt modelId="{8D8FFD82-397A-4BA4-BF5A-49E5B6F48778}">
+      <dgm:prSet phldrT="[Text]"/>
+      <dgm:spPr/>
+      <dgm:t>
+        <a:bodyPr/>
+        <a:lstStyle/>
+        <a:p>
+          <a:r>
+            <a:rPr lang="en-US" dirty="0">
+              <a:latin typeface="Segoe UI" panose="020B0502040204020203" pitchFamily="34" charset="0"/>
+              <a:cs typeface="Segoe UI" panose="020B0502040204020203" pitchFamily="34" charset="0"/>
+            </a:rPr>
+            <a:t>Deploy Bacon API with internal ingress</a:t>
+          </a:r>
+          <a:endParaRPr lang="en-BE" dirty="0">
+            <a:latin typeface="Segoe UI" panose="020B0502040204020203" pitchFamily="34" charset="0"/>
+            <a:cs typeface="Segoe UI" panose="020B0502040204020203" pitchFamily="34" charset="0"/>
+          </a:endParaRPr>
+        </a:p>
+      </dgm:t>
+    </dgm:pt>
+    <dgm:pt modelId="{8526FE2D-EF46-4B56-9767-E9F2B79C3553}" type="parTrans" cxnId="{1289BB3B-E367-49F9-86B2-41F060615F37}">
+      <dgm:prSet/>
+      <dgm:spPr/>
+      <dgm:t>
+        <a:bodyPr/>
+        <a:lstStyle/>
+        <a:p>
+          <a:endParaRPr lang="en-BE"/>
+        </a:p>
+      </dgm:t>
+    </dgm:pt>
+    <dgm:pt modelId="{01A3205E-26FB-44A8-97DB-B8505E7BAA8F}" type="sibTrans" cxnId="{1289BB3B-E367-49F9-86B2-41F060615F37}">
+      <dgm:prSet/>
+      <dgm:spPr/>
+      <dgm:t>
+        <a:bodyPr/>
+        <a:lstStyle/>
+        <a:p>
+          <a:endParaRPr lang="en-BE"/>
+        </a:p>
+      </dgm:t>
+    </dgm:pt>
+    <dgm:pt modelId="{E3AE4126-972B-4FCE-8E32-6B7427426AFD}">
+      <dgm:prSet phldrT="[Text]" custT="1"/>
+      <dgm:spPr>
+        <a:solidFill>
+          <a:srgbClr val="4472C4">
+            <a:hueOff val="0"/>
+            <a:satOff val="0"/>
+            <a:lumOff val="0"/>
+            <a:alphaOff val="0"/>
+          </a:srgbClr>
+        </a:solidFill>
+        <a:ln w="12700" cap="flat" cmpd="sng" algn="ctr">
+          <a:solidFill>
+            <a:prstClr val="white">
+              <a:hueOff val="0"/>
+              <a:satOff val="0"/>
+              <a:lumOff val="0"/>
+              <a:alphaOff val="0"/>
+            </a:prstClr>
+          </a:solidFill>
+          <a:prstDash val="solid"/>
+          <a:miter lim="800000"/>
+        </a:ln>
+        <a:effectLst/>
+      </dgm:spPr>
+      <dgm:t>
+        <a:bodyPr spcFirstLastPara="0" vert="horz" wrap="square" lIns="28575" tIns="19050" rIns="28575" bIns="19050" numCol="1" spcCol="1270" anchor="ctr" anchorCtr="0"/>
+        <a:lstStyle/>
+        <a:p>
+          <a:pPr marL="0" lvl="0" indent="0" algn="ctr" defTabSz="666750">
+            <a:lnSpc>
+              <a:spcPct val="90000"/>
+            </a:lnSpc>
+            <a:spcBef>
+              <a:spcPct val="0"/>
+            </a:spcBef>
+            <a:spcAft>
+              <a:spcPct val="35000"/>
+            </a:spcAft>
+            <a:buNone/>
+          </a:pPr>
+          <a:r>
+            <a:rPr lang="en-US" sz="1400" kern="1200" dirty="0">
+              <a:solidFill>
+                <a:prstClr val="white"/>
+              </a:solidFill>
+              <a:latin typeface="Segoe UI Semibold" panose="020B0702040204020203" pitchFamily="34" charset="0"/>
+              <a:ea typeface="+mn-ea"/>
+              <a:cs typeface="Segoe UI Semibold" panose="020B0702040204020203" pitchFamily="34" charset="0"/>
+            </a:rPr>
+            <a:t>Integrate container workloads with</a:t>
+          </a:r>
+          <a:br>
+            <a:rPr lang="en-US" sz="1400" kern="1200" dirty="0">
+              <a:solidFill>
+                <a:prstClr val="white"/>
+              </a:solidFill>
+              <a:latin typeface="Segoe UI Semibold" panose="020B0702040204020203" pitchFamily="34" charset="0"/>
+              <a:ea typeface="+mn-ea"/>
+              <a:cs typeface="Segoe UI Semibold" panose="020B0702040204020203" pitchFamily="34" charset="0"/>
+            </a:rPr>
+          </a:br>
+          <a:r>
+            <a:rPr lang="en-US" sz="1400" kern="1200" dirty="0">
+              <a:solidFill>
+                <a:prstClr val="white"/>
+              </a:solidFill>
+              <a:latin typeface="Segoe UI Semibold" panose="020B0702040204020203" pitchFamily="34" charset="0"/>
+              <a:ea typeface="+mn-ea"/>
+              <a:cs typeface="Segoe UI Semibold" panose="020B0702040204020203" pitchFamily="34" charset="0"/>
+            </a:rPr>
+            <a:t>Azure API Management</a:t>
+          </a:r>
+          <a:endParaRPr lang="en-BE" sz="1400" kern="1200" dirty="0">
+            <a:solidFill>
+              <a:prstClr val="white"/>
+            </a:solidFill>
+            <a:latin typeface="Segoe UI Semibold" panose="020B0702040204020203" pitchFamily="34" charset="0"/>
+            <a:ea typeface="+mn-ea"/>
+            <a:cs typeface="Segoe UI Semibold" panose="020B0702040204020203" pitchFamily="34" charset="0"/>
+          </a:endParaRPr>
+        </a:p>
+      </dgm:t>
+    </dgm:pt>
+    <dgm:pt modelId="{87AD45CC-5729-43B8-AA05-D4330BE26533}" type="parTrans" cxnId="{DC165BD0-3FA8-4F94-ACE6-55D07125FD86}">
+      <dgm:prSet/>
+      <dgm:spPr/>
+      <dgm:t>
+        <a:bodyPr/>
+        <a:lstStyle/>
+        <a:p>
+          <a:endParaRPr lang="en-BE"/>
+        </a:p>
+      </dgm:t>
+    </dgm:pt>
+    <dgm:pt modelId="{C25DED55-B544-4E43-AEAA-99D5E91CB6C0}" type="sibTrans" cxnId="{DC165BD0-3FA8-4F94-ACE6-55D07125FD86}">
+      <dgm:prSet/>
+      <dgm:spPr/>
+      <dgm:t>
+        <a:bodyPr/>
+        <a:lstStyle/>
+        <a:p>
+          <a:endParaRPr lang="en-BE"/>
+        </a:p>
+      </dgm:t>
+    </dgm:pt>
+    <dgm:pt modelId="{78C74320-5B32-46DF-828D-41022E47FDE5}">
+      <dgm:prSet phldrT="[Text]" custT="1"/>
+      <dgm:spPr>
+        <a:solidFill>
+          <a:srgbClr val="4472C4">
+            <a:hueOff val="0"/>
+            <a:satOff val="0"/>
+            <a:lumOff val="0"/>
+            <a:alphaOff val="0"/>
+          </a:srgbClr>
+        </a:solidFill>
+        <a:ln w="12700" cap="flat" cmpd="sng" algn="ctr">
+          <a:solidFill>
+            <a:prstClr val="white">
+              <a:hueOff val="0"/>
+              <a:satOff val="0"/>
+              <a:lumOff val="0"/>
+              <a:alphaOff val="0"/>
+            </a:prstClr>
+          </a:solidFill>
+          <a:prstDash val="solid"/>
+          <a:miter lim="800000"/>
+        </a:ln>
+        <a:effectLst/>
+      </dgm:spPr>
+      <dgm:t>
+        <a:bodyPr spcFirstLastPara="0" vert="horz" wrap="square" lIns="28575" tIns="19050" rIns="28575" bIns="19050" numCol="1" spcCol="1270" anchor="ctr" anchorCtr="0"/>
+        <a:lstStyle/>
+        <a:p>
+          <a:pPr marL="0" lvl="0" indent="0" algn="ctr" defTabSz="666750">
+            <a:lnSpc>
+              <a:spcPct val="90000"/>
+            </a:lnSpc>
+            <a:spcBef>
+              <a:spcPct val="0"/>
+            </a:spcBef>
+            <a:spcAft>
+              <a:spcPct val="35000"/>
+            </a:spcAft>
+            <a:buNone/>
+          </a:pPr>
+          <a:r>
+            <a:rPr lang="en-US" sz="1400" kern="1200" dirty="0">
+              <a:solidFill>
+                <a:prstClr val="white"/>
+              </a:solidFill>
+              <a:latin typeface="Segoe UI Semibold" panose="020B0702040204020203" pitchFamily="34" charset="0"/>
+              <a:ea typeface="+mn-ea"/>
+              <a:cs typeface="Segoe UI Semibold" panose="020B0702040204020203" pitchFamily="34" charset="0"/>
+            </a:rPr>
+            <a:t>Deploy Apps on Azure Container Apps</a:t>
+          </a:r>
+          <a:endParaRPr lang="en-BE" sz="1400" kern="1200" dirty="0">
+            <a:solidFill>
+              <a:prstClr val="white"/>
+            </a:solidFill>
+            <a:latin typeface="Segoe UI Semibold" panose="020B0702040204020203" pitchFamily="34" charset="0"/>
+            <a:ea typeface="+mn-ea"/>
+            <a:cs typeface="Segoe UI Semibold" panose="020B0702040204020203" pitchFamily="34" charset="0"/>
+          </a:endParaRPr>
+        </a:p>
+      </dgm:t>
+    </dgm:pt>
+    <dgm:pt modelId="{38B05AE1-E7B6-4917-A2FA-C9E355917F00}" type="parTrans" cxnId="{EA9F5664-1ABE-43C1-AF55-0CF27E081D7D}">
+      <dgm:prSet/>
+      <dgm:spPr/>
+      <dgm:t>
+        <a:bodyPr/>
+        <a:lstStyle/>
+        <a:p>
+          <a:endParaRPr lang="en-BE"/>
+        </a:p>
+      </dgm:t>
+    </dgm:pt>
+    <dgm:pt modelId="{D51E9B47-86CF-4089-AC19-2A91991A429E}" type="sibTrans" cxnId="{EA9F5664-1ABE-43C1-AF55-0CF27E081D7D}">
+      <dgm:prSet/>
+      <dgm:spPr/>
+      <dgm:t>
+        <a:bodyPr/>
+        <a:lstStyle/>
+        <a:p>
+          <a:endParaRPr lang="en-BE"/>
+        </a:p>
+      </dgm:t>
+    </dgm:pt>
+    <dgm:pt modelId="{CE69B260-4ABC-4374-B592-705CF03E2DD7}">
+      <dgm:prSet phldrT="[Text]"/>
+      <dgm:spPr/>
+      <dgm:t>
+        <a:bodyPr/>
+        <a:lstStyle/>
+        <a:p>
+          <a:r>
+            <a:rPr lang="en-US" dirty="0">
+              <a:latin typeface="Segoe UI" panose="020B0502040204020203" pitchFamily="34" charset="0"/>
+              <a:cs typeface="Segoe UI" panose="020B0502040204020203" pitchFamily="34" charset="0"/>
+            </a:rPr>
+            <a:t>Deploy API gateway with external ingress</a:t>
+          </a:r>
+          <a:endParaRPr lang="en-BE" dirty="0">
+            <a:latin typeface="Segoe UI" panose="020B0502040204020203" pitchFamily="34" charset="0"/>
+            <a:cs typeface="Segoe UI" panose="020B0502040204020203" pitchFamily="34" charset="0"/>
+          </a:endParaRPr>
+        </a:p>
+      </dgm:t>
+    </dgm:pt>
+    <dgm:pt modelId="{54F96F45-F0CC-4FE6-B395-113BE6E9C2EB}" type="parTrans" cxnId="{AF7FE506-C346-4A1B-A381-514B22D0EEE8}">
+      <dgm:prSet/>
+      <dgm:spPr/>
+      <dgm:t>
+        <a:bodyPr/>
+        <a:lstStyle/>
+        <a:p>
+          <a:endParaRPr lang="en-BE"/>
+        </a:p>
+      </dgm:t>
+    </dgm:pt>
+    <dgm:pt modelId="{B3F54B82-E994-470B-8329-870B66613670}" type="sibTrans" cxnId="{AF7FE506-C346-4A1B-A381-514B22D0EEE8}">
+      <dgm:prSet/>
+      <dgm:spPr/>
+      <dgm:t>
+        <a:bodyPr/>
+        <a:lstStyle/>
+        <a:p>
+          <a:endParaRPr lang="en-BE"/>
+        </a:p>
+      </dgm:t>
+    </dgm:pt>
+    <dgm:pt modelId="{38B4C010-EB7B-445F-9FAD-00B223B07B7F}">
+      <dgm:prSet phldrT="[Text]"/>
+      <dgm:spPr/>
+      <dgm:t>
+        <a:bodyPr/>
+        <a:lstStyle/>
+        <a:p>
+          <a:r>
+            <a:rPr lang="en-US" dirty="0">
+              <a:latin typeface="Segoe UI" panose="020B0502040204020203" pitchFamily="34" charset="0"/>
+              <a:cs typeface="Segoe UI" panose="020B0502040204020203" pitchFamily="34" charset="0"/>
+            </a:rPr>
+            <a:t>Manage Bacon API</a:t>
+          </a:r>
+          <a:endParaRPr lang="en-BE" dirty="0">
+            <a:latin typeface="Segoe UI" panose="020B0502040204020203" pitchFamily="34" charset="0"/>
+            <a:cs typeface="Segoe UI" panose="020B0502040204020203" pitchFamily="34" charset="0"/>
+          </a:endParaRPr>
+        </a:p>
+      </dgm:t>
+    </dgm:pt>
+    <dgm:pt modelId="{BB3BA887-B327-4EF7-BDCB-B328852EBD9D}" type="parTrans" cxnId="{315381CE-304F-4B5A-A0A0-DACEF5926BFB}">
+      <dgm:prSet/>
+      <dgm:spPr/>
+      <dgm:t>
+        <a:bodyPr/>
+        <a:lstStyle/>
+        <a:p>
+          <a:endParaRPr lang="en-BE"/>
+        </a:p>
+      </dgm:t>
+    </dgm:pt>
+    <dgm:pt modelId="{0747C354-05F4-419D-B86D-622FC3A3ADFF}" type="sibTrans" cxnId="{315381CE-304F-4B5A-A0A0-DACEF5926BFB}">
+      <dgm:prSet/>
+      <dgm:spPr/>
+      <dgm:t>
+        <a:bodyPr/>
+        <a:lstStyle/>
+        <a:p>
+          <a:endParaRPr lang="en-BE"/>
+        </a:p>
+      </dgm:t>
+    </dgm:pt>
+    <dgm:pt modelId="{C417123E-A71A-41CF-BCEB-7E6A759A8909}">
+      <dgm:prSet phldrT="[Text]"/>
+      <dgm:spPr/>
+      <dgm:t>
+        <a:bodyPr/>
+        <a:lstStyle/>
+        <a:p>
+          <a:r>
+            <a:rPr lang="en-US" dirty="0">
+              <a:latin typeface="Segoe UI" panose="020B0502040204020203" pitchFamily="34" charset="0"/>
+              <a:cs typeface="Segoe UI" panose="020B0502040204020203" pitchFamily="34" charset="0"/>
+            </a:rPr>
+            <a:t>Manage Bacon backend</a:t>
+          </a:r>
+          <a:endParaRPr lang="en-BE" dirty="0">
+            <a:latin typeface="Segoe UI" panose="020B0502040204020203" pitchFamily="34" charset="0"/>
+            <a:cs typeface="Segoe UI" panose="020B0502040204020203" pitchFamily="34" charset="0"/>
+          </a:endParaRPr>
+        </a:p>
+      </dgm:t>
+    </dgm:pt>
+    <dgm:pt modelId="{5E4449EC-3C16-4980-BF27-390065A15994}" type="parTrans" cxnId="{F8E8083C-B708-4803-828E-CF9FBB9633D1}">
+      <dgm:prSet/>
+      <dgm:spPr/>
+      <dgm:t>
+        <a:bodyPr/>
+        <a:lstStyle/>
+        <a:p>
+          <a:endParaRPr lang="en-BE"/>
+        </a:p>
+      </dgm:t>
+    </dgm:pt>
+    <dgm:pt modelId="{D21C16B8-1D70-4636-A6E3-AB79237ECF46}" type="sibTrans" cxnId="{F8E8083C-B708-4803-828E-CF9FBB9633D1}">
+      <dgm:prSet/>
+      <dgm:spPr/>
+      <dgm:t>
+        <a:bodyPr/>
+        <a:lstStyle/>
+        <a:p>
+          <a:endParaRPr lang="en-BE"/>
+        </a:p>
+      </dgm:t>
+    </dgm:pt>
+    <dgm:pt modelId="{38E83F26-3B23-45F8-9F09-0574D203F197}">
+      <dgm:prSet phldrT="[Text]"/>
+      <dgm:spPr/>
+      <dgm:t>
+        <a:bodyPr/>
+        <a:lstStyle/>
+        <a:p>
+          <a:r>
+            <a:rPr lang="en-US" dirty="0">
+              <a:latin typeface="Segoe UI" panose="020B0502040204020203" pitchFamily="34" charset="0"/>
+              <a:cs typeface="Segoe UI" panose="020B0502040204020203" pitchFamily="34" charset="0"/>
+            </a:rPr>
+            <a:t>Use policy to set backend for self-hosted gateway</a:t>
+          </a:r>
+          <a:endParaRPr lang="en-BE" dirty="0">
+            <a:latin typeface="Segoe UI" panose="020B0502040204020203" pitchFamily="34" charset="0"/>
+            <a:cs typeface="Segoe UI" panose="020B0502040204020203" pitchFamily="34" charset="0"/>
+          </a:endParaRPr>
+        </a:p>
+      </dgm:t>
+    </dgm:pt>
+    <dgm:pt modelId="{FF314169-8100-4F9D-914F-B15E6CF1C248}" type="parTrans" cxnId="{94E039F1-58C5-47BF-B884-73D412D3ED03}">
+      <dgm:prSet/>
+      <dgm:spPr/>
+      <dgm:t>
+        <a:bodyPr/>
+        <a:lstStyle/>
+        <a:p>
+          <a:endParaRPr lang="en-BE"/>
+        </a:p>
+      </dgm:t>
+    </dgm:pt>
+    <dgm:pt modelId="{368F4C60-41B5-403E-B79B-BD5C0F780985}" type="sibTrans" cxnId="{94E039F1-58C5-47BF-B884-73D412D3ED03}">
+      <dgm:prSet/>
+      <dgm:spPr/>
+      <dgm:t>
+        <a:bodyPr/>
+        <a:lstStyle/>
+        <a:p>
+          <a:endParaRPr lang="en-BE"/>
+        </a:p>
+      </dgm:t>
+    </dgm:pt>
+    <dgm:pt modelId="{5267D894-6A5D-4862-A91D-4779597479F1}">
+      <dgm:prSet phldrT="[Text]"/>
+      <dgm:spPr/>
+      <dgm:t>
+        <a:bodyPr/>
+        <a:lstStyle/>
+        <a:p>
+          <a:r>
+            <a:rPr lang="en-US" dirty="0">
+              <a:latin typeface="Segoe UI" panose="020B0502040204020203" pitchFamily="34" charset="0"/>
+              <a:cs typeface="Segoe UI" panose="020B0502040204020203" pitchFamily="34" charset="0"/>
+            </a:rPr>
+            <a:t>Expose Bacon API on self-hosted gateway</a:t>
+          </a:r>
+          <a:endParaRPr lang="en-BE" dirty="0">
+            <a:latin typeface="Segoe UI" panose="020B0502040204020203" pitchFamily="34" charset="0"/>
+            <a:cs typeface="Segoe UI" panose="020B0502040204020203" pitchFamily="34" charset="0"/>
+          </a:endParaRPr>
+        </a:p>
+      </dgm:t>
+    </dgm:pt>
+    <dgm:pt modelId="{7BF200E0-D09C-4162-A123-DD450B0F067D}" type="parTrans" cxnId="{DC6380C6-6157-48C3-A94C-21972D7ACC42}">
+      <dgm:prSet/>
+      <dgm:spPr/>
+      <dgm:t>
+        <a:bodyPr/>
+        <a:lstStyle/>
+        <a:p>
+          <a:endParaRPr lang="en-BE"/>
+        </a:p>
+      </dgm:t>
+    </dgm:pt>
+    <dgm:pt modelId="{D6AA030F-4B10-4572-8E6F-FF819787972B}" type="sibTrans" cxnId="{DC6380C6-6157-48C3-A94C-21972D7ACC42}">
+      <dgm:prSet/>
+      <dgm:spPr/>
+      <dgm:t>
+        <a:bodyPr/>
+        <a:lstStyle/>
+        <a:p>
+          <a:endParaRPr lang="en-BE"/>
+        </a:p>
+      </dgm:t>
+    </dgm:pt>
+    <dgm:pt modelId="{9BD132F5-7AFD-4F05-81ED-B2F7824E7FDB}">
+      <dgm:prSet phldrT="[Text]"/>
+      <dgm:spPr/>
+      <dgm:t>
+        <a:bodyPr/>
+        <a:lstStyle/>
+        <a:p>
+          <a:r>
+            <a:rPr lang="en-US" dirty="0">
+              <a:latin typeface="Segoe UI" panose="020B0502040204020203" pitchFamily="34" charset="0"/>
+              <a:cs typeface="Segoe UI" panose="020B0502040204020203" pitchFamily="34" charset="0"/>
+            </a:rPr>
+            <a:t>Manage Log Analytics</a:t>
+          </a:r>
+          <a:endParaRPr lang="en-BE" dirty="0">
+            <a:latin typeface="Segoe UI" panose="020B0502040204020203" pitchFamily="34" charset="0"/>
+            <a:cs typeface="Segoe UI" panose="020B0502040204020203" pitchFamily="34" charset="0"/>
+          </a:endParaRPr>
+        </a:p>
+      </dgm:t>
+    </dgm:pt>
+    <dgm:pt modelId="{9A3EBB83-CE78-43A4-9AED-62A3E0FAC521}" type="parTrans" cxnId="{F31E0CEC-2534-49B0-9790-6D8134EA5AB2}">
+      <dgm:prSet/>
+      <dgm:spPr/>
+      <dgm:t>
+        <a:bodyPr/>
+        <a:lstStyle/>
+        <a:p>
+          <a:endParaRPr lang="en-BE"/>
+        </a:p>
+      </dgm:t>
+    </dgm:pt>
+    <dgm:pt modelId="{1902695C-A5A2-4C46-9668-0FCE3688F7E7}" type="sibTrans" cxnId="{F31E0CEC-2534-49B0-9790-6D8134EA5AB2}">
+      <dgm:prSet/>
+      <dgm:spPr/>
+      <dgm:t>
+        <a:bodyPr/>
+        <a:lstStyle/>
+        <a:p>
+          <a:endParaRPr lang="en-BE"/>
+        </a:p>
+      </dgm:t>
+    </dgm:pt>
+    <dgm:pt modelId="{DA763B31-BFEE-4046-8F29-DD59F9768114}" type="pres">
+      <dgm:prSet presAssocID="{68AE08E0-E415-47EB-B7FC-3EF1BC578E08}" presName="Name0" presStyleCnt="0">
+        <dgm:presLayoutVars>
+          <dgm:dir/>
+          <dgm:animLvl val="lvl"/>
+          <dgm:resizeHandles val="exact"/>
+        </dgm:presLayoutVars>
+      </dgm:prSet>
+      <dgm:spPr/>
+    </dgm:pt>
+    <dgm:pt modelId="{4B053F00-C9DE-406A-8058-212B8B719300}" type="pres">
+      <dgm:prSet presAssocID="{68AE08E0-E415-47EB-B7FC-3EF1BC578E08}" presName="tSp" presStyleCnt="0"/>
+      <dgm:spPr/>
+    </dgm:pt>
+    <dgm:pt modelId="{6EEC0859-ACD2-420F-8634-4FE0E2B33711}" type="pres">
+      <dgm:prSet presAssocID="{68AE08E0-E415-47EB-B7FC-3EF1BC578E08}" presName="bSp" presStyleCnt="0"/>
+      <dgm:spPr/>
+    </dgm:pt>
+    <dgm:pt modelId="{4B902E43-2710-4696-B736-06ED62431789}" type="pres">
+      <dgm:prSet presAssocID="{68AE08E0-E415-47EB-B7FC-3EF1BC578E08}" presName="process" presStyleCnt="0"/>
+      <dgm:spPr/>
+    </dgm:pt>
+    <dgm:pt modelId="{8FDC4F3F-3473-4288-88DF-DE0665E7D368}" type="pres">
+      <dgm:prSet presAssocID="{A4603825-BB61-432A-8F06-5F970A9932C5}" presName="composite1" presStyleCnt="0"/>
+      <dgm:spPr/>
+    </dgm:pt>
+    <dgm:pt modelId="{69ED0891-D4FA-4CD8-BEC8-61354FACE6BB}" type="pres">
+      <dgm:prSet presAssocID="{A4603825-BB61-432A-8F06-5F970A9932C5}" presName="dummyNode1" presStyleLbl="node1" presStyleIdx="0" presStyleCnt="4"/>
+      <dgm:spPr/>
+    </dgm:pt>
+    <dgm:pt modelId="{8E0BB412-C49E-4660-959C-24D3318DFF25}" type="pres">
+      <dgm:prSet presAssocID="{A4603825-BB61-432A-8F06-5F970A9932C5}" presName="childNode1" presStyleLbl="bgAcc1" presStyleIdx="0" presStyleCnt="4">
+        <dgm:presLayoutVars>
+          <dgm:bulletEnabled val="1"/>
+        </dgm:presLayoutVars>
+      </dgm:prSet>
+      <dgm:spPr/>
+    </dgm:pt>
+    <dgm:pt modelId="{10CB307D-1DF1-4F93-B860-621E5938C682}" type="pres">
+      <dgm:prSet presAssocID="{A4603825-BB61-432A-8F06-5F970A9932C5}" presName="childNode1tx" presStyleLbl="bgAcc1" presStyleIdx="0" presStyleCnt="4">
+        <dgm:presLayoutVars>
+          <dgm:bulletEnabled val="1"/>
+        </dgm:presLayoutVars>
+      </dgm:prSet>
+      <dgm:spPr/>
+    </dgm:pt>
+    <dgm:pt modelId="{3D4C40A2-FA59-412F-85ED-322B85FF81C4}" type="pres">
+      <dgm:prSet presAssocID="{A4603825-BB61-432A-8F06-5F970A9932C5}" presName="parentNode1" presStyleLbl="node1" presStyleIdx="0" presStyleCnt="4">
+        <dgm:presLayoutVars>
+          <dgm:chMax val="1"/>
+          <dgm:bulletEnabled val="1"/>
+        </dgm:presLayoutVars>
+      </dgm:prSet>
+      <dgm:spPr/>
+    </dgm:pt>
+    <dgm:pt modelId="{46AC275E-858F-4DF4-A9FB-8F18609B2774}" type="pres">
+      <dgm:prSet presAssocID="{A4603825-BB61-432A-8F06-5F970A9932C5}" presName="connSite1" presStyleCnt="0"/>
+      <dgm:spPr/>
+    </dgm:pt>
+    <dgm:pt modelId="{5747A82E-621E-47FA-9A6E-169F141239BE}" type="pres">
+      <dgm:prSet presAssocID="{57370174-7EEF-4902-9395-7FFC0C927098}" presName="Name9" presStyleLbl="sibTrans2D1" presStyleIdx="0" presStyleCnt="3"/>
+      <dgm:spPr/>
+    </dgm:pt>
+    <dgm:pt modelId="{83B21A97-205F-4D65-8A1E-9ED45C2D6BF5}" type="pres">
+      <dgm:prSet presAssocID="{6D034FA8-27AB-43C0-B510-4E4250910451}" presName="composite2" presStyleCnt="0"/>
+      <dgm:spPr/>
+    </dgm:pt>
+    <dgm:pt modelId="{577F5493-0AF4-4EE7-AE11-3153A87D5D45}" type="pres">
+      <dgm:prSet presAssocID="{6D034FA8-27AB-43C0-B510-4E4250910451}" presName="dummyNode2" presStyleLbl="node1" presStyleIdx="0" presStyleCnt="4"/>
+      <dgm:spPr/>
+    </dgm:pt>
+    <dgm:pt modelId="{2C20F079-56C9-4C84-BC2E-4A7A28D3AAA0}" type="pres">
+      <dgm:prSet presAssocID="{6D034FA8-27AB-43C0-B510-4E4250910451}" presName="childNode2" presStyleLbl="bgAcc1" presStyleIdx="1" presStyleCnt="4">
+        <dgm:presLayoutVars>
+          <dgm:bulletEnabled val="1"/>
+        </dgm:presLayoutVars>
+      </dgm:prSet>
+      <dgm:spPr/>
+    </dgm:pt>
+    <dgm:pt modelId="{40FB52AE-ED4D-46F4-98DF-3F436DCF3FAF}" type="pres">
+      <dgm:prSet presAssocID="{6D034FA8-27AB-43C0-B510-4E4250910451}" presName="childNode2tx" presStyleLbl="bgAcc1" presStyleIdx="1" presStyleCnt="4">
+        <dgm:presLayoutVars>
+          <dgm:bulletEnabled val="1"/>
+        </dgm:presLayoutVars>
+      </dgm:prSet>
+      <dgm:spPr/>
+    </dgm:pt>
+    <dgm:pt modelId="{409C4896-621D-481E-9D12-B3FE06214E73}" type="pres">
+      <dgm:prSet presAssocID="{6D034FA8-27AB-43C0-B510-4E4250910451}" presName="parentNode2" presStyleLbl="node1" presStyleIdx="1" presStyleCnt="4">
+        <dgm:presLayoutVars>
+          <dgm:chMax val="0"/>
+          <dgm:bulletEnabled val="1"/>
+        </dgm:presLayoutVars>
+      </dgm:prSet>
+      <dgm:spPr>
+        <a:xfrm>
+          <a:off x="3658026" y="532873"/>
+          <a:ext cx="1875998" cy="746022"/>
+        </a:xfrm>
+        <a:prstGeom prst="roundRect">
+          <a:avLst>
+            <a:gd name="adj" fmla="val 10000"/>
+          </a:avLst>
+        </a:prstGeom>
+      </dgm:spPr>
+    </dgm:pt>
+    <dgm:pt modelId="{1791F461-F4C2-4580-BB51-8E7D9A68D531}" type="pres">
+      <dgm:prSet presAssocID="{6D034FA8-27AB-43C0-B510-4E4250910451}" presName="connSite2" presStyleCnt="0"/>
+      <dgm:spPr/>
+    </dgm:pt>
+    <dgm:pt modelId="{EF1C8752-DEEC-4845-B247-0EDC23791005}" type="pres">
+      <dgm:prSet presAssocID="{0F1F0829-5BC4-4989-A603-77C27B721151}" presName="Name18" presStyleLbl="sibTrans2D1" presStyleIdx="1" presStyleCnt="3"/>
+      <dgm:spPr/>
+    </dgm:pt>
+    <dgm:pt modelId="{1C133B21-A574-4968-ABE8-AB696359085F}" type="pres">
+      <dgm:prSet presAssocID="{78C74320-5B32-46DF-828D-41022E47FDE5}" presName="composite1" presStyleCnt="0"/>
+      <dgm:spPr/>
+    </dgm:pt>
+    <dgm:pt modelId="{B4DB716E-1FDB-4303-92A5-0B8B94B2328E}" type="pres">
+      <dgm:prSet presAssocID="{78C74320-5B32-46DF-828D-41022E47FDE5}" presName="dummyNode1" presStyleLbl="node1" presStyleIdx="1" presStyleCnt="4"/>
+      <dgm:spPr/>
+    </dgm:pt>
+    <dgm:pt modelId="{55E5B907-DF99-4960-BDF7-3D722F040045}" type="pres">
+      <dgm:prSet presAssocID="{78C74320-5B32-46DF-828D-41022E47FDE5}" presName="childNode1" presStyleLbl="bgAcc1" presStyleIdx="2" presStyleCnt="4">
+        <dgm:presLayoutVars>
+          <dgm:bulletEnabled val="1"/>
+        </dgm:presLayoutVars>
+      </dgm:prSet>
+      <dgm:spPr/>
+    </dgm:pt>
+    <dgm:pt modelId="{4545F89F-3FF4-4C0B-9524-C874BC20FEC8}" type="pres">
+      <dgm:prSet presAssocID="{78C74320-5B32-46DF-828D-41022E47FDE5}" presName="childNode1tx" presStyleLbl="bgAcc1" presStyleIdx="2" presStyleCnt="4">
+        <dgm:presLayoutVars>
+          <dgm:bulletEnabled val="1"/>
+        </dgm:presLayoutVars>
+      </dgm:prSet>
+      <dgm:spPr/>
+    </dgm:pt>
+    <dgm:pt modelId="{66E11A54-F574-43DA-AFC1-3C02ACA8E386}" type="pres">
+      <dgm:prSet presAssocID="{78C74320-5B32-46DF-828D-41022E47FDE5}" presName="parentNode1" presStyleLbl="node1" presStyleIdx="2" presStyleCnt="4">
+        <dgm:presLayoutVars>
+          <dgm:chMax val="1"/>
+          <dgm:bulletEnabled val="1"/>
+        </dgm:presLayoutVars>
+      </dgm:prSet>
+      <dgm:spPr>
+        <a:xfrm>
+          <a:off x="6585554" y="2273593"/>
+          <a:ext cx="1875998" cy="746022"/>
+        </a:xfrm>
+        <a:prstGeom prst="roundRect">
+          <a:avLst>
+            <a:gd name="adj" fmla="val 10000"/>
+          </a:avLst>
+        </a:prstGeom>
+      </dgm:spPr>
+    </dgm:pt>
+    <dgm:pt modelId="{070B6C5B-232F-4ED3-A973-27CEBABDA569}" type="pres">
+      <dgm:prSet presAssocID="{78C74320-5B32-46DF-828D-41022E47FDE5}" presName="connSite1" presStyleCnt="0"/>
+      <dgm:spPr/>
+    </dgm:pt>
+    <dgm:pt modelId="{02B6B73E-8C69-48BD-828F-0B032471AE39}" type="pres">
+      <dgm:prSet presAssocID="{D51E9B47-86CF-4089-AC19-2A91991A429E}" presName="Name9" presStyleLbl="sibTrans2D1" presStyleIdx="2" presStyleCnt="3"/>
+      <dgm:spPr/>
+    </dgm:pt>
+    <dgm:pt modelId="{59CBA1C3-6EE5-4F29-BFF3-55B87110B033}" type="pres">
+      <dgm:prSet presAssocID="{E3AE4126-972B-4FCE-8E32-6B7427426AFD}" presName="composite2" presStyleCnt="0"/>
+      <dgm:spPr/>
+    </dgm:pt>
+    <dgm:pt modelId="{3060D50A-C4DC-4F47-9BAD-62DCEAD1CF41}" type="pres">
+      <dgm:prSet presAssocID="{E3AE4126-972B-4FCE-8E32-6B7427426AFD}" presName="dummyNode2" presStyleLbl="node1" presStyleIdx="2" presStyleCnt="4"/>
+      <dgm:spPr/>
+    </dgm:pt>
+    <dgm:pt modelId="{C7242E4C-E94E-4BAB-8481-F31E35DE1767}" type="pres">
+      <dgm:prSet presAssocID="{E3AE4126-972B-4FCE-8E32-6B7427426AFD}" presName="childNode2" presStyleLbl="bgAcc1" presStyleIdx="3" presStyleCnt="4">
+        <dgm:presLayoutVars>
+          <dgm:bulletEnabled val="1"/>
+        </dgm:presLayoutVars>
+      </dgm:prSet>
+      <dgm:spPr/>
+    </dgm:pt>
+    <dgm:pt modelId="{39CDFB0B-E04D-4860-BEF3-8D9A63475616}" type="pres">
+      <dgm:prSet presAssocID="{E3AE4126-972B-4FCE-8E32-6B7427426AFD}" presName="childNode2tx" presStyleLbl="bgAcc1" presStyleIdx="3" presStyleCnt="4">
+        <dgm:presLayoutVars>
+          <dgm:bulletEnabled val="1"/>
+        </dgm:presLayoutVars>
+      </dgm:prSet>
+      <dgm:spPr/>
+    </dgm:pt>
+    <dgm:pt modelId="{E879907D-2E5D-4A67-8871-BFCF1B9C3294}" type="pres">
+      <dgm:prSet presAssocID="{E3AE4126-972B-4FCE-8E32-6B7427426AFD}" presName="parentNode2" presStyleLbl="node1" presStyleIdx="3" presStyleCnt="4" custScaleX="114549">
+        <dgm:presLayoutVars>
+          <dgm:chMax val="0"/>
+          <dgm:bulletEnabled val="1"/>
+        </dgm:presLayoutVars>
+      </dgm:prSet>
+      <dgm:spPr>
+        <a:xfrm>
+          <a:off x="9513081" y="532873"/>
+          <a:ext cx="1875998" cy="746022"/>
+        </a:xfrm>
+        <a:prstGeom prst="roundRect">
+          <a:avLst>
+            <a:gd name="adj" fmla="val 10000"/>
+          </a:avLst>
+        </a:prstGeom>
+      </dgm:spPr>
+    </dgm:pt>
+    <dgm:pt modelId="{9FE47F6E-3D66-4013-8CBC-28DA875E5F62}" type="pres">
+      <dgm:prSet presAssocID="{E3AE4126-972B-4FCE-8E32-6B7427426AFD}" presName="connSite2" presStyleCnt="0"/>
+      <dgm:spPr/>
+    </dgm:pt>
+  </dgm:ptLst>
+  <dgm:cxnLst>
+    <dgm:cxn modelId="{660F0701-BFBB-490D-B88B-C2F60DCCE05F}" srcId="{68AE08E0-E415-47EB-B7FC-3EF1BC578E08}" destId="{6D034FA8-27AB-43C0-B510-4E4250910451}" srcOrd="1" destOrd="0" parTransId="{7733215E-8256-4432-B965-2690CB8937F7}" sibTransId="{0F1F0829-5BC4-4989-A603-77C27B721151}"/>
+    <dgm:cxn modelId="{16E8B701-7531-4B4A-8420-EB438C22F4DE}" type="presOf" srcId="{5267D894-6A5D-4862-A91D-4779597479F1}" destId="{39CDFB0B-E04D-4860-BEF3-8D9A63475616}" srcOrd="1" destOrd="3" presId="urn:microsoft.com/office/officeart/2005/8/layout/hProcess4"/>
+    <dgm:cxn modelId="{AF7FE506-C346-4A1B-A381-514B22D0EEE8}" srcId="{78C74320-5B32-46DF-828D-41022E47FDE5}" destId="{CE69B260-4ABC-4374-B592-705CF03E2DD7}" srcOrd="0" destOrd="0" parTransId="{54F96F45-F0CC-4FE6-B395-113BE6E9C2EB}" sibTransId="{B3F54B82-E994-470B-8329-870B66613670}"/>
+    <dgm:cxn modelId="{254EB909-73FB-47F1-9B36-FB613D3ABD31}" type="presOf" srcId="{9BD132F5-7AFD-4F05-81ED-B2F7824E7FDB}" destId="{2C20F079-56C9-4C84-BC2E-4A7A28D3AAA0}" srcOrd="0" destOrd="0" presId="urn:microsoft.com/office/officeart/2005/8/layout/hProcess4"/>
+    <dgm:cxn modelId="{05105C0C-3C64-414E-98C7-269902F48E78}" type="presOf" srcId="{C417123E-A71A-41CF-BCEB-7E6A759A8909}" destId="{39CDFB0B-E04D-4860-BEF3-8D9A63475616}" srcOrd="1" destOrd="1" presId="urn:microsoft.com/office/officeart/2005/8/layout/hProcess4"/>
+    <dgm:cxn modelId="{30AF8011-AB58-4D5F-95D0-8FCF5FC399C3}" type="presOf" srcId="{1A3558C8-FDB5-4285-AEFF-075D33878860}" destId="{10CB307D-1DF1-4F93-B860-621E5938C682}" srcOrd="1" destOrd="1" presId="urn:microsoft.com/office/officeart/2005/8/layout/hProcess4"/>
+    <dgm:cxn modelId="{CCE49C1A-3070-47B3-8217-436E3CEF10E7}" srcId="{A4603825-BB61-432A-8F06-5F970A9932C5}" destId="{26ADAB84-49BD-4B4C-8CC7-884DCCEE1D4D}" srcOrd="0" destOrd="0" parTransId="{238C1DA0-5B5D-470F-B66C-0BAD84CCC45B}" sibTransId="{D29A9490-82AB-40E6-BCE3-AE75C715B454}"/>
+    <dgm:cxn modelId="{C85E0B29-9E9B-472F-B954-48D066A0A228}" type="presOf" srcId="{26ADAB84-49BD-4B4C-8CC7-884DCCEE1D4D}" destId="{10CB307D-1DF1-4F93-B860-621E5938C682}" srcOrd="1" destOrd="0" presId="urn:microsoft.com/office/officeart/2005/8/layout/hProcess4"/>
+    <dgm:cxn modelId="{14CA242F-7A18-4E16-9FED-A9D6A2CD5C4D}" type="presOf" srcId="{38B4C010-EB7B-445F-9FAD-00B223B07B7F}" destId="{39CDFB0B-E04D-4860-BEF3-8D9A63475616}" srcOrd="1" destOrd="0" presId="urn:microsoft.com/office/officeart/2005/8/layout/hProcess4"/>
+    <dgm:cxn modelId="{A5C1403A-D344-4048-99B6-EFDF3CEED769}" type="presOf" srcId="{78C74320-5B32-46DF-828D-41022E47FDE5}" destId="{66E11A54-F574-43DA-AFC1-3C02ACA8E386}" srcOrd="0" destOrd="0" presId="urn:microsoft.com/office/officeart/2005/8/layout/hProcess4"/>
+    <dgm:cxn modelId="{1289BB3B-E367-49F9-86B2-41F060615F37}" srcId="{78C74320-5B32-46DF-828D-41022E47FDE5}" destId="{8D8FFD82-397A-4BA4-BF5A-49E5B6F48778}" srcOrd="1" destOrd="0" parTransId="{8526FE2D-EF46-4B56-9767-E9F2B79C3553}" sibTransId="{01A3205E-26FB-44A8-97DB-B8505E7BAA8F}"/>
+    <dgm:cxn modelId="{F8E8083C-B708-4803-828E-CF9FBB9633D1}" srcId="{E3AE4126-972B-4FCE-8E32-6B7427426AFD}" destId="{C417123E-A71A-41CF-BCEB-7E6A759A8909}" srcOrd="1" destOrd="0" parTransId="{5E4449EC-3C16-4980-BF27-390065A15994}" sibTransId="{D21C16B8-1D70-4636-A6E3-AB79237ECF46}"/>
+    <dgm:cxn modelId="{DA32E05D-F55E-44E4-B390-737727145649}" type="presOf" srcId="{1A3558C8-FDB5-4285-AEFF-075D33878860}" destId="{8E0BB412-C49E-4660-959C-24D3318DFF25}" srcOrd="0" destOrd="1" presId="urn:microsoft.com/office/officeart/2005/8/layout/hProcess4"/>
+    <dgm:cxn modelId="{7D4D4542-AE69-4C15-9A46-777A551AA0D5}" srcId="{68AE08E0-E415-47EB-B7FC-3EF1BC578E08}" destId="{A4603825-BB61-432A-8F06-5F970A9932C5}" srcOrd="0" destOrd="0" parTransId="{3A63D072-00E4-47CA-96CA-7288A74472A9}" sibTransId="{57370174-7EEF-4902-9395-7FFC0C927098}"/>
+    <dgm:cxn modelId="{EA9F5664-1ABE-43C1-AF55-0CF27E081D7D}" srcId="{68AE08E0-E415-47EB-B7FC-3EF1BC578E08}" destId="{78C74320-5B32-46DF-828D-41022E47FDE5}" srcOrd="2" destOrd="0" parTransId="{38B05AE1-E7B6-4917-A2FA-C9E355917F00}" sibTransId="{D51E9B47-86CF-4089-AC19-2A91991A429E}"/>
+    <dgm:cxn modelId="{349E2368-F4F0-4936-B136-FE6E26D14672}" srcId="{A4603825-BB61-432A-8F06-5F970A9932C5}" destId="{1A3558C8-FDB5-4285-AEFF-075D33878860}" srcOrd="1" destOrd="0" parTransId="{8A03750F-84D1-4271-B3F5-A2BFB40ED06B}" sibTransId="{FC13C2AC-6412-4473-B019-2391E231AA18}"/>
+    <dgm:cxn modelId="{8A86186E-6A05-44F1-B4B1-8C5D09F9A759}" type="presOf" srcId="{5267D894-6A5D-4862-A91D-4779597479F1}" destId="{C7242E4C-E94E-4BAB-8481-F31E35DE1767}" srcOrd="0" destOrd="3" presId="urn:microsoft.com/office/officeart/2005/8/layout/hProcess4"/>
+    <dgm:cxn modelId="{894E0B52-6D2C-4C24-B3F3-CAF3BABA0DEE}" type="presOf" srcId="{0F1F0829-5BC4-4989-A603-77C27B721151}" destId="{EF1C8752-DEEC-4845-B247-0EDC23791005}" srcOrd="0" destOrd="0" presId="urn:microsoft.com/office/officeart/2005/8/layout/hProcess4"/>
+    <dgm:cxn modelId="{91124275-D33A-4D07-8A1B-49E35B52BE73}" type="presOf" srcId="{38E83F26-3B23-45F8-9F09-0574D203F197}" destId="{C7242E4C-E94E-4BAB-8481-F31E35DE1767}" srcOrd="0" destOrd="2" presId="urn:microsoft.com/office/officeart/2005/8/layout/hProcess4"/>
+    <dgm:cxn modelId="{4630EAA3-E255-46D4-9FD1-A94911BB8A44}" type="presOf" srcId="{26ADAB84-49BD-4B4C-8CC7-884DCCEE1D4D}" destId="{8E0BB412-C49E-4660-959C-24D3318DFF25}" srcOrd="0" destOrd="0" presId="urn:microsoft.com/office/officeart/2005/8/layout/hProcess4"/>
+    <dgm:cxn modelId="{5BAE36A5-CEBA-4FD1-873B-F0394703F039}" type="presOf" srcId="{D51E9B47-86CF-4089-AC19-2A91991A429E}" destId="{02B6B73E-8C69-48BD-828F-0B032471AE39}" srcOrd="0" destOrd="0" presId="urn:microsoft.com/office/officeart/2005/8/layout/hProcess4"/>
+    <dgm:cxn modelId="{97CEFDA7-FD96-4424-B2B9-EA0DF05DC9F2}" type="presOf" srcId="{E3AE4126-972B-4FCE-8E32-6B7427426AFD}" destId="{E879907D-2E5D-4A67-8871-BFCF1B9C3294}" srcOrd="0" destOrd="0" presId="urn:microsoft.com/office/officeart/2005/8/layout/hProcess4"/>
+    <dgm:cxn modelId="{F16D27AF-39DE-49B8-BCE2-B3913F11D330}" type="presOf" srcId="{9BD132F5-7AFD-4F05-81ED-B2F7824E7FDB}" destId="{40FB52AE-ED4D-46F4-98DF-3F436DCF3FAF}" srcOrd="1" destOrd="0" presId="urn:microsoft.com/office/officeart/2005/8/layout/hProcess4"/>
+    <dgm:cxn modelId="{C61606BA-136E-4C13-9384-03E2E26DD698}" type="presOf" srcId="{8D8FFD82-397A-4BA4-BF5A-49E5B6F48778}" destId="{4545F89F-3FF4-4C0B-9524-C874BC20FEC8}" srcOrd="1" destOrd="1" presId="urn:microsoft.com/office/officeart/2005/8/layout/hProcess4"/>
+    <dgm:cxn modelId="{626D2BBA-4919-42B0-8A49-A486C177ED25}" type="presOf" srcId="{A4603825-BB61-432A-8F06-5F970A9932C5}" destId="{3D4C40A2-FA59-412F-85ED-322B85FF81C4}" srcOrd="0" destOrd="0" presId="urn:microsoft.com/office/officeart/2005/8/layout/hProcess4"/>
+    <dgm:cxn modelId="{54AE1DC2-F426-4A13-8624-0A3DCBC6A488}" type="presOf" srcId="{8D8FFD82-397A-4BA4-BF5A-49E5B6F48778}" destId="{55E5B907-DF99-4960-BDF7-3D722F040045}" srcOrd="0" destOrd="1" presId="urn:microsoft.com/office/officeart/2005/8/layout/hProcess4"/>
+    <dgm:cxn modelId="{DC6380C6-6157-48C3-A94C-21972D7ACC42}" srcId="{E3AE4126-972B-4FCE-8E32-6B7427426AFD}" destId="{5267D894-6A5D-4862-A91D-4779597479F1}" srcOrd="3" destOrd="0" parTransId="{7BF200E0-D09C-4162-A123-DD450B0F067D}" sibTransId="{D6AA030F-4B10-4572-8E6F-FF819787972B}"/>
+    <dgm:cxn modelId="{315381CE-304F-4B5A-A0A0-DACEF5926BFB}" srcId="{E3AE4126-972B-4FCE-8E32-6B7427426AFD}" destId="{38B4C010-EB7B-445F-9FAD-00B223B07B7F}" srcOrd="0" destOrd="0" parTransId="{BB3BA887-B327-4EF7-BDCB-B328852EBD9D}" sibTransId="{0747C354-05F4-419D-B86D-622FC3A3ADFF}"/>
+    <dgm:cxn modelId="{DC165BD0-3FA8-4F94-ACE6-55D07125FD86}" srcId="{68AE08E0-E415-47EB-B7FC-3EF1BC578E08}" destId="{E3AE4126-972B-4FCE-8E32-6B7427426AFD}" srcOrd="3" destOrd="0" parTransId="{87AD45CC-5729-43B8-AA05-D4330BE26533}" sibTransId="{C25DED55-B544-4E43-AEAA-99D5E91CB6C0}"/>
+    <dgm:cxn modelId="{FC1260D6-96E4-494A-B9D3-2B29FCD6F90C}" type="presOf" srcId="{57370174-7EEF-4902-9395-7FFC0C927098}" destId="{5747A82E-621E-47FA-9A6E-169F141239BE}" srcOrd="0" destOrd="0" presId="urn:microsoft.com/office/officeart/2005/8/layout/hProcess4"/>
+    <dgm:cxn modelId="{C7A8F1D6-2FD0-420A-A196-428F5661E5F4}" type="presOf" srcId="{CE69B260-4ABC-4374-B592-705CF03E2DD7}" destId="{55E5B907-DF99-4960-BDF7-3D722F040045}" srcOrd="0" destOrd="0" presId="urn:microsoft.com/office/officeart/2005/8/layout/hProcess4"/>
+    <dgm:cxn modelId="{FF6E76E6-6207-44D9-802C-29D18E5FD4AF}" type="presOf" srcId="{C417123E-A71A-41CF-BCEB-7E6A759A8909}" destId="{C7242E4C-E94E-4BAB-8481-F31E35DE1767}" srcOrd="0" destOrd="1" presId="urn:microsoft.com/office/officeart/2005/8/layout/hProcess4"/>
+    <dgm:cxn modelId="{5F858DE8-190B-4025-B590-C06E6D8A98EC}" type="presOf" srcId="{6D034FA8-27AB-43C0-B510-4E4250910451}" destId="{409C4896-621D-481E-9D12-B3FE06214E73}" srcOrd="0" destOrd="0" presId="urn:microsoft.com/office/officeart/2005/8/layout/hProcess4"/>
+    <dgm:cxn modelId="{11D391EA-6465-42CD-BC2D-5B5C9DA24186}" type="presOf" srcId="{38E83F26-3B23-45F8-9F09-0574D203F197}" destId="{39CDFB0B-E04D-4860-BEF3-8D9A63475616}" srcOrd="1" destOrd="2" presId="urn:microsoft.com/office/officeart/2005/8/layout/hProcess4"/>
+    <dgm:cxn modelId="{F31E0CEC-2534-49B0-9790-6D8134EA5AB2}" srcId="{6D034FA8-27AB-43C0-B510-4E4250910451}" destId="{9BD132F5-7AFD-4F05-81ED-B2F7824E7FDB}" srcOrd="0" destOrd="0" parTransId="{9A3EBB83-CE78-43A4-9AED-62A3E0FAC521}" sibTransId="{1902695C-A5A2-4C46-9668-0FCE3688F7E7}"/>
+    <dgm:cxn modelId="{CC9C2CF1-7545-4ABD-885C-22CBE452FD10}" type="presOf" srcId="{68AE08E0-E415-47EB-B7FC-3EF1BC578E08}" destId="{DA763B31-BFEE-4046-8F29-DD59F9768114}" srcOrd="0" destOrd="0" presId="urn:microsoft.com/office/officeart/2005/8/layout/hProcess4"/>
+    <dgm:cxn modelId="{94E039F1-58C5-47BF-B884-73D412D3ED03}" srcId="{E3AE4126-972B-4FCE-8E32-6B7427426AFD}" destId="{38E83F26-3B23-45F8-9F09-0574D203F197}" srcOrd="2" destOrd="0" parTransId="{FF314169-8100-4F9D-914F-B15E6CF1C248}" sibTransId="{368F4C60-41B5-403E-B79B-BD5C0F780985}"/>
+    <dgm:cxn modelId="{5C450EF3-DD82-4B86-865C-846AF9A5468F}" type="presOf" srcId="{38B4C010-EB7B-445F-9FAD-00B223B07B7F}" destId="{C7242E4C-E94E-4BAB-8481-F31E35DE1767}" srcOrd="0" destOrd="0" presId="urn:microsoft.com/office/officeart/2005/8/layout/hProcess4"/>
+    <dgm:cxn modelId="{ED6DD4F6-2E5D-40F5-B0B7-C7A350376266}" type="presOf" srcId="{CE69B260-4ABC-4374-B592-705CF03E2DD7}" destId="{4545F89F-3FF4-4C0B-9524-C874BC20FEC8}" srcOrd="1" destOrd="0" presId="urn:microsoft.com/office/officeart/2005/8/layout/hProcess4"/>
+    <dgm:cxn modelId="{DB6CFC15-630D-4838-A450-27B3C564ADC5}" type="presParOf" srcId="{DA763B31-BFEE-4046-8F29-DD59F9768114}" destId="{4B053F00-C9DE-406A-8058-212B8B719300}" srcOrd="0" destOrd="0" presId="urn:microsoft.com/office/officeart/2005/8/layout/hProcess4"/>
+    <dgm:cxn modelId="{5B94A6B9-3887-480F-8422-1096533805F1}" type="presParOf" srcId="{DA763B31-BFEE-4046-8F29-DD59F9768114}" destId="{6EEC0859-ACD2-420F-8634-4FE0E2B33711}" srcOrd="1" destOrd="0" presId="urn:microsoft.com/office/officeart/2005/8/layout/hProcess4"/>
+    <dgm:cxn modelId="{AE980253-50A7-49E2-8E2A-A4F85AB73670}" type="presParOf" srcId="{DA763B31-BFEE-4046-8F29-DD59F9768114}" destId="{4B902E43-2710-4696-B736-06ED62431789}" srcOrd="2" destOrd="0" presId="urn:microsoft.com/office/officeart/2005/8/layout/hProcess4"/>
+    <dgm:cxn modelId="{E0CEA5A6-DC7F-4117-85EC-AFB08A5D6980}" type="presParOf" srcId="{4B902E43-2710-4696-B736-06ED62431789}" destId="{8FDC4F3F-3473-4288-88DF-DE0665E7D368}" srcOrd="0" destOrd="0" presId="urn:microsoft.com/office/officeart/2005/8/layout/hProcess4"/>
+    <dgm:cxn modelId="{D397112C-C0A8-4931-8EAB-6F8BF9678A7B}" type="presParOf" srcId="{8FDC4F3F-3473-4288-88DF-DE0665E7D368}" destId="{69ED0891-D4FA-4CD8-BEC8-61354FACE6BB}" srcOrd="0" destOrd="0" presId="urn:microsoft.com/office/officeart/2005/8/layout/hProcess4"/>
+    <dgm:cxn modelId="{5711D514-8DF7-4D34-93CD-7A06094E0DA8}" type="presParOf" srcId="{8FDC4F3F-3473-4288-88DF-DE0665E7D368}" destId="{8E0BB412-C49E-4660-959C-24D3318DFF25}" srcOrd="1" destOrd="0" presId="urn:microsoft.com/office/officeart/2005/8/layout/hProcess4"/>
+    <dgm:cxn modelId="{C51D1A90-3D47-4455-A668-A57FE945E108}" type="presParOf" srcId="{8FDC4F3F-3473-4288-88DF-DE0665E7D368}" destId="{10CB307D-1DF1-4F93-B860-621E5938C682}" srcOrd="2" destOrd="0" presId="urn:microsoft.com/office/officeart/2005/8/layout/hProcess4"/>
+    <dgm:cxn modelId="{33490C82-18A0-40CF-9BB2-70C581542BB8}" type="presParOf" srcId="{8FDC4F3F-3473-4288-88DF-DE0665E7D368}" destId="{3D4C40A2-FA59-412F-85ED-322B85FF81C4}" srcOrd="3" destOrd="0" presId="urn:microsoft.com/office/officeart/2005/8/layout/hProcess4"/>
+    <dgm:cxn modelId="{C93AF754-7D92-4734-81F7-C96B0DBC09C7}" type="presParOf" srcId="{8FDC4F3F-3473-4288-88DF-DE0665E7D368}" destId="{46AC275E-858F-4DF4-A9FB-8F18609B2774}" srcOrd="4" destOrd="0" presId="urn:microsoft.com/office/officeart/2005/8/layout/hProcess4"/>
+    <dgm:cxn modelId="{0B2DBA9F-F692-4BC2-B7C2-3A44F5335EFA}" type="presParOf" srcId="{4B902E43-2710-4696-B736-06ED62431789}" destId="{5747A82E-621E-47FA-9A6E-169F141239BE}" srcOrd="1" destOrd="0" presId="urn:microsoft.com/office/officeart/2005/8/layout/hProcess4"/>
+    <dgm:cxn modelId="{1902BF67-C8CC-45A0-9C48-F4FEE64E79EB}" type="presParOf" srcId="{4B902E43-2710-4696-B736-06ED62431789}" destId="{83B21A97-205F-4D65-8A1E-9ED45C2D6BF5}" srcOrd="2" destOrd="0" presId="urn:microsoft.com/office/officeart/2005/8/layout/hProcess4"/>
+    <dgm:cxn modelId="{43CAEDDB-EC6C-4BCC-B6E0-6170A64DBBE1}" type="presParOf" srcId="{83B21A97-205F-4D65-8A1E-9ED45C2D6BF5}" destId="{577F5493-0AF4-4EE7-AE11-3153A87D5D45}" srcOrd="0" destOrd="0" presId="urn:microsoft.com/office/officeart/2005/8/layout/hProcess4"/>
+    <dgm:cxn modelId="{C930E867-CCDD-406C-B0EC-78933F28ABD6}" type="presParOf" srcId="{83B21A97-205F-4D65-8A1E-9ED45C2D6BF5}" destId="{2C20F079-56C9-4C84-BC2E-4A7A28D3AAA0}" srcOrd="1" destOrd="0" presId="urn:microsoft.com/office/officeart/2005/8/layout/hProcess4"/>
+    <dgm:cxn modelId="{72D40E3B-1EA4-4974-A9BE-A640813190B0}" type="presParOf" srcId="{83B21A97-205F-4D65-8A1E-9ED45C2D6BF5}" destId="{40FB52AE-ED4D-46F4-98DF-3F436DCF3FAF}" srcOrd="2" destOrd="0" presId="urn:microsoft.com/office/officeart/2005/8/layout/hProcess4"/>
+    <dgm:cxn modelId="{DE48DE63-2E79-4B77-961C-AC611B6933A1}" type="presParOf" srcId="{83B21A97-205F-4D65-8A1E-9ED45C2D6BF5}" destId="{409C4896-621D-481E-9D12-B3FE06214E73}" srcOrd="3" destOrd="0" presId="urn:microsoft.com/office/officeart/2005/8/layout/hProcess4"/>
+    <dgm:cxn modelId="{CA212C0D-7DDC-4C83-A0EA-8A2D4897CCFE}" type="presParOf" srcId="{83B21A97-205F-4D65-8A1E-9ED45C2D6BF5}" destId="{1791F461-F4C2-4580-BB51-8E7D9A68D531}" srcOrd="4" destOrd="0" presId="urn:microsoft.com/office/officeart/2005/8/layout/hProcess4"/>
+    <dgm:cxn modelId="{FB3FB15A-979E-41A5-B8AE-03DFF377F45B}" type="presParOf" srcId="{4B902E43-2710-4696-B736-06ED62431789}" destId="{EF1C8752-DEEC-4845-B247-0EDC23791005}" srcOrd="3" destOrd="0" presId="urn:microsoft.com/office/officeart/2005/8/layout/hProcess4"/>
+    <dgm:cxn modelId="{FC700039-3784-4DAF-AD5C-CE0D8825508D}" type="presParOf" srcId="{4B902E43-2710-4696-B736-06ED62431789}" destId="{1C133B21-A574-4968-ABE8-AB696359085F}" srcOrd="4" destOrd="0" presId="urn:microsoft.com/office/officeart/2005/8/layout/hProcess4"/>
+    <dgm:cxn modelId="{3FA3CF01-0DD5-4F9C-BBE0-F376276AF9E5}" type="presParOf" srcId="{1C133B21-A574-4968-ABE8-AB696359085F}" destId="{B4DB716E-1FDB-4303-92A5-0B8B94B2328E}" srcOrd="0" destOrd="0" presId="urn:microsoft.com/office/officeart/2005/8/layout/hProcess4"/>
+    <dgm:cxn modelId="{3A4D8CD8-3F6F-4D60-BD57-5E10AEA86D1A}" type="presParOf" srcId="{1C133B21-A574-4968-ABE8-AB696359085F}" destId="{55E5B907-DF99-4960-BDF7-3D722F040045}" srcOrd="1" destOrd="0" presId="urn:microsoft.com/office/officeart/2005/8/layout/hProcess4"/>
+    <dgm:cxn modelId="{4AB41924-6572-484B-91D9-63DF861E7F59}" type="presParOf" srcId="{1C133B21-A574-4968-ABE8-AB696359085F}" destId="{4545F89F-3FF4-4C0B-9524-C874BC20FEC8}" srcOrd="2" destOrd="0" presId="urn:microsoft.com/office/officeart/2005/8/layout/hProcess4"/>
+    <dgm:cxn modelId="{C2222B14-9532-46C5-9D10-D5F95CC24367}" type="presParOf" srcId="{1C133B21-A574-4968-ABE8-AB696359085F}" destId="{66E11A54-F574-43DA-AFC1-3C02ACA8E386}" srcOrd="3" destOrd="0" presId="urn:microsoft.com/office/officeart/2005/8/layout/hProcess4"/>
+    <dgm:cxn modelId="{433195A8-B398-4732-A136-EBF3E6509C51}" type="presParOf" srcId="{1C133B21-A574-4968-ABE8-AB696359085F}" destId="{070B6C5B-232F-4ED3-A973-27CEBABDA569}" srcOrd="4" destOrd="0" presId="urn:microsoft.com/office/officeart/2005/8/layout/hProcess4"/>
+    <dgm:cxn modelId="{8207B765-B878-485D-B700-78BF83FBC176}" type="presParOf" srcId="{4B902E43-2710-4696-B736-06ED62431789}" destId="{02B6B73E-8C69-48BD-828F-0B032471AE39}" srcOrd="5" destOrd="0" presId="urn:microsoft.com/office/officeart/2005/8/layout/hProcess4"/>
+    <dgm:cxn modelId="{ACCEB558-52A2-47CC-A5AF-69504D17B34A}" type="presParOf" srcId="{4B902E43-2710-4696-B736-06ED62431789}" destId="{59CBA1C3-6EE5-4F29-BFF3-55B87110B033}" srcOrd="6" destOrd="0" presId="urn:microsoft.com/office/officeart/2005/8/layout/hProcess4"/>
+    <dgm:cxn modelId="{DCCA0B9B-C89E-4024-8F07-434CC4BD6742}" type="presParOf" srcId="{59CBA1C3-6EE5-4F29-BFF3-55B87110B033}" destId="{3060D50A-C4DC-4F47-9BAD-62DCEAD1CF41}" srcOrd="0" destOrd="0" presId="urn:microsoft.com/office/officeart/2005/8/layout/hProcess4"/>
+    <dgm:cxn modelId="{9A1A1820-908D-4A23-B60E-E90FE106E087}" type="presParOf" srcId="{59CBA1C3-6EE5-4F29-BFF3-55B87110B033}" destId="{C7242E4C-E94E-4BAB-8481-F31E35DE1767}" srcOrd="1" destOrd="0" presId="urn:microsoft.com/office/officeart/2005/8/layout/hProcess4"/>
+    <dgm:cxn modelId="{E07B29EF-AAFA-41B3-8063-A1139624286A}" type="presParOf" srcId="{59CBA1C3-6EE5-4F29-BFF3-55B87110B033}" destId="{39CDFB0B-E04D-4860-BEF3-8D9A63475616}" srcOrd="2" destOrd="0" presId="urn:microsoft.com/office/officeart/2005/8/layout/hProcess4"/>
+    <dgm:cxn modelId="{BE021980-0D28-43C7-84E7-C52C66E6C2F6}" type="presParOf" srcId="{59CBA1C3-6EE5-4F29-BFF3-55B87110B033}" destId="{E879907D-2E5D-4A67-8871-BFCF1B9C3294}" srcOrd="3" destOrd="0" presId="urn:microsoft.com/office/officeart/2005/8/layout/hProcess4"/>
+    <dgm:cxn modelId="{DB70DE00-CDCC-4063-9A6C-C8D2DFB9E7F8}" type="presParOf" srcId="{59CBA1C3-6EE5-4F29-BFF3-55B87110B033}" destId="{9FE47F6E-3D66-4013-8CBC-28DA875E5F62}" srcOrd="4" destOrd="0" presId="urn:microsoft.com/office/officeart/2005/8/layout/hProcess4"/>
+  </dgm:cxnLst>
+  <dgm:bg/>
+  <dgm:whole/>
+  <dgm:extLst>
+    <a:ext uri="http://schemas.microsoft.com/office/drawing/2008/diagram">
+      <dsp:dataModelExt xmlns:dsp="http://schemas.microsoft.com/office/drawing/2008/diagram" relId="rId6" minVer="http://schemas.openxmlformats.org/drawingml/2006/diagram"/>
+    </a:ext>
+  </dgm:extLst>
+</dgm:dataModel>
+</file>
+
+<file path=ppt/diagrams/drawing1.xml><?xml version="1.0" encoding="utf-8"?>
+<dsp:drawing xmlns:dgm="http://schemas.openxmlformats.org/drawingml/2006/diagram" xmlns:dsp="http://schemas.microsoft.com/office/drawing/2008/diagram" xmlns:a="http://schemas.openxmlformats.org/drawingml/2006/main">
+  <dsp:spTree>
+    <dsp:nvGrpSpPr>
+      <dsp:cNvPr id="0" name=""/>
+      <dsp:cNvGrpSpPr/>
+    </dsp:nvGrpSpPr>
+    <dsp:grpSpPr/>
+    <dsp:sp modelId="{8E0BB412-C49E-4660-959C-24D3318DFF25}">
+      <dsp:nvSpPr>
+        <dsp:cNvPr id="0" name=""/>
+        <dsp:cNvSpPr/>
+      </dsp:nvSpPr>
+      <dsp:spPr>
+        <a:xfrm>
+          <a:off x="193264" y="905884"/>
+          <a:ext cx="2110498" cy="1740720"/>
+        </a:xfrm>
+        <a:prstGeom prst="roundRect">
+          <a:avLst>
+            <a:gd name="adj" fmla="val 10000"/>
+          </a:avLst>
+        </a:prstGeom>
+        <a:solidFill>
+          <a:schemeClr val="lt1">
+            <a:alpha val="90000"/>
+            <a:hueOff val="0"/>
+            <a:satOff val="0"/>
+            <a:lumOff val="0"/>
+            <a:alphaOff val="0"/>
+          </a:schemeClr>
+        </a:solidFill>
+        <a:ln w="12700" cap="flat" cmpd="sng" algn="ctr">
+          <a:solidFill>
+            <a:schemeClr val="accent1">
+              <a:hueOff val="0"/>
+              <a:satOff val="0"/>
+              <a:lumOff val="0"/>
+              <a:alphaOff val="0"/>
+            </a:schemeClr>
+          </a:solidFill>
+          <a:prstDash val="solid"/>
+          <a:miter lim="800000"/>
+        </a:ln>
+        <a:effectLst/>
+      </dsp:spPr>
+      <dsp:style>
+        <a:lnRef idx="2">
+          <a:scrgbClr r="0" g="0" b="0"/>
+        </a:lnRef>
+        <a:fillRef idx="1">
+          <a:scrgbClr r="0" g="0" b="0"/>
+        </a:fillRef>
+        <a:effectRef idx="0">
+          <a:scrgbClr r="0" g="0" b="0"/>
+        </a:effectRef>
+        <a:fontRef idx="minor"/>
+      </dsp:style>
+      <dsp:txBody>
+        <a:bodyPr spcFirstLastPara="0" vert="horz" wrap="square" lIns="22860" tIns="22860" rIns="22860" bIns="22860" numCol="1" spcCol="1270" anchor="t" anchorCtr="0">
+          <a:noAutofit/>
+        </a:bodyPr>
+        <a:lstStyle/>
+        <a:p>
+          <a:pPr marL="114300" lvl="1" indent="-114300" algn="l" defTabSz="533400">
+            <a:lnSpc>
+              <a:spcPct val="90000"/>
+            </a:lnSpc>
+            <a:spcBef>
+              <a:spcPct val="0"/>
+            </a:spcBef>
+            <a:spcAft>
+              <a:spcPct val="15000"/>
+            </a:spcAft>
+            <a:buChar char="•"/>
+          </a:pPr>
+          <a:r>
+            <a:rPr lang="en-US" sz="1200" kern="1200" dirty="0">
+              <a:latin typeface="Segoe UI" panose="020B0502040204020203" pitchFamily="34" charset="0"/>
+              <a:cs typeface="Segoe UI" panose="020B0502040204020203" pitchFamily="34" charset="0"/>
+            </a:rPr>
+            <a:t>Manage service instance</a:t>
+          </a:r>
+          <a:endParaRPr lang="en-BE" sz="1200" kern="1200" dirty="0">
+            <a:latin typeface="Segoe UI" panose="020B0502040204020203" pitchFamily="34" charset="0"/>
+            <a:cs typeface="Segoe UI" panose="020B0502040204020203" pitchFamily="34" charset="0"/>
+          </a:endParaRPr>
+        </a:p>
+        <a:p>
+          <a:pPr marL="114300" lvl="1" indent="-114300" algn="l" defTabSz="533400">
+            <a:lnSpc>
+              <a:spcPct val="90000"/>
+            </a:lnSpc>
+            <a:spcBef>
+              <a:spcPct val="0"/>
+            </a:spcBef>
+            <a:spcAft>
+              <a:spcPct val="15000"/>
+            </a:spcAft>
+            <a:buChar char="•"/>
+          </a:pPr>
+          <a:r>
+            <a:rPr lang="en-US" sz="1200" kern="1200" dirty="0">
+              <a:latin typeface="Segoe UI" panose="020B0502040204020203" pitchFamily="34" charset="0"/>
+              <a:cs typeface="Segoe UI" panose="020B0502040204020203" pitchFamily="34" charset="0"/>
+            </a:rPr>
+            <a:t>Manage self-hosted gateway</a:t>
+          </a:r>
+          <a:endParaRPr lang="en-BE" sz="1200" kern="1200" dirty="0">
+            <a:latin typeface="Segoe UI" panose="020B0502040204020203" pitchFamily="34" charset="0"/>
+            <a:cs typeface="Segoe UI" panose="020B0502040204020203" pitchFamily="34" charset="0"/>
+          </a:endParaRPr>
+        </a:p>
+      </dsp:txBody>
+      <dsp:txXfrm>
+        <a:off x="233323" y="945943"/>
+        <a:ext cx="2030380" cy="1287590"/>
+      </dsp:txXfrm>
+    </dsp:sp>
+    <dsp:sp modelId="{5747A82E-621E-47FA-9A6E-169F141239BE}">
+      <dsp:nvSpPr>
+        <dsp:cNvPr id="0" name=""/>
+        <dsp:cNvSpPr/>
+      </dsp:nvSpPr>
+      <dsp:spPr>
+        <a:xfrm>
+          <a:off x="1308850" y="1067412"/>
+          <a:ext cx="2701329" cy="2701329"/>
+        </a:xfrm>
+        <a:prstGeom prst="leftCircularArrow">
+          <a:avLst>
+            <a:gd name="adj1" fmla="val 4529"/>
+            <a:gd name="adj2" fmla="val 576064"/>
+            <a:gd name="adj3" fmla="val 2351575"/>
+            <a:gd name="adj4" fmla="val 9024489"/>
+            <a:gd name="adj5" fmla="val 5283"/>
+          </a:avLst>
+        </a:prstGeom>
+        <a:solidFill>
+          <a:schemeClr val="accent1">
+            <a:tint val="60000"/>
+            <a:hueOff val="0"/>
+            <a:satOff val="0"/>
+            <a:lumOff val="0"/>
+            <a:alphaOff val="0"/>
+          </a:schemeClr>
+        </a:solidFill>
+        <a:ln>
+          <a:noFill/>
+        </a:ln>
+        <a:effectLst/>
+      </dsp:spPr>
+      <dsp:style>
+        <a:lnRef idx="0">
+          <a:scrgbClr r="0" g="0" b="0"/>
+        </a:lnRef>
+        <a:fillRef idx="1">
+          <a:scrgbClr r="0" g="0" b="0"/>
+        </a:fillRef>
+        <a:effectRef idx="0">
+          <a:scrgbClr r="0" g="0" b="0"/>
+        </a:effectRef>
+        <a:fontRef idx="minor">
+          <a:schemeClr val="lt1"/>
+        </a:fontRef>
+      </dsp:style>
+    </dsp:sp>
+    <dsp:sp modelId="{3D4C40A2-FA59-412F-85ED-322B85FF81C4}">
+      <dsp:nvSpPr>
+        <dsp:cNvPr id="0" name=""/>
+        <dsp:cNvSpPr/>
+      </dsp:nvSpPr>
+      <dsp:spPr>
+        <a:xfrm>
+          <a:off x="662264" y="2273593"/>
+          <a:ext cx="1875998" cy="746022"/>
+        </a:xfrm>
+        <a:prstGeom prst="roundRect">
+          <a:avLst>
+            <a:gd name="adj" fmla="val 10000"/>
+          </a:avLst>
+        </a:prstGeom>
+        <a:solidFill>
+          <a:schemeClr val="accent1">
+            <a:hueOff val="0"/>
+            <a:satOff val="0"/>
+            <a:lumOff val="0"/>
+            <a:alphaOff val="0"/>
+          </a:schemeClr>
+        </a:solidFill>
+        <a:ln w="12700" cap="flat" cmpd="sng" algn="ctr">
+          <a:solidFill>
+            <a:schemeClr val="lt1">
+              <a:hueOff val="0"/>
+              <a:satOff val="0"/>
+              <a:lumOff val="0"/>
+              <a:alphaOff val="0"/>
+            </a:schemeClr>
+          </a:solidFill>
+          <a:prstDash val="solid"/>
+          <a:miter lim="800000"/>
+        </a:ln>
+        <a:effectLst/>
+      </dsp:spPr>
+      <dsp:style>
+        <a:lnRef idx="2">
+          <a:scrgbClr r="0" g="0" b="0"/>
+        </a:lnRef>
+        <a:fillRef idx="1">
+          <a:scrgbClr r="0" g="0" b="0"/>
+        </a:fillRef>
+        <a:effectRef idx="0">
+          <a:scrgbClr r="0" g="0" b="0"/>
+        </a:effectRef>
+        <a:fontRef idx="minor">
+          <a:schemeClr val="lt1"/>
+        </a:fontRef>
+      </dsp:style>
+      <dsp:txBody>
+        <a:bodyPr spcFirstLastPara="0" vert="horz" wrap="square" lIns="26670" tIns="17780" rIns="26670" bIns="17780" numCol="1" spcCol="1270" anchor="ctr" anchorCtr="0">
+          <a:noAutofit/>
+        </a:bodyPr>
+        <a:lstStyle/>
+        <a:p>
+          <a:pPr marL="0" lvl="0" indent="0" algn="ctr" defTabSz="622300">
+            <a:lnSpc>
+              <a:spcPct val="90000"/>
+            </a:lnSpc>
+            <a:spcBef>
+              <a:spcPct val="0"/>
+            </a:spcBef>
+            <a:spcAft>
+              <a:spcPct val="35000"/>
+            </a:spcAft>
+            <a:buNone/>
+          </a:pPr>
+          <a:r>
+            <a:rPr lang="en-US" sz="1400" kern="1200" dirty="0">
+              <a:latin typeface="Segoe UI Semibold" panose="020B0702040204020203" pitchFamily="34" charset="0"/>
+              <a:cs typeface="Segoe UI Semibold" panose="020B0702040204020203" pitchFamily="34" charset="0"/>
+            </a:rPr>
+            <a:t>Provision Azure API Management</a:t>
+          </a:r>
+          <a:endParaRPr lang="en-BE" sz="1400" kern="1200" dirty="0">
+            <a:latin typeface="Segoe UI Semibold" panose="020B0702040204020203" pitchFamily="34" charset="0"/>
+            <a:cs typeface="Segoe UI Semibold" panose="020B0702040204020203" pitchFamily="34" charset="0"/>
+          </a:endParaRPr>
+        </a:p>
+      </dsp:txBody>
+      <dsp:txXfrm>
+        <a:off x="684114" y="2295443"/>
+        <a:ext cx="1832298" cy="702322"/>
+      </dsp:txXfrm>
+    </dsp:sp>
+    <dsp:sp modelId="{2C20F079-56C9-4C84-BC2E-4A7A28D3AAA0}">
+      <dsp:nvSpPr>
+        <dsp:cNvPr id="0" name=""/>
+        <dsp:cNvSpPr/>
+      </dsp:nvSpPr>
+      <dsp:spPr>
+        <a:xfrm>
+          <a:off x="3120792" y="905884"/>
+          <a:ext cx="2110498" cy="1740720"/>
+        </a:xfrm>
+        <a:prstGeom prst="roundRect">
+          <a:avLst>
+            <a:gd name="adj" fmla="val 10000"/>
+          </a:avLst>
+        </a:prstGeom>
+        <a:solidFill>
+          <a:schemeClr val="lt1">
+            <a:alpha val="90000"/>
+            <a:hueOff val="0"/>
+            <a:satOff val="0"/>
+            <a:lumOff val="0"/>
+            <a:alphaOff val="0"/>
+          </a:schemeClr>
+        </a:solidFill>
+        <a:ln w="12700" cap="flat" cmpd="sng" algn="ctr">
+          <a:solidFill>
+            <a:schemeClr val="accent1">
+              <a:hueOff val="0"/>
+              <a:satOff val="0"/>
+              <a:lumOff val="0"/>
+              <a:alphaOff val="0"/>
+            </a:schemeClr>
+          </a:solidFill>
+          <a:prstDash val="solid"/>
+          <a:miter lim="800000"/>
+        </a:ln>
+        <a:effectLst/>
+      </dsp:spPr>
+      <dsp:style>
+        <a:lnRef idx="2">
+          <a:scrgbClr r="0" g="0" b="0"/>
+        </a:lnRef>
+        <a:fillRef idx="1">
+          <a:scrgbClr r="0" g="0" b="0"/>
+        </a:fillRef>
+        <a:effectRef idx="0">
+          <a:scrgbClr r="0" g="0" b="0"/>
+        </a:effectRef>
+        <a:fontRef idx="minor"/>
+      </dsp:style>
+      <dsp:txBody>
+        <a:bodyPr spcFirstLastPara="0" vert="horz" wrap="square" lIns="22860" tIns="22860" rIns="22860" bIns="22860" numCol="1" spcCol="1270" anchor="t" anchorCtr="0">
+          <a:noAutofit/>
+        </a:bodyPr>
+        <a:lstStyle/>
+        <a:p>
+          <a:pPr marL="114300" lvl="1" indent="-114300" algn="l" defTabSz="533400">
+            <a:lnSpc>
+              <a:spcPct val="90000"/>
+            </a:lnSpc>
+            <a:spcBef>
+              <a:spcPct val="0"/>
+            </a:spcBef>
+            <a:spcAft>
+              <a:spcPct val="15000"/>
+            </a:spcAft>
+            <a:buChar char="•"/>
+          </a:pPr>
+          <a:r>
+            <a:rPr lang="en-US" sz="1200" kern="1200" dirty="0">
+              <a:latin typeface="Segoe UI" panose="020B0502040204020203" pitchFamily="34" charset="0"/>
+              <a:cs typeface="Segoe UI" panose="020B0502040204020203" pitchFamily="34" charset="0"/>
+            </a:rPr>
+            <a:t>Manage Log Analytics</a:t>
+          </a:r>
+          <a:endParaRPr lang="en-BE" sz="1200" kern="1200" dirty="0">
+            <a:latin typeface="Segoe UI" panose="020B0502040204020203" pitchFamily="34" charset="0"/>
+            <a:cs typeface="Segoe UI" panose="020B0502040204020203" pitchFamily="34" charset="0"/>
+          </a:endParaRPr>
+        </a:p>
+      </dsp:txBody>
+      <dsp:txXfrm>
+        <a:off x="3160851" y="1318955"/>
+        <a:ext cx="2030380" cy="1287590"/>
+      </dsp:txXfrm>
+    </dsp:sp>
+    <dsp:sp modelId="{EF1C8752-DEEC-4845-B247-0EDC23791005}">
+      <dsp:nvSpPr>
+        <dsp:cNvPr id="0" name=""/>
+        <dsp:cNvSpPr/>
+      </dsp:nvSpPr>
+      <dsp:spPr>
+        <a:xfrm>
+          <a:off x="4218790" y="-284504"/>
+          <a:ext cx="2971004" cy="2971004"/>
+        </a:xfrm>
+        <a:prstGeom prst="circularArrow">
+          <a:avLst>
+            <a:gd name="adj1" fmla="val 4117"/>
+            <a:gd name="adj2" fmla="val 518538"/>
+            <a:gd name="adj3" fmla="val 19305951"/>
+            <a:gd name="adj4" fmla="val 12575511"/>
+            <a:gd name="adj5" fmla="val 4804"/>
+          </a:avLst>
+        </a:prstGeom>
+        <a:solidFill>
+          <a:schemeClr val="accent1">
+            <a:tint val="60000"/>
+            <a:hueOff val="0"/>
+            <a:satOff val="0"/>
+            <a:lumOff val="0"/>
+            <a:alphaOff val="0"/>
+          </a:schemeClr>
+        </a:solidFill>
+        <a:ln>
+          <a:noFill/>
+        </a:ln>
+        <a:effectLst/>
+      </dsp:spPr>
+      <dsp:style>
+        <a:lnRef idx="0">
+          <a:scrgbClr r="0" g="0" b="0"/>
+        </a:lnRef>
+        <a:fillRef idx="1">
+          <a:scrgbClr r="0" g="0" b="0"/>
+        </a:fillRef>
+        <a:effectRef idx="0">
+          <a:scrgbClr r="0" g="0" b="0"/>
+        </a:effectRef>
+        <a:fontRef idx="minor">
+          <a:schemeClr val="lt1"/>
+        </a:fontRef>
+      </dsp:style>
+    </dsp:sp>
+    <dsp:sp modelId="{409C4896-621D-481E-9D12-B3FE06214E73}">
+      <dsp:nvSpPr>
+        <dsp:cNvPr id="0" name=""/>
+        <dsp:cNvSpPr/>
+      </dsp:nvSpPr>
+      <dsp:spPr>
+        <a:xfrm>
+          <a:off x="3589791" y="532873"/>
+          <a:ext cx="1875998" cy="746022"/>
+        </a:xfrm>
+        <a:prstGeom prst="roundRect">
+          <a:avLst>
+            <a:gd name="adj" fmla="val 10000"/>
+          </a:avLst>
+        </a:prstGeom>
+        <a:solidFill>
+          <a:srgbClr val="4472C4">
+            <a:hueOff val="0"/>
+            <a:satOff val="0"/>
+            <a:lumOff val="0"/>
+            <a:alphaOff val="0"/>
+          </a:srgbClr>
+        </a:solidFill>
+        <a:ln w="12700" cap="flat" cmpd="sng" algn="ctr">
+          <a:solidFill>
+            <a:prstClr val="white">
+              <a:hueOff val="0"/>
+              <a:satOff val="0"/>
+              <a:lumOff val="0"/>
+              <a:alphaOff val="0"/>
+            </a:prstClr>
+          </a:solidFill>
+          <a:prstDash val="solid"/>
+          <a:miter lim="800000"/>
+        </a:ln>
+        <a:effectLst/>
+      </dsp:spPr>
+      <dsp:style>
+        <a:lnRef idx="2">
+          <a:scrgbClr r="0" g="0" b="0"/>
+        </a:lnRef>
+        <a:fillRef idx="1">
+          <a:scrgbClr r="0" g="0" b="0"/>
+        </a:fillRef>
+        <a:effectRef idx="0">
+          <a:scrgbClr r="0" g="0" b="0"/>
+        </a:effectRef>
+        <a:fontRef idx="minor">
+          <a:schemeClr val="lt1"/>
+        </a:fontRef>
+      </dsp:style>
+      <dsp:txBody>
+        <a:bodyPr spcFirstLastPara="0" vert="horz" wrap="square" lIns="28575" tIns="19050" rIns="28575" bIns="19050" numCol="1" spcCol="1270" anchor="ctr" anchorCtr="0">
+          <a:noAutofit/>
+        </a:bodyPr>
+        <a:lstStyle/>
+        <a:p>
+          <a:pPr marL="0" lvl="0" indent="0" algn="ctr" defTabSz="666750">
+            <a:lnSpc>
+              <a:spcPct val="90000"/>
+            </a:lnSpc>
+            <a:spcBef>
+              <a:spcPct val="0"/>
+            </a:spcBef>
+            <a:spcAft>
+              <a:spcPct val="35000"/>
+            </a:spcAft>
+            <a:buNone/>
+          </a:pPr>
+          <a:r>
+            <a:rPr lang="en-US" sz="1400" kern="1200" dirty="0">
+              <a:solidFill>
+                <a:prstClr val="white"/>
+              </a:solidFill>
+              <a:latin typeface="Segoe UI Semibold" panose="020B0702040204020203" pitchFamily="34" charset="0"/>
+              <a:ea typeface="+mn-ea"/>
+              <a:cs typeface="Segoe UI Semibold" panose="020B0702040204020203" pitchFamily="34" charset="0"/>
+            </a:rPr>
+            <a:t>Provision infrastructure</a:t>
+          </a:r>
+          <a:endParaRPr lang="en-BE" sz="1400" kern="1200" dirty="0">
+            <a:solidFill>
+              <a:prstClr val="white"/>
+            </a:solidFill>
+            <a:latin typeface="Segoe UI Semibold" panose="020B0702040204020203" pitchFamily="34" charset="0"/>
+            <a:ea typeface="+mn-ea"/>
+            <a:cs typeface="Segoe UI Semibold" panose="020B0702040204020203" pitchFamily="34" charset="0"/>
+          </a:endParaRPr>
+        </a:p>
+      </dsp:txBody>
+      <dsp:txXfrm>
+        <a:off x="3611641" y="554723"/>
+        <a:ext cx="1832298" cy="702322"/>
+      </dsp:txXfrm>
+    </dsp:sp>
+    <dsp:sp modelId="{55E5B907-DF99-4960-BDF7-3D722F040045}">
+      <dsp:nvSpPr>
+        <dsp:cNvPr id="0" name=""/>
+        <dsp:cNvSpPr/>
+      </dsp:nvSpPr>
+      <dsp:spPr>
+        <a:xfrm>
+          <a:off x="6048319" y="905884"/>
+          <a:ext cx="2110498" cy="1740720"/>
+        </a:xfrm>
+        <a:prstGeom prst="roundRect">
+          <a:avLst>
+            <a:gd name="adj" fmla="val 10000"/>
+          </a:avLst>
+        </a:prstGeom>
+        <a:solidFill>
+          <a:schemeClr val="lt1">
+            <a:alpha val="90000"/>
+            <a:hueOff val="0"/>
+            <a:satOff val="0"/>
+            <a:lumOff val="0"/>
+            <a:alphaOff val="0"/>
+          </a:schemeClr>
+        </a:solidFill>
+        <a:ln w="12700" cap="flat" cmpd="sng" algn="ctr">
+          <a:solidFill>
+            <a:schemeClr val="accent1">
+              <a:hueOff val="0"/>
+              <a:satOff val="0"/>
+              <a:lumOff val="0"/>
+              <a:alphaOff val="0"/>
+            </a:schemeClr>
+          </a:solidFill>
+          <a:prstDash val="solid"/>
+          <a:miter lim="800000"/>
+        </a:ln>
+        <a:effectLst/>
+      </dsp:spPr>
+      <dsp:style>
+        <a:lnRef idx="2">
+          <a:scrgbClr r="0" g="0" b="0"/>
+        </a:lnRef>
+        <a:fillRef idx="1">
+          <a:scrgbClr r="0" g="0" b="0"/>
+        </a:fillRef>
+        <a:effectRef idx="0">
+          <a:scrgbClr r="0" g="0" b="0"/>
+        </a:effectRef>
+        <a:fontRef idx="minor"/>
+      </dsp:style>
+      <dsp:txBody>
+        <a:bodyPr spcFirstLastPara="0" vert="horz" wrap="square" lIns="22860" tIns="22860" rIns="22860" bIns="22860" numCol="1" spcCol="1270" anchor="t" anchorCtr="0">
+          <a:noAutofit/>
+        </a:bodyPr>
+        <a:lstStyle/>
+        <a:p>
+          <a:pPr marL="114300" lvl="1" indent="-114300" algn="l" defTabSz="533400">
+            <a:lnSpc>
+              <a:spcPct val="90000"/>
+            </a:lnSpc>
+            <a:spcBef>
+              <a:spcPct val="0"/>
+            </a:spcBef>
+            <a:spcAft>
+              <a:spcPct val="15000"/>
+            </a:spcAft>
+            <a:buChar char="•"/>
+          </a:pPr>
+          <a:r>
+            <a:rPr lang="en-US" sz="1200" kern="1200" dirty="0">
+              <a:latin typeface="Segoe UI" panose="020B0502040204020203" pitchFamily="34" charset="0"/>
+              <a:cs typeface="Segoe UI" panose="020B0502040204020203" pitchFamily="34" charset="0"/>
+            </a:rPr>
+            <a:t>Deploy API gateway with external ingress</a:t>
+          </a:r>
+          <a:endParaRPr lang="en-BE" sz="1200" kern="1200" dirty="0">
+            <a:latin typeface="Segoe UI" panose="020B0502040204020203" pitchFamily="34" charset="0"/>
+            <a:cs typeface="Segoe UI" panose="020B0502040204020203" pitchFamily="34" charset="0"/>
+          </a:endParaRPr>
+        </a:p>
+        <a:p>
+          <a:pPr marL="114300" lvl="1" indent="-114300" algn="l" defTabSz="533400">
+            <a:lnSpc>
+              <a:spcPct val="90000"/>
+            </a:lnSpc>
+            <a:spcBef>
+              <a:spcPct val="0"/>
+            </a:spcBef>
+            <a:spcAft>
+              <a:spcPct val="15000"/>
+            </a:spcAft>
+            <a:buChar char="•"/>
+          </a:pPr>
+          <a:r>
+            <a:rPr lang="en-US" sz="1200" kern="1200" dirty="0">
+              <a:latin typeface="Segoe UI" panose="020B0502040204020203" pitchFamily="34" charset="0"/>
+              <a:cs typeface="Segoe UI" panose="020B0502040204020203" pitchFamily="34" charset="0"/>
+            </a:rPr>
+            <a:t>Deploy Bacon API with internal ingress</a:t>
+          </a:r>
+          <a:endParaRPr lang="en-BE" sz="1200" kern="1200" dirty="0">
+            <a:latin typeface="Segoe UI" panose="020B0502040204020203" pitchFamily="34" charset="0"/>
+            <a:cs typeface="Segoe UI" panose="020B0502040204020203" pitchFamily="34" charset="0"/>
+          </a:endParaRPr>
+        </a:p>
+      </dsp:txBody>
+      <dsp:txXfrm>
+        <a:off x="6088378" y="945943"/>
+        <a:ext cx="2030380" cy="1287590"/>
+      </dsp:txXfrm>
+    </dsp:sp>
+    <dsp:sp modelId="{02B6B73E-8C69-48BD-828F-0B032471AE39}">
+      <dsp:nvSpPr>
+        <dsp:cNvPr id="0" name=""/>
+        <dsp:cNvSpPr/>
+      </dsp:nvSpPr>
+      <dsp:spPr>
+        <a:xfrm>
+          <a:off x="7163905" y="1067412"/>
+          <a:ext cx="2701329" cy="2701329"/>
+        </a:xfrm>
+        <a:prstGeom prst="leftCircularArrow">
+          <a:avLst>
+            <a:gd name="adj1" fmla="val 4529"/>
+            <a:gd name="adj2" fmla="val 576064"/>
+            <a:gd name="adj3" fmla="val 2351575"/>
+            <a:gd name="adj4" fmla="val 9024489"/>
+            <a:gd name="adj5" fmla="val 5283"/>
+          </a:avLst>
+        </a:prstGeom>
+        <a:solidFill>
+          <a:schemeClr val="accent1">
+            <a:tint val="60000"/>
+            <a:hueOff val="0"/>
+            <a:satOff val="0"/>
+            <a:lumOff val="0"/>
+            <a:alphaOff val="0"/>
+          </a:schemeClr>
+        </a:solidFill>
+        <a:ln>
+          <a:noFill/>
+        </a:ln>
+        <a:effectLst/>
+      </dsp:spPr>
+      <dsp:style>
+        <a:lnRef idx="0">
+          <a:scrgbClr r="0" g="0" b="0"/>
+        </a:lnRef>
+        <a:fillRef idx="1">
+          <a:scrgbClr r="0" g="0" b="0"/>
+        </a:fillRef>
+        <a:effectRef idx="0">
+          <a:scrgbClr r="0" g="0" b="0"/>
+        </a:effectRef>
+        <a:fontRef idx="minor">
+          <a:schemeClr val="lt1"/>
+        </a:fontRef>
+      </dsp:style>
+    </dsp:sp>
+    <dsp:sp modelId="{66E11A54-F574-43DA-AFC1-3C02ACA8E386}">
+      <dsp:nvSpPr>
+        <dsp:cNvPr id="0" name=""/>
+        <dsp:cNvSpPr/>
+      </dsp:nvSpPr>
+      <dsp:spPr>
+        <a:xfrm>
+          <a:off x="6517319" y="2273593"/>
+          <a:ext cx="1875998" cy="746022"/>
+        </a:xfrm>
+        <a:prstGeom prst="roundRect">
+          <a:avLst>
+            <a:gd name="adj" fmla="val 10000"/>
+          </a:avLst>
+        </a:prstGeom>
+        <a:solidFill>
+          <a:srgbClr val="4472C4">
+            <a:hueOff val="0"/>
+            <a:satOff val="0"/>
+            <a:lumOff val="0"/>
+            <a:alphaOff val="0"/>
+          </a:srgbClr>
+        </a:solidFill>
+        <a:ln w="12700" cap="flat" cmpd="sng" algn="ctr">
+          <a:solidFill>
+            <a:prstClr val="white">
+              <a:hueOff val="0"/>
+              <a:satOff val="0"/>
+              <a:lumOff val="0"/>
+              <a:alphaOff val="0"/>
+            </a:prstClr>
+          </a:solidFill>
+          <a:prstDash val="solid"/>
+          <a:miter lim="800000"/>
+        </a:ln>
+        <a:effectLst/>
+      </dsp:spPr>
+      <dsp:style>
+        <a:lnRef idx="2">
+          <a:scrgbClr r="0" g="0" b="0"/>
+        </a:lnRef>
+        <a:fillRef idx="1">
+          <a:scrgbClr r="0" g="0" b="0"/>
+        </a:fillRef>
+        <a:effectRef idx="0">
+          <a:scrgbClr r="0" g="0" b="0"/>
+        </a:effectRef>
+        <a:fontRef idx="minor">
+          <a:schemeClr val="lt1"/>
+        </a:fontRef>
+      </dsp:style>
+      <dsp:txBody>
+        <a:bodyPr spcFirstLastPara="0" vert="horz" wrap="square" lIns="28575" tIns="19050" rIns="28575" bIns="19050" numCol="1" spcCol="1270" anchor="ctr" anchorCtr="0">
+          <a:noAutofit/>
+        </a:bodyPr>
+        <a:lstStyle/>
+        <a:p>
+          <a:pPr marL="0" lvl="0" indent="0" algn="ctr" defTabSz="666750">
+            <a:lnSpc>
+              <a:spcPct val="90000"/>
+            </a:lnSpc>
+            <a:spcBef>
+              <a:spcPct val="0"/>
+            </a:spcBef>
+            <a:spcAft>
+              <a:spcPct val="35000"/>
+            </a:spcAft>
+            <a:buNone/>
+          </a:pPr>
+          <a:r>
+            <a:rPr lang="en-US" sz="1400" kern="1200" dirty="0">
+              <a:solidFill>
+                <a:prstClr val="white"/>
+              </a:solidFill>
+              <a:latin typeface="Segoe UI Semibold" panose="020B0702040204020203" pitchFamily="34" charset="0"/>
+              <a:ea typeface="+mn-ea"/>
+              <a:cs typeface="Segoe UI Semibold" panose="020B0702040204020203" pitchFamily="34" charset="0"/>
+            </a:rPr>
+            <a:t>Deploy Apps on Azure Container Apps</a:t>
+          </a:r>
+          <a:endParaRPr lang="en-BE" sz="1400" kern="1200" dirty="0">
+            <a:solidFill>
+              <a:prstClr val="white"/>
+            </a:solidFill>
+            <a:latin typeface="Segoe UI Semibold" panose="020B0702040204020203" pitchFamily="34" charset="0"/>
+            <a:ea typeface="+mn-ea"/>
+            <a:cs typeface="Segoe UI Semibold" panose="020B0702040204020203" pitchFamily="34" charset="0"/>
+          </a:endParaRPr>
+        </a:p>
+      </dsp:txBody>
+      <dsp:txXfrm>
+        <a:off x="6539169" y="2295443"/>
+        <a:ext cx="1832298" cy="702322"/>
+      </dsp:txXfrm>
+    </dsp:sp>
+    <dsp:sp modelId="{C7242E4C-E94E-4BAB-8481-F31E35DE1767}">
+      <dsp:nvSpPr>
+        <dsp:cNvPr id="0" name=""/>
+        <dsp:cNvSpPr/>
+      </dsp:nvSpPr>
+      <dsp:spPr>
+        <a:xfrm>
+          <a:off x="8975847" y="905884"/>
+          <a:ext cx="2110498" cy="1740720"/>
+        </a:xfrm>
+        <a:prstGeom prst="roundRect">
+          <a:avLst>
+            <a:gd name="adj" fmla="val 10000"/>
+          </a:avLst>
+        </a:prstGeom>
+        <a:solidFill>
+          <a:schemeClr val="lt1">
+            <a:alpha val="90000"/>
+            <a:hueOff val="0"/>
+            <a:satOff val="0"/>
+            <a:lumOff val="0"/>
+            <a:alphaOff val="0"/>
+          </a:schemeClr>
+        </a:solidFill>
+        <a:ln w="12700" cap="flat" cmpd="sng" algn="ctr">
+          <a:solidFill>
+            <a:schemeClr val="accent1">
+              <a:hueOff val="0"/>
+              <a:satOff val="0"/>
+              <a:lumOff val="0"/>
+              <a:alphaOff val="0"/>
+            </a:schemeClr>
+          </a:solidFill>
+          <a:prstDash val="solid"/>
+          <a:miter lim="800000"/>
+        </a:ln>
+        <a:effectLst/>
+      </dsp:spPr>
+      <dsp:style>
+        <a:lnRef idx="2">
+          <a:scrgbClr r="0" g="0" b="0"/>
+        </a:lnRef>
+        <a:fillRef idx="1">
+          <a:scrgbClr r="0" g="0" b="0"/>
+        </a:fillRef>
+        <a:effectRef idx="0">
+          <a:scrgbClr r="0" g="0" b="0"/>
+        </a:effectRef>
+        <a:fontRef idx="minor"/>
+      </dsp:style>
+      <dsp:txBody>
+        <a:bodyPr spcFirstLastPara="0" vert="horz" wrap="square" lIns="22860" tIns="22860" rIns="22860" bIns="22860" numCol="1" spcCol="1270" anchor="t" anchorCtr="0">
+          <a:noAutofit/>
+        </a:bodyPr>
+        <a:lstStyle/>
+        <a:p>
+          <a:pPr marL="114300" lvl="1" indent="-114300" algn="l" defTabSz="533400">
+            <a:lnSpc>
+              <a:spcPct val="90000"/>
+            </a:lnSpc>
+            <a:spcBef>
+              <a:spcPct val="0"/>
+            </a:spcBef>
+            <a:spcAft>
+              <a:spcPct val="15000"/>
+            </a:spcAft>
+            <a:buChar char="•"/>
+          </a:pPr>
+          <a:r>
+            <a:rPr lang="en-US" sz="1200" kern="1200" dirty="0">
+              <a:latin typeface="Segoe UI" panose="020B0502040204020203" pitchFamily="34" charset="0"/>
+              <a:cs typeface="Segoe UI" panose="020B0502040204020203" pitchFamily="34" charset="0"/>
+            </a:rPr>
+            <a:t>Manage Bacon API</a:t>
+          </a:r>
+          <a:endParaRPr lang="en-BE" sz="1200" kern="1200" dirty="0">
+            <a:latin typeface="Segoe UI" panose="020B0502040204020203" pitchFamily="34" charset="0"/>
+            <a:cs typeface="Segoe UI" panose="020B0502040204020203" pitchFamily="34" charset="0"/>
+          </a:endParaRPr>
+        </a:p>
+        <a:p>
+          <a:pPr marL="114300" lvl="1" indent="-114300" algn="l" defTabSz="533400">
+            <a:lnSpc>
+              <a:spcPct val="90000"/>
+            </a:lnSpc>
+            <a:spcBef>
+              <a:spcPct val="0"/>
+            </a:spcBef>
+            <a:spcAft>
+              <a:spcPct val="15000"/>
+            </a:spcAft>
+            <a:buChar char="•"/>
+          </a:pPr>
+          <a:r>
+            <a:rPr lang="en-US" sz="1200" kern="1200" dirty="0">
+              <a:latin typeface="Segoe UI" panose="020B0502040204020203" pitchFamily="34" charset="0"/>
+              <a:cs typeface="Segoe UI" panose="020B0502040204020203" pitchFamily="34" charset="0"/>
+            </a:rPr>
+            <a:t>Manage Bacon backend</a:t>
+          </a:r>
+          <a:endParaRPr lang="en-BE" sz="1200" kern="1200" dirty="0">
+            <a:latin typeface="Segoe UI" panose="020B0502040204020203" pitchFamily="34" charset="0"/>
+            <a:cs typeface="Segoe UI" panose="020B0502040204020203" pitchFamily="34" charset="0"/>
+          </a:endParaRPr>
+        </a:p>
+        <a:p>
+          <a:pPr marL="114300" lvl="1" indent="-114300" algn="l" defTabSz="533400">
+            <a:lnSpc>
+              <a:spcPct val="90000"/>
+            </a:lnSpc>
+            <a:spcBef>
+              <a:spcPct val="0"/>
+            </a:spcBef>
+            <a:spcAft>
+              <a:spcPct val="15000"/>
+            </a:spcAft>
+            <a:buChar char="•"/>
+          </a:pPr>
+          <a:r>
+            <a:rPr lang="en-US" sz="1200" kern="1200" dirty="0">
+              <a:latin typeface="Segoe UI" panose="020B0502040204020203" pitchFamily="34" charset="0"/>
+              <a:cs typeface="Segoe UI" panose="020B0502040204020203" pitchFamily="34" charset="0"/>
+            </a:rPr>
+            <a:t>Use policy to set backend for self-hosted gateway</a:t>
+          </a:r>
+          <a:endParaRPr lang="en-BE" sz="1200" kern="1200" dirty="0">
+            <a:latin typeface="Segoe UI" panose="020B0502040204020203" pitchFamily="34" charset="0"/>
+            <a:cs typeface="Segoe UI" panose="020B0502040204020203" pitchFamily="34" charset="0"/>
+          </a:endParaRPr>
+        </a:p>
+        <a:p>
+          <a:pPr marL="114300" lvl="1" indent="-114300" algn="l" defTabSz="533400">
+            <a:lnSpc>
+              <a:spcPct val="90000"/>
+            </a:lnSpc>
+            <a:spcBef>
+              <a:spcPct val="0"/>
+            </a:spcBef>
+            <a:spcAft>
+              <a:spcPct val="15000"/>
+            </a:spcAft>
+            <a:buChar char="•"/>
+          </a:pPr>
+          <a:r>
+            <a:rPr lang="en-US" sz="1200" kern="1200" dirty="0">
+              <a:latin typeface="Segoe UI" panose="020B0502040204020203" pitchFamily="34" charset="0"/>
+              <a:cs typeface="Segoe UI" panose="020B0502040204020203" pitchFamily="34" charset="0"/>
+            </a:rPr>
+            <a:t>Expose Bacon API on self-hosted gateway</a:t>
+          </a:r>
+          <a:endParaRPr lang="en-BE" sz="1200" kern="1200" dirty="0">
+            <a:latin typeface="Segoe UI" panose="020B0502040204020203" pitchFamily="34" charset="0"/>
+            <a:cs typeface="Segoe UI" panose="020B0502040204020203" pitchFamily="34" charset="0"/>
+          </a:endParaRPr>
+        </a:p>
+      </dsp:txBody>
+      <dsp:txXfrm>
+        <a:off x="9015906" y="1318955"/>
+        <a:ext cx="2030380" cy="1287590"/>
+      </dsp:txXfrm>
+    </dsp:sp>
+    <dsp:sp modelId="{E879907D-2E5D-4A67-8871-BFCF1B9C3294}">
+      <dsp:nvSpPr>
+        <dsp:cNvPr id="0" name=""/>
+        <dsp:cNvSpPr/>
+      </dsp:nvSpPr>
+      <dsp:spPr>
+        <a:xfrm>
+          <a:off x="9308377" y="532873"/>
+          <a:ext cx="2148938" cy="746022"/>
+        </a:xfrm>
+        <a:prstGeom prst="roundRect">
+          <a:avLst>
+            <a:gd name="adj" fmla="val 10000"/>
+          </a:avLst>
+        </a:prstGeom>
+        <a:solidFill>
+          <a:srgbClr val="4472C4">
+            <a:hueOff val="0"/>
+            <a:satOff val="0"/>
+            <a:lumOff val="0"/>
+            <a:alphaOff val="0"/>
+          </a:srgbClr>
+        </a:solidFill>
+        <a:ln w="12700" cap="flat" cmpd="sng" algn="ctr">
+          <a:solidFill>
+            <a:prstClr val="white">
+              <a:hueOff val="0"/>
+              <a:satOff val="0"/>
+              <a:lumOff val="0"/>
+              <a:alphaOff val="0"/>
+            </a:prstClr>
+          </a:solidFill>
+          <a:prstDash val="solid"/>
+          <a:miter lim="800000"/>
+        </a:ln>
+        <a:effectLst/>
+      </dsp:spPr>
+      <dsp:style>
+        <a:lnRef idx="2">
+          <a:scrgbClr r="0" g="0" b="0"/>
+        </a:lnRef>
+        <a:fillRef idx="1">
+          <a:scrgbClr r="0" g="0" b="0"/>
+        </a:fillRef>
+        <a:effectRef idx="0">
+          <a:scrgbClr r="0" g="0" b="0"/>
+        </a:effectRef>
+        <a:fontRef idx="minor">
+          <a:schemeClr val="lt1"/>
+        </a:fontRef>
+      </dsp:style>
+      <dsp:txBody>
+        <a:bodyPr spcFirstLastPara="0" vert="horz" wrap="square" lIns="28575" tIns="19050" rIns="28575" bIns="19050" numCol="1" spcCol="1270" anchor="ctr" anchorCtr="0">
+          <a:noAutofit/>
+        </a:bodyPr>
+        <a:lstStyle/>
+        <a:p>
+          <a:pPr marL="0" lvl="0" indent="0" algn="ctr" defTabSz="666750">
+            <a:lnSpc>
+              <a:spcPct val="90000"/>
+            </a:lnSpc>
+            <a:spcBef>
+              <a:spcPct val="0"/>
+            </a:spcBef>
+            <a:spcAft>
+              <a:spcPct val="35000"/>
+            </a:spcAft>
+            <a:buNone/>
+          </a:pPr>
+          <a:r>
+            <a:rPr lang="en-US" sz="1400" kern="1200" dirty="0">
+              <a:solidFill>
+                <a:prstClr val="white"/>
+              </a:solidFill>
+              <a:latin typeface="Segoe UI Semibold" panose="020B0702040204020203" pitchFamily="34" charset="0"/>
+              <a:ea typeface="+mn-ea"/>
+              <a:cs typeface="Segoe UI Semibold" panose="020B0702040204020203" pitchFamily="34" charset="0"/>
+            </a:rPr>
+            <a:t>Integrate container workloads with</a:t>
+          </a:r>
+          <a:br>
+            <a:rPr lang="en-US" sz="1400" kern="1200" dirty="0">
+              <a:solidFill>
+                <a:prstClr val="white"/>
+              </a:solidFill>
+              <a:latin typeface="Segoe UI Semibold" panose="020B0702040204020203" pitchFamily="34" charset="0"/>
+              <a:ea typeface="+mn-ea"/>
+              <a:cs typeface="Segoe UI Semibold" panose="020B0702040204020203" pitchFamily="34" charset="0"/>
+            </a:rPr>
+          </a:br>
+          <a:r>
+            <a:rPr lang="en-US" sz="1400" kern="1200" dirty="0">
+              <a:solidFill>
+                <a:prstClr val="white"/>
+              </a:solidFill>
+              <a:latin typeface="Segoe UI Semibold" panose="020B0702040204020203" pitchFamily="34" charset="0"/>
+              <a:ea typeface="+mn-ea"/>
+              <a:cs typeface="Segoe UI Semibold" panose="020B0702040204020203" pitchFamily="34" charset="0"/>
+            </a:rPr>
+            <a:t>Azure API Management</a:t>
+          </a:r>
+          <a:endParaRPr lang="en-BE" sz="1400" kern="1200" dirty="0">
+            <a:solidFill>
+              <a:prstClr val="white"/>
+            </a:solidFill>
+            <a:latin typeface="Segoe UI Semibold" panose="020B0702040204020203" pitchFamily="34" charset="0"/>
+            <a:ea typeface="+mn-ea"/>
+            <a:cs typeface="Segoe UI Semibold" panose="020B0702040204020203" pitchFamily="34" charset="0"/>
+          </a:endParaRPr>
+        </a:p>
+      </dsp:txBody>
+      <dsp:txXfrm>
+        <a:off x="9330227" y="554723"/>
+        <a:ext cx="2105238" cy="702322"/>
+      </dsp:txXfrm>
+    </dsp:sp>
+  </dsp:spTree>
+</dsp:drawing>
+</file>
+
+<file path=ppt/diagrams/layout1.xml><?xml version="1.0" encoding="utf-8"?>
+<dgm:layoutDef xmlns:dgm="http://schemas.openxmlformats.org/drawingml/2006/diagram" xmlns:a="http://schemas.openxmlformats.org/drawingml/2006/main" uniqueId="urn:microsoft.com/office/officeart/2005/8/layout/hProcess4">
+  <dgm:title val=""/>
+  <dgm:desc val=""/>
+  <dgm:catLst>
+    <dgm:cat type="process" pri="4000"/>
+  </dgm:catLst>
+  <dgm:sampData>
+    <dgm:dataModel>
+      <dgm:ptLst>
+        <dgm:pt modelId="0" type="doc"/>
+        <dgm:pt modelId="1">
+          <dgm:prSet phldr="1"/>
+        </dgm:pt>
+        <dgm:pt modelId="11">
+          <dgm:prSet phldr="1"/>
+        </dgm:pt>
+        <dgm:pt modelId="12">
+          <dgm:prSet phldr="1"/>
+        </dgm:pt>
+        <dgm:pt modelId="2">
+          <dgm:prSet phldr="1"/>
+        </dgm:pt>
+        <dgm:pt modelId="21">
+          <dgm:prSet phldr="1"/>
+        </dgm:pt>
+        <dgm:pt modelId="22">
+          <dgm:prSet phldr="1"/>
+        </dgm:pt>
+        <dgm:pt modelId="3">
+          <dgm:prSet phldr="1"/>
+        </dgm:pt>
+        <dgm:pt modelId="31">
+          <dgm:prSet phldr="1"/>
+        </dgm:pt>
+        <dgm:pt modelId="32">
+          <dgm:prSet phldr="1"/>
+        </dgm:pt>
+      </dgm:ptLst>
+      <dgm:cxnLst>
+        <dgm:cxn modelId="4" srcId="0" destId="1" srcOrd="0" destOrd="0"/>
+        <dgm:cxn modelId="5" srcId="0" destId="2" srcOrd="1" destOrd="0"/>
+        <dgm:cxn modelId="6" srcId="0" destId="3" srcOrd="2" destOrd="0"/>
+        <dgm:cxn modelId="13" srcId="1" destId="11" srcOrd="0" destOrd="0"/>
+        <dgm:cxn modelId="14" srcId="1" destId="12" srcOrd="1" destOrd="0"/>
+        <dgm:cxn modelId="23" srcId="2" destId="21" srcOrd="0" destOrd="0"/>
+        <dgm:cxn modelId="24" srcId="2" destId="22" srcOrd="1" destOrd="0"/>
+        <dgm:cxn modelId="33" srcId="3" destId="31" srcOrd="0" destOrd="0"/>
+        <dgm:cxn modelId="34" srcId="3" destId="32" srcOrd="1" destOrd="0"/>
+      </dgm:cxnLst>
+      <dgm:bg/>
+      <dgm:whole/>
+    </dgm:dataModel>
+  </dgm:sampData>
+  <dgm:styleData>
+    <dgm:dataModel>
+      <dgm:ptLst>
+        <dgm:pt modelId="0" type="doc"/>
+        <dgm:pt modelId="1"/>
+        <dgm:pt modelId="11"/>
+        <dgm:pt modelId="2"/>
+        <dgm:pt modelId="21"/>
+      </dgm:ptLst>
+      <dgm:cxnLst>
+        <dgm:cxn modelId="4" srcId="0" destId="1" srcOrd="0" destOrd="0"/>
+        <dgm:cxn modelId="5" srcId="0" destId="2" srcOrd="1" destOrd="0"/>
+        <dgm:cxn modelId="13" srcId="1" destId="11" srcOrd="0" destOrd="0"/>
+        <dgm:cxn modelId="23" srcId="2" destId="21" srcOrd="0" destOrd="0"/>
+      </dgm:cxnLst>
+      <dgm:bg/>
+      <dgm:whole/>
+    </dgm:dataModel>
+  </dgm:styleData>
+  <dgm:clrData>
+    <dgm:dataModel>
+      <dgm:ptLst>
+        <dgm:pt modelId="0" type="doc"/>
+        <dgm:pt modelId="1"/>
+        <dgm:pt modelId="11"/>
+        <dgm:pt modelId="2"/>
+        <dgm:pt modelId="21"/>
+        <dgm:pt modelId="3"/>
+        <dgm:pt modelId="31"/>
+        <dgm:pt modelId="4"/>
+        <dgm:pt modelId="41"/>
+      </dgm:ptLst>
+      <dgm:cxnLst>
+        <dgm:cxn modelId="5" srcId="0" destId="1" srcOrd="0" destOrd="0"/>
+        <dgm:cxn modelId="6" srcId="0" destId="2" srcOrd="1" destOrd="0"/>
+        <dgm:cxn modelId="7" srcId="0" destId="3" srcOrd="2" destOrd="0"/>
+        <dgm:cxn modelId="8" srcId="0" destId="4" srcOrd="3" destOrd="0"/>
+        <dgm:cxn modelId="13" srcId="1" destId="11" srcOrd="0" destOrd="0"/>
+        <dgm:cxn modelId="23" srcId="2" destId="21" srcOrd="0" destOrd="0"/>
+        <dgm:cxn modelId="33" srcId="3" destId="31" srcOrd="0" destOrd="0"/>
+        <dgm:cxn modelId="43" srcId="4" destId="41" srcOrd="0" destOrd="0"/>
+      </dgm:cxnLst>
+      <dgm:bg/>
+      <dgm:whole/>
+    </dgm:dataModel>
+  </dgm:clrData>
+  <dgm:layoutNode name="Name0">
+    <dgm:varLst>
+      <dgm:dir/>
+      <dgm:animLvl val="lvl"/>
+      <dgm:resizeHandles val="exact"/>
+    </dgm:varLst>
+    <dgm:alg type="composite"/>
+    <dgm:shape xmlns:r="http://schemas.openxmlformats.org/officeDocument/2006/relationships" r:blip="">
+      <dgm:adjLst/>
+    </dgm:shape>
+    <dgm:presOf/>
+    <dgm:constrLst>
+      <dgm:constr type="w" for="ch" forName="tSp" refType="w"/>
+      <dgm:constr type="h" for="ch" forName="tSp" refType="h" fact="0.15"/>
+      <dgm:constr type="l" for="ch" forName="tSp"/>
+      <dgm:constr type="t" for="ch" forName="tSp"/>
+      <dgm:constr type="w" for="ch" forName="bSp" refType="w"/>
+      <dgm:constr type="h" for="ch" forName="bSp" refType="h" fact="0.15"/>
+      <dgm:constr type="l" for="ch" forName="bSp"/>
+      <dgm:constr type="t" for="ch" forName="bSp" refType="h" fact="0.85"/>
+      <dgm:constr type="w" for="ch" forName="process" refType="w"/>
+      <dgm:constr type="h" for="ch" forName="process" refType="h" fact="0.7"/>
+      <dgm:constr type="l" for="ch" forName="process"/>
+      <dgm:constr type="t" for="ch" forName="process" refType="h" fact="0.15"/>
+    </dgm:constrLst>
+    <dgm:ruleLst/>
+    <dgm:layoutNode name="tSp">
+      <dgm:alg type="sp"/>
+      <dgm:shape xmlns:r="http://schemas.openxmlformats.org/officeDocument/2006/relationships" r:blip="">
+        <dgm:adjLst/>
+      </dgm:shape>
+      <dgm:presOf/>
+      <dgm:constrLst/>
+      <dgm:ruleLst/>
+    </dgm:layoutNode>
+    <dgm:layoutNode name="bSp">
+      <dgm:alg type="sp"/>
+      <dgm:shape xmlns:r="http://schemas.openxmlformats.org/officeDocument/2006/relationships" r:blip="">
+        <dgm:adjLst/>
+      </dgm:shape>
+      <dgm:presOf/>
+      <dgm:constrLst/>
+      <dgm:ruleLst/>
+    </dgm:layoutNode>
+    <dgm:layoutNode name="process">
+      <dgm:choose name="Name1">
+        <dgm:if name="Name2" func="var" arg="dir" op="equ" val="norm">
+          <dgm:alg type="lin">
+            <dgm:param type="linDir" val="fromL"/>
+          </dgm:alg>
+        </dgm:if>
+        <dgm:else name="Name3">
+          <dgm:alg type="lin">
+            <dgm:param type="linDir" val="fromR"/>
+          </dgm:alg>
+        </dgm:else>
+      </dgm:choose>
+      <dgm:shape xmlns:r="http://schemas.openxmlformats.org/officeDocument/2006/relationships" r:blip="">
+        <dgm:adjLst/>
+      </dgm:shape>
+      <dgm:presOf/>
+      <dgm:constrLst>
+        <dgm:constr type="w" for="ch" forName="composite1" refType="w"/>
+        <dgm:constr type="w" for="ch" forName="composite2" refType="w" refFor="ch" refForName="composite1" op="equ"/>
+        <dgm:constr type="h" for="ch" forName="composite1" refType="h"/>
+        <dgm:constr type="h" for="ch" forName="composite2" refType="h" refFor="ch" refForName="composite1" op="equ"/>
+        <dgm:constr type="primFontSz" for="des" forName="parentNode1" val="65"/>
+        <dgm:constr type="primFontSz" for="des" forName="parentNode2" refType="primFontSz" refFor="des" refForName="parentNode1" op="equ"/>
+        <dgm:constr type="secFontSz" for="des" forName="childNode1tx" val="65"/>
+        <dgm:constr type="secFontSz" for="des" forName="childNode2tx" refType="secFontSz" refFor="des" refForName="childNode1tx" op="equ"/>
+        <dgm:constr type="w" for="des" ptType="sibTrans" refType="w" refFor="ch" refForName="composite1" op="equ" fact="0.05"/>
+      </dgm:constrLst>
+      <dgm:ruleLst/>
+      <dgm:forEach name="Name4" axis="ch" ptType="node" step="2">
+        <dgm:layoutNode name="composite1">
+          <dgm:alg type="composite">
+            <dgm:param type="ar" val="0.943"/>
+          </dgm:alg>
+          <dgm:shape xmlns:r="http://schemas.openxmlformats.org/officeDocument/2006/relationships" r:blip="">
+            <dgm:adjLst/>
+          </dgm:shape>
+          <dgm:presOf/>
+          <dgm:choose name="Name5">
+            <dgm:if name="Name6" func="var" arg="dir" op="equ" val="norm">
+              <dgm:constrLst>
+                <dgm:constr type="h" refType="w" fact="1.06"/>
+                <dgm:constr type="w" for="ch" forName="dummyNode1" refType="w"/>
+                <dgm:constr type="h" for="ch" forName="dummyNode1" refType="h"/>
+                <dgm:constr type="t" for="ch" forName="dummyNode1"/>
+                <dgm:constr type="l" for="ch" forName="dummyNode1"/>
+                <dgm:constr type="w" for="ch" forName="childNode1" refType="w" fact="0.9"/>
+                <dgm:constr type="h" for="ch" forName="childNode1" refType="h" fact="0.7"/>
+                <dgm:constr type="t" for="ch" forName="childNode1" refType="h" fact="0.15"/>
+                <dgm:constr type="l" for="ch" forName="childNode1"/>
+                <dgm:constr type="w" for="ch" forName="childNode1tx" refType="w" fact="0.9"/>
+                <dgm:constr type="h" for="ch" forName="childNode1tx" refType="h" fact="0.55"/>
+                <dgm:constr type="t" for="ch" forName="childNode1tx" refType="h" fact="0.15"/>
+                <dgm:constr type="l" for="ch" forName="childNode1tx"/>
+                <dgm:constr type="w" for="ch" forName="parentNode1" refType="w" fact="0.8"/>
+                <dgm:constr type="h" for="ch" forName="parentNode1" refType="h" fact="0.3"/>
+                <dgm:constr type="t" for="ch" forName="parentNode1" refType="h" fact="0.7"/>
+                <dgm:constr type="l" for="ch" forName="parentNode1" refType="w" fact="0.2"/>
+                <dgm:constr type="w" for="ch" forName="connSite1" refType="w" fact="0.01"/>
+                <dgm:constr type="h" for="ch" forName="connSite1" refType="h" fact="0.01"/>
+                <dgm:constr type="t" for="ch" forName="connSite1"/>
+                <dgm:constr type="l" for="ch" forName="connSite1" refType="w" fact="0.35"/>
+              </dgm:constrLst>
+            </dgm:if>
+            <dgm:else name="Name7">
+              <dgm:constrLst>
+                <dgm:constr type="h" refType="w" fact="1.06"/>
+                <dgm:constr type="w" for="ch" forName="dummyNode1" refType="w"/>
+                <dgm:constr type="h" for="ch" forName="dummyNode1" refType="h"/>
+                <dgm:constr type="t" for="ch" forName="dummyNode1"/>
+                <dgm:constr type="l" for="ch" forName="dummyNode1"/>
+                <dgm:constr type="w" for="ch" forName="childNode1" refType="w" fact="0.9"/>
+                <dgm:constr type="h" for="ch" forName="childNode1" refType="h" fact="0.7"/>
+                <dgm:constr type="t" for="ch" forName="childNode1" refType="h" fact="0.15"/>
+                <dgm:constr type="l" for="ch" forName="childNode1" refType="w" fact="0.1"/>
+                <dgm:constr type="w" for="ch" forName="childNode1tx" refType="w" fact="0.9"/>
+                <dgm:constr type="h" for="ch" forName="childNode1tx" refType="h" fact="0.55"/>
+                <dgm:constr type="t" for="ch" forName="childNode1tx" refType="h" fact="0.15"/>
+                <dgm:constr type="l" for="ch" forName="childNode1tx" refType="w" fact="0.1"/>
+                <dgm:constr type="w" for="ch" forName="parentNode1" refType="w" fact="0.8"/>
+                <dgm:constr type="h" for="ch" forName="parentNode1" refType="h" fact="0.3"/>
+                <dgm:constr type="t" for="ch" forName="parentNode1" refType="h" fact="0.7"/>
+                <dgm:constr type="l" for="ch" forName="parentNode1"/>
+                <dgm:constr type="w" for="ch" forName="connSite1" refType="w" fact="0.01"/>
+                <dgm:constr type="h" for="ch" forName="connSite1" refType="h" fact="0.01"/>
+                <dgm:constr type="t" for="ch" forName="connSite1"/>
+                <dgm:constr type="l" for="ch" forName="connSite1" refType="w" fact="0.65"/>
+              </dgm:constrLst>
+            </dgm:else>
+          </dgm:choose>
+          <dgm:ruleLst/>
+          <dgm:layoutNode name="dummyNode1">
+            <dgm:alg type="sp"/>
+            <dgm:shape xmlns:r="http://schemas.openxmlformats.org/officeDocument/2006/relationships" type="rect" r:blip="" hideGeom="1">
+              <dgm:adjLst/>
+            </dgm:shape>
+            <dgm:presOf/>
+            <dgm:constrLst/>
+            <dgm:ruleLst/>
+          </dgm:layoutNode>
+          <dgm:layoutNode name="childNode1" styleLbl="bgAcc1">
+            <dgm:varLst>
+              <dgm:bulletEnabled val="1"/>
+            </dgm:varLst>
+            <dgm:alg type="sp"/>
+            <dgm:shape xmlns:r="http://schemas.openxmlformats.org/officeDocument/2006/relationships" type="roundRect" r:blip="">
+              <dgm:adjLst>
+                <dgm:adj idx="1" val="0.1"/>
+              </dgm:adjLst>
+            </dgm:shape>
+            <dgm:presOf axis="des" ptType="node"/>
+            <dgm:constrLst/>
+            <dgm:ruleLst/>
+          </dgm:layoutNode>
+          <dgm:layoutNode name="childNode1tx" styleLbl="bgAcc1">
+            <dgm:varLst>
+              <dgm:bulletEnabled val="1"/>
+            </dgm:varLst>
+            <dgm:alg type="tx">
+              <dgm:param type="stBulletLvl" val="1"/>
+            </dgm:alg>
+            <dgm:shape xmlns:r="http://schemas.openxmlformats.org/officeDocument/2006/relationships" type="roundRect" r:blip="" hideGeom="1">
+              <dgm:adjLst>
+                <dgm:adj idx="1" val="0.1"/>
+              </dgm:adjLst>
+            </dgm:shape>
+            <dgm:presOf axis="des" ptType="node"/>
+            <dgm:constrLst>
+              <dgm:constr type="secFontSz" val="65"/>
+              <dgm:constr type="primFontSz" refType="secFontSz"/>
+              <dgm:constr type="tMarg" refType="secFontSz" fact="0.15"/>
+              <dgm:constr type="bMarg" refType="secFontSz" fact="0.15"/>
+              <dgm:constr type="lMarg" refType="secFontSz" fact="0.15"/>
+              <dgm:constr type="rMarg" refType="secFontSz" fact="0.15"/>
+            </dgm:constrLst>
+            <dgm:ruleLst>
+              <dgm:rule type="secFontSz" val="5" fact="NaN" max="NaN"/>
+            </dgm:ruleLst>
+          </dgm:layoutNode>
+          <dgm:layoutNode name="parentNode1" styleLbl="node1">
+            <dgm:varLst>
+              <dgm:chMax val="1"/>
+              <dgm:bulletEnabled val="1"/>
+            </dgm:varLst>
+            <dgm:alg type="tx"/>
+            <dgm:shape xmlns:r="http://schemas.openxmlformats.org/officeDocument/2006/relationships" type="roundRect" r:blip="">
+              <dgm:adjLst>
+                <dgm:adj idx="1" val="0.1"/>
+              </dgm:adjLst>
+            </dgm:shape>
+            <dgm:presOf axis="self"/>
+            <dgm:constrLst>
+              <dgm:constr type="tMarg" refType="primFontSz" fact="0.1"/>
+              <dgm:constr type="bMarg" refType="primFontSz" fact="0.1"/>
+              <dgm:constr type="lMarg" refType="primFontSz" fact="0.15"/>
+              <dgm:constr type="rMarg" refType="primFontSz" fact="0.15"/>
+            </dgm:constrLst>
+            <dgm:ruleLst>
+              <dgm:rule type="primFontSz" val="5" fact="NaN" max="NaN"/>
+            </dgm:ruleLst>
+          </dgm:layoutNode>
+          <dgm:layoutNode name="connSite1" moveWith="childNode1">
+            <dgm:alg type="sp"/>
+            <dgm:shape xmlns:r="http://schemas.openxmlformats.org/officeDocument/2006/relationships" r:blip="">
+              <dgm:adjLst/>
+            </dgm:shape>
+            <dgm:presOf/>
+            <dgm:constrLst/>
+            <dgm:ruleLst/>
+          </dgm:layoutNode>
+        </dgm:layoutNode>
+        <dgm:forEach name="Name8" axis="followSib" ptType="sibTrans" cnt="1">
+          <dgm:layoutNode name="Name9">
+            <dgm:alg type="conn">
+              <dgm:param type="connRout" val="curve"/>
+              <dgm:param type="srcNode" val="parentNode1"/>
+              <dgm:param type="dstNode" val="connSite2"/>
+              <dgm:param type="begPts" val="bCtr"/>
+              <dgm:param type="endPts" val="bCtr"/>
+            </dgm:alg>
+            <dgm:shape xmlns:r="http://schemas.openxmlformats.org/officeDocument/2006/relationships" type="conn" r:blip="" zOrderOff="-2">
+              <dgm:adjLst/>
+            </dgm:shape>
+            <dgm:presOf axis="self"/>
+            <dgm:choose name="Name10">
+              <dgm:if name="Name11" func="var" arg="dir" op="equ" val="norm">
+                <dgm:constrLst>
+                  <dgm:constr type="h" refType="w" fact="0.35"/>
+                  <dgm:constr type="wArH" refType="h"/>
+                  <dgm:constr type="hArH" refType="h"/>
+                  <dgm:constr type="connDist"/>
+                  <dgm:constr type="diam" refType="connDist" fact="-1.15"/>
+                  <dgm:constr type="begPad"/>
+                  <dgm:constr type="endPad"/>
+                </dgm:constrLst>
+              </dgm:if>
+              <dgm:else name="Name12">
+                <dgm:constrLst>
+                  <dgm:constr type="h" refType="w" fact="0.35"/>
+                  <dgm:constr type="wArH" refType="h"/>
+                  <dgm:constr type="hArH" refType="h"/>
+                  <dgm:constr type="connDist"/>
+                  <dgm:constr type="diam" refType="connDist" fact="1.15"/>
+                  <dgm:constr type="begPad"/>
+                  <dgm:constr type="endPad"/>
+                </dgm:constrLst>
+              </dgm:else>
+            </dgm:choose>
+            <dgm:ruleLst/>
+          </dgm:layoutNode>
+        </dgm:forEach>
+        <dgm:forEach name="Name13" axis="followSib" ptType="node" cnt="1">
+          <dgm:layoutNode name="composite2">
+            <dgm:alg type="composite">
+              <dgm:param type="ar" val="0.943"/>
+            </dgm:alg>
+            <dgm:shape xmlns:r="http://schemas.openxmlformats.org/officeDocument/2006/relationships" r:blip="">
+              <dgm:adjLst/>
+            </dgm:shape>
+            <dgm:presOf/>
+            <dgm:choose name="Name14">
+              <dgm:if name="Name15" func="var" arg="dir" op="equ" val="norm">
+                <dgm:constrLst>
+                  <dgm:constr type="h" refType="w" fact="1.06"/>
+                  <dgm:constr type="w" for="ch" forName="dummyNode2" refType="w"/>
+                  <dgm:constr type="h" for="ch" forName="dummyNode2" refType="h"/>
+                  <dgm:constr type="t" for="ch" forName="dummyNode2"/>
+                  <dgm:constr type="l" for="ch" forName="dummyNode2"/>
+                  <dgm:constr type="w" for="ch" forName="childNode2" refType="w" fact="0.9"/>
+                  <dgm:constr type="h" for="ch" forName="childNode2" refType="h" fact="0.7"/>
+                  <dgm:constr type="t" for="ch" forName="childNode2" refType="h" fact="0.15"/>
+                  <dgm:constr type="l" for="ch" forName="childNode2"/>
+                  <dgm:constr type="w" for="ch" forName="childNode2tx" refType="w" fact="0.9"/>
+                  <dgm:constr type="h" for="ch" forName="childNode2tx" refType="h" fact="0.55"/>
+                  <dgm:constr type="t" for="ch" forName="childNode2tx" refType="h" fact="0.3"/>
+                  <dgm:constr type="l" for="ch" forName="childNode2tx"/>
+                  <dgm:constr type="w" for="ch" forName="parentNode2" refType="w" fact="0.8"/>
+                  <dgm:constr type="h" for="ch" forName="parentNode2" refType="h" fact="0.3"/>
+                  <dgm:constr type="t" for="ch" forName="parentNode2"/>
+                  <dgm:constr type="l" for="ch" forName="parentNode2" refType="w" fact="0.2"/>
+                  <dgm:constr type="w" for="ch" forName="connSite2" refType="w" fact="0.01"/>
+                  <dgm:constr type="h" for="ch" forName="connSite2" refType="h" fact="0.01"/>
+                  <dgm:constr type="t" for="ch" forName="connSite2" refType="h" fact="0.99"/>
+                  <dgm:constr type="l" for="ch" forName="connSite2" refType="w" fact="0.25"/>
+                </dgm:constrLst>
+              </dgm:if>
+              <dgm:else name="Name16">
+                <dgm:constrLst>
+                  <dgm:constr type="h" refType="w" fact="1.06"/>
+                  <dgm:constr type="w" for="ch" forName="dummyNode2" refType="w"/>
+                  <dgm:constr type="h" for="ch" forName="dummyNode2" refType="h"/>
+                  <dgm:constr type="t" for="ch" forName="dummyNode2"/>
+                  <dgm:constr type="l" for="ch" forName="dummyNode2"/>
+                  <dgm:constr type="w" for="ch" forName="childNode2" refType="w" fact="0.9"/>
+                  <dgm:constr type="h" for="ch" forName="childNode2" refType="h" fact="0.7"/>
+                  <dgm:constr type="t" for="ch" forName="childNode2" refType="h" fact="0.15"/>
+                  <dgm:constr type="l" for="ch" forName="childNode2" refType="w" fact="0.1"/>
+                  <dgm:constr type="w" for="ch" forName="childNode2tx" refType="w" fact="0.9"/>
+                  <dgm:constr type="h" for="ch" forName="childNode2tx" refType="h" fact="0.55"/>
+                  <dgm:constr type="t" for="ch" forName="childNode2tx" refType="h" fact="0.3"/>
+                  <dgm:constr type="l" for="ch" forName="childNode2tx" refType="w" fact="0.1"/>
+                  <dgm:constr type="w" for="ch" forName="parentNode2" refType="w" fact="0.8"/>
+                  <dgm:constr type="h" for="ch" forName="parentNode2" refType="h" fact="0.3"/>
+                  <dgm:constr type="t" for="ch" forName="parentNode2"/>
+                  <dgm:constr type="l" for="ch" forName="parentNode2"/>
+                  <dgm:constr type="w" for="ch" forName="connSite2" refType="w" fact="0.01"/>
+                  <dgm:constr type="h" for="ch" forName="connSite2" refType="h" fact="0.01"/>
+                  <dgm:constr type="t" for="ch" forName="connSite2" refType="h" fact="0.99"/>
+                  <dgm:constr type="l" for="ch" forName="connSite2" refType="w" fact="0.85"/>
+                </dgm:constrLst>
+              </dgm:else>
+            </dgm:choose>
+            <dgm:ruleLst/>
+            <dgm:layoutNode name="dummyNode2">
+              <dgm:alg type="sp"/>
+              <dgm:shape xmlns:r="http://schemas.openxmlformats.org/officeDocument/2006/relationships" type="rect" r:blip="" hideGeom="1">
+                <dgm:adjLst/>
+              </dgm:shape>
+              <dgm:presOf/>
+              <dgm:constrLst/>
+              <dgm:ruleLst/>
+            </dgm:layoutNode>
+            <dgm:layoutNode name="childNode2" styleLbl="bgAcc1">
+              <dgm:varLst>
+                <dgm:bulletEnabled val="1"/>
+              </dgm:varLst>
+              <dgm:alg type="sp"/>
+              <dgm:shape xmlns:r="http://schemas.openxmlformats.org/officeDocument/2006/relationships" type="roundRect" r:blip="">
+                <dgm:adjLst>
+                  <dgm:adj idx="1" val="0.1"/>
+                </dgm:adjLst>
+              </dgm:shape>
+              <dgm:presOf axis="des" ptType="node"/>
+              <dgm:constrLst/>
+              <dgm:ruleLst/>
+            </dgm:layoutNode>
+            <dgm:layoutNode name="childNode2tx" styleLbl="bgAcc1">
+              <dgm:varLst>
+                <dgm:bulletEnabled val="1"/>
+              </dgm:varLst>
+              <dgm:alg type="tx">
+                <dgm:param type="stBulletLvl" val="1"/>
+              </dgm:alg>
+              <dgm:shape xmlns:r="http://schemas.openxmlformats.org/officeDocument/2006/relationships" type="roundRect" r:blip="" hideGeom="1">
+                <dgm:adjLst>
+                  <dgm:adj idx="1" val="0.1"/>
+                </dgm:adjLst>
+              </dgm:shape>
+              <dgm:presOf axis="des" ptType="node"/>
+              <dgm:constrLst>
+                <dgm:constr type="secFontSz" val="65"/>
+                <dgm:constr type="primFontSz" refType="secFontSz"/>
+                <dgm:constr type="tMarg" refType="secFontSz" fact="0.15"/>
+                <dgm:constr type="bMarg" refType="secFontSz" fact="0.15"/>
+                <dgm:constr type="lMarg" refType="secFontSz" fact="0.15"/>
+                <dgm:constr type="rMarg" refType="secFontSz" fact="0.15"/>
+              </dgm:constrLst>
+              <dgm:ruleLst>
+                <dgm:rule type="secFontSz" val="5" fact="NaN" max="NaN"/>
+              </dgm:ruleLst>
+            </dgm:layoutNode>
+            <dgm:layoutNode name="parentNode2" styleLbl="node1">
+              <dgm:varLst>
+                <dgm:chMax val="0"/>
+                <dgm:bulletEnabled val="1"/>
+              </dgm:varLst>
+              <dgm:alg type="tx"/>
+              <dgm:shape xmlns:r="http://schemas.openxmlformats.org/officeDocument/2006/relationships" type="roundRect" r:blip="">
+                <dgm:adjLst>
+                  <dgm:adj idx="1" val="0.1"/>
+                </dgm:adjLst>
+              </dgm:shape>
+              <dgm:presOf axis="self"/>
+              <dgm:constrLst>
+                <dgm:constr type="tMarg" refType="primFontSz" fact="0.1"/>
+                <dgm:constr type="bMarg" refType="primFontSz" fact="0.1"/>
+                <dgm:constr type="lMarg" refType="primFontSz" fact="0.15"/>
+                <dgm:constr type="rMarg" refType="primFontSz" fact="0.15"/>
+              </dgm:constrLst>
+              <dgm:ruleLst>
+                <dgm:rule type="primFontSz" val="5" fact="NaN" max="NaN"/>
+              </dgm:ruleLst>
+            </dgm:layoutNode>
+            <dgm:layoutNode name="connSite2" moveWith="childNode2">
+              <dgm:alg type="sp"/>
+              <dgm:shape xmlns:r="http://schemas.openxmlformats.org/officeDocument/2006/relationships" r:blip="">
+                <dgm:adjLst/>
+              </dgm:shape>
+              <dgm:presOf/>
+              <dgm:constrLst/>
+              <dgm:ruleLst/>
+            </dgm:layoutNode>
+          </dgm:layoutNode>
+          <dgm:forEach name="Name17" axis="followSib" ptType="sibTrans" cnt="1">
+            <dgm:layoutNode name="Name18">
+              <dgm:alg type="conn">
+                <dgm:param type="connRout" val="curve"/>
+                <dgm:param type="srcNode" val="parentNode2"/>
+                <dgm:param type="dstNode" val="connSite1"/>
+                <dgm:param type="begPts" val="tCtr"/>
+                <dgm:param type="endPts" val="tCtr"/>
+              </dgm:alg>
+              <dgm:shape xmlns:r="http://schemas.openxmlformats.org/officeDocument/2006/relationships" type="conn" r:blip="" zOrderOff="-2">
+                <dgm:adjLst/>
+              </dgm:shape>
+              <dgm:presOf axis="self"/>
+              <dgm:choose name="Name19">
+                <dgm:if name="Name20" func="var" arg="dir" op="equ" val="norm">
+                  <dgm:constrLst>
+                    <dgm:constr type="h" refType="w" fact="0.35"/>
+                    <dgm:constr type="wArH" refType="h"/>
+                    <dgm:constr type="hArH" refType="h"/>
+                    <dgm:constr type="connDist"/>
+                    <dgm:constr type="diam" refType="connDist" fact="1.15"/>
+                    <dgm:constr type="begPad"/>
+                    <dgm:constr type="endPad"/>
+                  </dgm:constrLst>
+                </dgm:if>
+                <dgm:else name="Name21">
+                  <dgm:constrLst>
+                    <dgm:constr type="h" refType="w" fact="0.35"/>
+                    <dgm:constr type="wArH" refType="h"/>
+                    <dgm:constr type="hArH" refType="h"/>
+                    <dgm:constr type="connDist"/>
+                    <dgm:constr type="diam" refType="connDist" fact="-1.15"/>
+                    <dgm:constr type="begPad"/>
+                    <dgm:constr type="endPad"/>
+                  </dgm:constrLst>
+                </dgm:else>
+              </dgm:choose>
+              <dgm:ruleLst/>
+            </dgm:layoutNode>
+          </dgm:forEach>
+        </dgm:forEach>
+      </dgm:forEach>
+    </dgm:layoutNode>
+  </dgm:layoutNode>
+</dgm:layoutDef>
+</file>
+
+<file path=ppt/diagrams/quickStyle1.xml><?xml version="1.0" encoding="utf-8"?>
+<dgm:styleDef xmlns:dgm="http://schemas.openxmlformats.org/drawingml/2006/diagram" xmlns:a="http://schemas.openxmlformats.org/drawingml/2006/main" uniqueId="urn:microsoft.com/office/officeart/2005/8/quickstyle/simple1">
+  <dgm:title val=""/>
+  <dgm:desc val=""/>
+  <dgm:catLst>
+    <dgm:cat type="simple" pri="10100"/>
+  </dgm:catLst>
+  <dgm:scene3d>
+    <a:camera prst="orthographicFront"/>
+    <a:lightRig rig="threePt" dir="t"/>
+  </dgm:scene3d>
+  <dgm:styleLbl name="node0">
+    <dgm:scene3d>
+      <a:camera prst="orthographicFront"/>
+      <a:lightRig rig="threePt" dir="t"/>
+    </dgm:scene3d>
+    <dgm:sp3d/>
+    <dgm:txPr/>
+    <dgm:style>
+      <a:lnRef idx="2">
+        <a:scrgbClr r="0" g="0" b="0"/>
+      </a:lnRef>
+      <a:fillRef idx="1">
+        <a:scrgbClr r="0" g="0" b="0"/>
+      </a:fillRef>
+      <a:effectRef idx="0">
+        <a:scrgbClr r="0" g="0" b="0"/>
+      </a:effectRef>
+      <a:fontRef idx="minor">
+        <a:schemeClr val="lt1"/>
+      </a:fontRef>
+    </dgm:style>
+  </dgm:styleLbl>
+  <dgm:styleLbl name="lnNode1">
+    <dgm:scene3d>
+      <a:camera prst="orthographicFront"/>
+      <a:lightRig rig="threePt" dir="t"/>
+    </dgm:scene3d>
+    <dgm:sp3d/>
+    <dgm:txPr/>
+    <dgm:style>
+      <a:lnRef idx="2">
+        <a:scrgbClr r="0" g="0" b="0"/>
+      </a:lnRef>
+      <a:fillRef idx="1">
+        <a:scrgbClr r="0" g="0" b="0"/>
+      </a:fillRef>
+      <a:effectRef idx="0">
+        <a:scrgbClr r="0" g="0" b="0"/>
+      </a:effectRef>
+      <a:fontRef idx="minor">
+        <a:schemeClr val="lt1"/>
+      </a:fontRef>
+    </dgm:style>
+  </dgm:styleLbl>
+  <dgm:styleLbl name="vennNode1">
+    <dgm:scene3d>
+      <a:camera prst="orthographicFront"/>
+      <a:lightRig rig="threePt" dir="t"/>
+    </dgm:scene3d>
+    <dgm:sp3d/>
+    <dgm:txPr/>
+    <dgm:style>
+      <a:lnRef idx="2">
+        <a:scrgbClr r="0" g="0" b="0"/>
+      </a:lnRef>
+      <a:fillRef idx="1">
+        <a:scrgbClr r="0" g="0" b="0"/>
+      </a:fillRef>
+      <a:effectRef idx="0">
+        <a:scrgbClr r="0" g="0" b="0"/>
+      </a:effectRef>
+      <a:fontRef idx="minor">
+        <a:schemeClr val="tx1"/>
+      </a:fontRef>
+    </dgm:style>
+  </dgm:styleLbl>
+  <dgm:styleLbl name="alignNode1">
+    <dgm:scene3d>
+      <a:camera prst="orthographicFront"/>
+      <a:lightRig rig="threePt" dir="t"/>
+    </dgm:scene3d>
+    <dgm:sp3d/>
+    <dgm:txPr/>
+    <dgm:style>
+      <a:lnRef idx="2">
+        <a:scrgbClr r="0" g="0" b="0"/>
+      </a:lnRef>
+      <a:fillRef idx="1">
+        <a:scrgbClr r="0" g="0" b="0"/>
+      </a:fillRef>
+      <a:effectRef idx="0">
+        <a:scrgbClr r="0" g="0" b="0"/>
+      </a:effectRef>
+      <a:fontRef idx="minor">
+        <a:schemeClr val="lt1"/>
+      </a:fontRef>
+    </dgm:style>
+  </dgm:styleLbl>
+  <dgm:styleLbl name="node1">
+    <dgm:scene3d>
+      <a:camera prst="orthographicFront"/>
+      <a:lightRig rig="threePt" dir="t"/>
+    </dgm:scene3d>
+    <dgm:sp3d/>
+    <dgm:txPr/>
+    <dgm:style>
+      <a:lnRef idx="2">
+        <a:scrgbClr r="0" g="0" b="0"/>
+      </a:lnRef>
+      <a:fillRef idx="1">
+        <a:scrgbClr r="0" g="0" b="0"/>
+      </a:fillRef>
+      <a:effectRef idx="0">
+        <a:scrgbClr r="0" g="0" b="0"/>
+      </a:effectRef>
+      <a:fontRef idx="minor">
+        <a:schemeClr val="lt1"/>
+      </a:fontRef>
+    </dgm:style>
+  </dgm:styleLbl>
+  <dgm:styleLbl name="node2">
+    <dgm:scene3d>
+      <a:camera prst="orthographicFront"/>
+      <a:lightRig rig="threePt" dir="t"/>
+    </dgm:scene3d>
+    <dgm:sp3d/>
+    <dgm:txPr/>
+    <dgm:style>
+      <a:lnRef idx="2">
+        <a:scrgbClr r="0" g="0" b="0"/>
+      </a:lnRef>
+      <a:fillRef idx="1">
+        <a:scrgbClr r="0" g="0" b="0"/>
+      </a:fillRef>
+      <a:effectRef idx="0">
+        <a:scrgbClr r="0" g="0" b="0"/>
+      </a:effectRef>
+      <a:fontRef idx="minor">
+        <a:schemeClr val="lt1"/>
+      </a:fontRef>
+    </dgm:style>
+  </dgm:styleLbl>
+  <dgm:styleLbl name="node3">
+    <dgm:scene3d>
+      <a:camera prst="orthographicFront"/>
+      <a:lightRig rig="threePt" dir="t"/>
+    </dgm:scene3d>
+    <dgm:sp3d/>
+    <dgm:txPr/>
+    <dgm:style>
+      <a:lnRef idx="2">
+        <a:scrgbClr r="0" g="0" b="0"/>
+      </a:lnRef>
+      <a:fillRef idx="1">
+        <a:scrgbClr r="0" g="0" b="0"/>
+      </a:fillRef>
+      <a:effectRef idx="0">
+        <a:scrgbClr r="0" g="0" b="0"/>
+      </a:effectRef>
+      <a:fontRef idx="minor">
+        <a:schemeClr val="lt1"/>
+      </a:fontRef>
+    </dgm:style>
+  </dgm:styleLbl>
+  <dgm:styleLbl name="node4">
+    <dgm:scene3d>
+      <a:camera prst="orthographicFront"/>
+      <a:lightRig rig="threePt" dir="t"/>
+    </dgm:scene3d>
+    <dgm:sp3d/>
+    <dgm:txPr/>
+    <dgm:style>
+      <a:lnRef idx="2">
+        <a:scrgbClr r="0" g="0" b="0"/>
+      </a:lnRef>
+      <a:fillRef idx="1">
+        <a:scrgbClr r="0" g="0" b="0"/>
+      </a:fillRef>
+      <a:effectRef idx="0">
+        <a:scrgbClr r="0" g="0" b="0"/>
+      </a:effectRef>
+      <a:fontRef idx="minor">
+        <a:schemeClr val="lt1"/>
+      </a:fontRef>
+    </dgm:style>
+  </dgm:styleLbl>
+  <dgm:styleLbl name="fgImgPlace1">
+    <dgm:scene3d>
+      <a:camera prst="orthographicFront"/>
+      <a:lightRig rig="threePt" dir="t"/>
+    </dgm:scene3d>
+    <dgm:sp3d/>
+    <dgm:txPr/>
+    <dgm:style>
+      <a:lnRef idx="2">
+        <a:scrgbClr r="0" g="0" b="0"/>
+      </a:lnRef>
+      <a:fillRef idx="1">
+        <a:scrgbClr r="0" g="0" b="0"/>
+      </a:fillRef>
+      <a:effectRef idx="0">
+        <a:scrgbClr r="0" g="0" b="0"/>
+      </a:effectRef>
+      <a:fontRef idx="minor"/>
+    </dgm:style>
+  </dgm:styleLbl>
+  <dgm:styleLbl name="alignImgPlace1">
+    <dgm:scene3d>
+      <a:camera prst="orthographicFront"/>
+      <a:lightRig rig="threePt" dir="t"/>
+    </dgm:scene3d>
+    <dgm:sp3d/>
+    <dgm:txPr/>
+    <dgm:style>
+      <a:lnRef idx="2">
+        <a:scrgbClr r="0" g="0" b="0"/>
+      </a:lnRef>
+      <a:fillRef idx="1">
+        <a:scrgbClr r="0" g="0" b="0"/>
+      </a:fillRef>
+      <a:effectRef idx="0">
+        <a:scrgbClr r="0" g="0" b="0"/>
+      </a:effectRef>
+      <a:fontRef idx="minor"/>
+    </dgm:style>
+  </dgm:styleLbl>
+  <dgm:styleLbl name="bgImgPlace1">
+    <dgm:scene3d>
+      <a:camera prst="orthographicFront"/>
+      <a:lightRig rig="threePt" dir="t"/>
+    </dgm:scene3d>
+    <dgm:sp3d/>
+    <dgm:txPr/>
+    <dgm:style>
+      <a:lnRef idx="2">
+        <a:scrgbClr r="0" g="0" b="0"/>
+      </a:lnRef>
+      <a:fillRef idx="1">
+        <a:scrgbClr r="0" g="0" b="0"/>
+      </a:fillRef>
+      <a:effectRef idx="0">
+        <a:scrgbClr r="0" g="0" b="0"/>
+      </a:effectRef>
+      <a:fontRef idx="minor"/>
+    </dgm:style>
+  </dgm:styleLbl>
+  <dgm:styleLbl name="sibTrans2D1">
+    <dgm:scene3d>
+      <a:camera prst="orthographicFront"/>
+      <a:lightRig rig="threePt" dir="t"/>
+    </dgm:scene3d>
+    <dgm:sp3d/>
+    <dgm:txPr/>
+    <dgm:style>
+      <a:lnRef idx="0">
+        <a:scrgbClr r="0" g="0" b="0"/>
+      </a:lnRef>
+      <a:fillRef idx="1">
+        <a:scrgbClr r="0" g="0" b="0"/>
+      </a:fillRef>
+      <a:effectRef idx="0">
+        <a:scrgbClr r="0" g="0" b="0"/>
+      </a:effectRef>
+      <a:fontRef idx="minor">
+        <a:schemeClr val="lt1"/>
+      </a:fontRef>
+    </dgm:style>
+  </dgm:styleLbl>
+  <dgm:styleLbl name="fgSibTrans2D1">
+    <dgm:scene3d>
+      <a:camera prst="orthographicFront"/>
+      <a:lightRig rig="threePt" dir="t"/>
+    </dgm:scene3d>
+    <dgm:sp3d/>
+    <dgm:txPr/>
+    <dgm:style>
+      <a:lnRef idx="0">
+        <a:scrgbClr r="0" g="0" b="0"/>
+      </a:lnRef>
+      <a:fillRef idx="1">
+        <a:scrgbClr r="0" g="0" b="0"/>
+      </a:fillRef>
+      <a:effectRef idx="0">
+        <a:scrgbClr r="0" g="0" b="0"/>
+      </a:effectRef>
+      <a:fontRef idx="minor">
+        <a:schemeClr val="lt1"/>
+      </a:fontRef>
+    </dgm:style>
+  </dgm:styleLbl>
+  <dgm:styleLbl name="bgSibTrans2D1">
+    <dgm:scene3d>
+      <a:camera prst="orthographicFront"/>
+      <a:lightRig rig="threePt" dir="t"/>
+    </dgm:scene3d>
+    <dgm:sp3d/>
+    <dgm:txPr/>
+    <dgm:style>
+      <a:lnRef idx="0">
+        <a:scrgbClr r="0" g="0" b="0"/>
+      </a:lnRef>
+      <a:fillRef idx="1">
+        <a:scrgbClr r="0" g="0" b="0"/>
+      </a:fillRef>
+      <a:effectRef idx="0">
+        <a:scrgbClr r="0" g="0" b="0"/>
+      </a:effectRef>
+      <a:fontRef idx="minor">
+        <a:schemeClr val="lt1"/>
+      </a:fontRef>
+    </dgm:style>
+  </dgm:styleLbl>
+  <dgm:styleLbl name="sibTrans1D1">
+    <dgm:scene3d>
+      <a:camera prst="orthographicFront"/>
+      <a:lightRig rig="threePt" dir="t"/>
+    </dgm:scene3d>
+    <dgm:sp3d/>
+    <dgm:txPr/>
+    <dgm:style>
+      <a:lnRef idx="1">
+        <a:scrgbClr r="0" g="0" b="0"/>
+      </a:lnRef>
+      <a:fillRef idx="0">
+        <a:scrgbClr r="0" g="0" b="0"/>
+      </a:fillRef>
+      <a:effectRef idx="0">
+        <a:scrgbClr r="0" g="0" b="0"/>
+      </a:effectRef>
+      <a:fontRef idx="minor"/>
+    </dgm:style>
+  </dgm:styleLbl>
+  <dgm:styleLbl name="callout">
+    <dgm:scene3d>
+      <a:camera prst="orthographicFront"/>
+      <a:lightRig rig="threePt" dir="t"/>
+    </dgm:scene3d>
+    <dgm:sp3d/>
+    <dgm:txPr/>
+    <dgm:style>
+      <a:lnRef idx="2">
+        <a:scrgbClr r="0" g="0" b="0"/>
+      </a:lnRef>
+      <a:fillRef idx="1">
+        <a:scrgbClr r="0" g="0" b="0"/>
+      </a:fillRef>
+      <a:effectRef idx="0">
+        <a:scrgbClr r="0" g="0" b="0"/>
+      </a:effectRef>
+      <a:fontRef idx="minor"/>
+    </dgm:style>
+  </dgm:styleLbl>
+  <dgm:styleLbl name="asst0">
+    <dgm:scene3d>
+      <a:camera prst="orthographicFront"/>
+      <a:lightRig rig="threePt" dir="t"/>
+    </dgm:scene3d>
+    <dgm:sp3d/>
+    <dgm:txPr/>
+    <dgm:style>
+      <a:lnRef idx="2">
+        <a:scrgbClr r="0" g="0" b="0"/>
+      </a:lnRef>
+      <a:fillRef idx="1">
+        <a:scrgbClr r="0" g="0" b="0"/>
+      </a:fillRef>
+      <a:effectRef idx="0">
+        <a:scrgbClr r="0" g="0" b="0"/>
+      </a:effectRef>
+      <a:fontRef idx="minor">
+        <a:schemeClr val="lt1"/>
+      </a:fontRef>
+    </dgm:style>
+  </dgm:styleLbl>
+  <dgm:styleLbl name="asst1">
+    <dgm:scene3d>
+      <a:camera prst="orthographicFront"/>
+      <a:lightRig rig="threePt" dir="t"/>
+    </dgm:scene3d>
+    <dgm:sp3d/>
+    <dgm:txPr/>
+    <dgm:style>
+      <a:lnRef idx="2">
+        <a:scrgbClr r="0" g="0" b="0"/>
+      </a:lnRef>
+      <a:fillRef idx="1">
+        <a:scrgbClr r="0" g="0" b="0"/>
+      </a:fillRef>
+      <a:effectRef idx="0">
+        <a:scrgbClr r="0" g="0" b="0"/>
+      </a:effectRef>
+      <a:fontRef idx="minor">
+        <a:schemeClr val="lt1"/>
+      </a:fontRef>
+    </dgm:style>
+  </dgm:styleLbl>
+  <dgm:styleLbl name="asst2">
+    <dgm:scene3d>
+      <a:camera prst="orthographicFront"/>
+      <a:lightRig rig="threePt" dir="t"/>
+    </dgm:scene3d>
+    <dgm:sp3d/>
+    <dgm:txPr/>
+    <dgm:style>
+      <a:lnRef idx="2">
+        <a:scrgbClr r="0" g="0" b="0"/>
+      </a:lnRef>
+      <a:fillRef idx="1">
+        <a:scrgbClr r="0" g="0" b="0"/>
+      </a:fillRef>
+      <a:effectRef idx="0">
+        <a:scrgbClr r="0" g="0" b="0"/>
+      </a:effectRef>
+      <a:fontRef idx="minor">
+        <a:schemeClr val="lt1"/>
+      </a:fontRef>
+    </dgm:style>
+  </dgm:styleLbl>
+  <dgm:styleLbl name="asst3">
+    <dgm:scene3d>
+      <a:camera prst="orthographicFront"/>
+      <a:lightRig rig="threePt" dir="t"/>
+    </dgm:scene3d>
+    <dgm:sp3d/>
+    <dgm:txPr/>
+    <dgm:style>
+      <a:lnRef idx="2">
+        <a:scrgbClr r="0" g="0" b="0"/>
+      </a:lnRef>
+      <a:fillRef idx="1">
+        <a:scrgbClr r="0" g="0" b="0"/>
+      </a:fillRef>
+      <a:effectRef idx="0">
+        <a:scrgbClr r="0" g="0" b="0"/>
+      </a:effectRef>
+      <a:fontRef idx="minor">
+        <a:schemeClr val="lt1"/>
+      </a:fontRef>
+    </dgm:style>
+  </dgm:styleLbl>
+  <dgm:styleLbl name="asst4">
+    <dgm:scene3d>
+      <a:camera prst="orthographicFront"/>
+      <a:lightRig rig="threePt" dir="t"/>
+    </dgm:scene3d>
+    <dgm:sp3d/>
+    <dgm:txPr/>
+    <dgm:style>
+      <a:lnRef idx="2">
+        <a:scrgbClr r="0" g="0" b="0"/>
+      </a:lnRef>
+      <a:fillRef idx="1">
+        <a:scrgbClr r="0" g="0" b="0"/>
+      </a:fillRef>
+      <a:effectRef idx="0">
+        <a:scrgbClr r="0" g="0" b="0"/>
+      </a:effectRef>
+      <a:fontRef idx="minor">
+        <a:schemeClr val="lt1"/>
+      </a:fontRef>
+    </dgm:style>
+  </dgm:styleLbl>
+  <dgm:styleLbl name="parChTrans2D1">
+    <dgm:scene3d>
+      <a:camera prst="orthographicFront"/>
+      <a:lightRig rig="threePt" dir="t"/>
+    </dgm:scene3d>
+    <dgm:sp3d/>
+    <dgm:txPr/>
+    <dgm:style>
+      <a:lnRef idx="2">
+        <a:scrgbClr r="0" g="0" b="0"/>
+      </a:lnRef>
+      <a:fillRef idx="1">
+        <a:scrgbClr r="0" g="0" b="0"/>
+      </a:fillRef>
+      <a:effectRef idx="0">
+        <a:scrgbClr r="0" g="0" b="0"/>
+      </a:effectRef>
+      <a:fontRef idx="minor">
+        <a:schemeClr val="lt1"/>
+      </a:fontRef>
+    </dgm:style>
+  </dgm:styleLbl>
+  <dgm:styleLbl name="parChTrans2D2">
+    <dgm:scene3d>
+      <a:camera prst="orthographicFront"/>
+      <a:lightRig rig="threePt" dir="t"/>
+    </dgm:scene3d>
+    <dgm:sp3d/>
+    <dgm:txPr/>
+    <dgm:style>
+      <a:lnRef idx="2">
+        <a:scrgbClr r="0" g="0" b="0"/>
+      </a:lnRef>
+      <a:fillRef idx="1">
+        <a:scrgbClr r="0" g="0" b="0"/>
+      </a:fillRef>
+      <a:effectRef idx="0">
+        <a:scrgbClr r="0" g="0" b="0"/>
+      </a:effectRef>
+      <a:fontRef idx="minor">
+        <a:schemeClr val="lt1"/>
+      </a:fontRef>
+    </dgm:style>
+  </dgm:styleLbl>
+  <dgm:styleLbl name="parChTrans2D3">
+    <dgm:scene3d>
+      <a:camera prst="orthographicFront"/>
+      <a:lightRig rig="threePt" dir="t"/>
+    </dgm:scene3d>
+    <dgm:sp3d/>
+    <dgm:txPr/>
+    <dgm:style>
+      <a:lnRef idx="2">
+        <a:scrgbClr r="0" g="0" b="0"/>
+      </a:lnRef>
+      <a:fillRef idx="1">
+        <a:scrgbClr r="0" g="0" b="0"/>
+      </a:fillRef>
+      <a:effectRef idx="0">
+        <a:scrgbClr r="0" g="0" b="0"/>
+      </a:effectRef>
+      <a:fontRef idx="minor">
+        <a:schemeClr val="lt1"/>
+      </a:fontRef>
+    </dgm:style>
+  </dgm:styleLbl>
+  <dgm:styleLbl name="parChTrans2D4">
+    <dgm:scene3d>
+      <a:camera prst="orthographicFront"/>
+      <a:lightRig rig="threePt" dir="t"/>
+    </dgm:scene3d>
+    <dgm:sp3d/>
+    <dgm:txPr/>
+    <dgm:style>
+      <a:lnRef idx="2">
+        <a:scrgbClr r="0" g="0" b="0"/>
+      </a:lnRef>
+      <a:fillRef idx="1">
+        <a:scrgbClr r="0" g="0" b="0"/>
+      </a:fillRef>
+      <a:effectRef idx="0">
+        <a:scrgbClr r="0" g="0" b="0"/>
+      </a:effectRef>
+      <a:fontRef idx="minor">
+        <a:schemeClr val="lt1"/>
+      </a:fontRef>
+    </dgm:style>
+  </dgm:styleLbl>
+  <dgm:styleLbl name="parChTrans1D1">
+    <dgm:scene3d>
+      <a:camera prst="orthographicFront"/>
+      <a:lightRig rig="threePt" dir="t"/>
+    </dgm:scene3d>
+    <dgm:sp3d/>
+    <dgm:txPr/>
+    <dgm:style>
+      <a:lnRef idx="2">
+        <a:scrgbClr r="0" g="0" b="0"/>
+      </a:lnRef>
+      <a:fillRef idx="0">
+        <a:scrgbClr r="0" g="0" b="0"/>
+      </a:fillRef>
+      <a:effectRef idx="0">
+        <a:scrgbClr r="0" g="0" b="0"/>
+      </a:effectRef>
+      <a:fontRef idx="minor"/>
+    </dgm:style>
+  </dgm:styleLbl>
+  <dgm:styleLbl name="parChTrans1D2">
+    <dgm:scene3d>
+      <a:camera prst="orthographicFront"/>
+      <a:lightRig rig="threePt" dir="t"/>
+    </dgm:scene3d>
+    <dgm:sp3d/>
+    <dgm:txPr/>
+    <dgm:style>
+      <a:lnRef idx="2">
+        <a:scrgbClr r="0" g="0" b="0"/>
+      </a:lnRef>
+      <a:fillRef idx="0">
+        <a:scrgbClr r="0" g="0" b="0"/>
+      </a:fillRef>
+      <a:effectRef idx="0">
+        <a:scrgbClr r="0" g="0" b="0"/>
+      </a:effectRef>
+      <a:fontRef idx="minor"/>
+    </dgm:style>
+  </dgm:styleLbl>
+  <dgm:styleLbl name="parChTrans1D3">
+    <dgm:scene3d>
+      <a:camera prst="orthographicFront"/>
+      <a:lightRig rig="threePt" dir="t"/>
+    </dgm:scene3d>
+    <dgm:sp3d/>
+    <dgm:txPr/>
+    <dgm:style>
+      <a:lnRef idx="2">
+        <a:scrgbClr r="0" g="0" b="0"/>
+      </a:lnRef>
+      <a:fillRef idx="0">
+        <a:scrgbClr r="0" g="0" b="0"/>
+      </a:fillRef>
+      <a:effectRef idx="0">
+        <a:scrgbClr r="0" g="0" b="0"/>
+      </a:effectRef>
+      <a:fontRef idx="minor"/>
+    </dgm:style>
+  </dgm:styleLbl>
+  <dgm:styleLbl name="parChTrans1D4">
+    <dgm:scene3d>
+      <a:camera prst="orthographicFront"/>
+      <a:lightRig rig="threePt" dir="t"/>
+    </dgm:scene3d>
+    <dgm:sp3d/>
+    <dgm:txPr/>
+    <dgm:style>
+      <a:lnRef idx="2">
+        <a:scrgbClr r="0" g="0" b="0"/>
+      </a:lnRef>
+      <a:fillRef idx="0">
+        <a:scrgbClr r="0" g="0" b="0"/>
+      </a:fillRef>
+      <a:effectRef idx="0">
+        <a:scrgbClr r="0" g="0" b="0"/>
+      </a:effectRef>
+      <a:fontRef idx="minor"/>
+    </dgm:style>
+  </dgm:styleLbl>
+  <dgm:styleLbl name="fgAcc1">
+    <dgm:scene3d>
+      <a:camera prst="orthographicFront"/>
+      <a:lightRig rig="threePt" dir="t"/>
+    </dgm:scene3d>
+    <dgm:sp3d/>
+    <dgm:txPr/>
+    <dgm:style>
+      <a:lnRef idx="2">
+        <a:scrgbClr r="0" g="0" b="0"/>
+      </a:lnRef>
+      <a:fillRef idx="1">
+        <a:scrgbClr r="0" g="0" b="0"/>
+      </a:fillRef>
+      <a:effectRef idx="0">
+        <a:scrgbClr r="0" g="0" b="0"/>
+      </a:effectRef>
+      <a:fontRef idx="minor"/>
+    </dgm:style>
+  </dgm:styleLbl>
+  <dgm:styleLbl name="conFgAcc1">
+    <dgm:scene3d>
+      <a:camera prst="orthographicFront"/>
+      <a:lightRig rig="threePt" dir="t"/>
+    </dgm:scene3d>
+    <dgm:sp3d/>
+    <dgm:txPr/>
+    <dgm:style>
+      <a:lnRef idx="2">
+        <a:scrgbClr r="0" g="0" b="0"/>
+      </a:lnRef>
+      <a:fillRef idx="1">
+        <a:scrgbClr r="0" g="0" b="0"/>
+      </a:fillRef>
+      <a:effectRef idx="0">
+        <a:scrgbClr r="0" g="0" b="0"/>
+      </a:effectRef>
+      <a:fontRef idx="minor"/>
+    </dgm:style>
+  </dgm:styleLbl>
+  <dgm:styleLbl name="alignAcc1">
+    <dgm:scene3d>
+      <a:camera prst="orthographicFront"/>
+      <a:lightRig rig="threePt" dir="t"/>
+    </dgm:scene3d>
+    <dgm:sp3d/>
+    <dgm:txPr/>
+    <dgm:style>
+      <a:lnRef idx="2">
+        <a:scrgbClr r="0" g="0" b="0"/>
+      </a:lnRef>
+      <a:fillRef idx="1">
+        <a:scrgbClr r="0" g="0" b="0"/>
+      </a:fillRef>
+      <a:effectRef idx="0">
+        <a:scrgbClr r="0" g="0" b="0"/>
+      </a:effectRef>
+      <a:fontRef idx="minor"/>
+    </dgm:style>
+  </dgm:styleLbl>
+  <dgm:styleLbl name="trAlignAcc1">
+    <dgm:scene3d>
+      <a:camera prst="orthographicFront"/>
+      <a:lightRig rig="threePt" dir="t"/>
+    </dgm:scene3d>
+    <dgm:sp3d/>
+    <dgm:txPr/>
+    <dgm:style>
+      <a:lnRef idx="1">
+        <a:scrgbClr r="0" g="0" b="0"/>
+      </a:lnRef>
+      <a:fillRef idx="1">
+        <a:scrgbClr r="0" g="0" b="0"/>
+      </a:fillRef>
+      <a:effectRef idx="0">
+        <a:scrgbClr r="0" g="0" b="0"/>
+      </a:effectRef>
+      <a:fontRef idx="minor"/>
+    </dgm:style>
+  </dgm:styleLbl>
+  <dgm:styleLbl name="bgAcc1">
+    <dgm:scene3d>
+      <a:camera prst="orthographicFront"/>
+      <a:lightRig rig="threePt" dir="t"/>
+    </dgm:scene3d>
+    <dgm:sp3d/>
+    <dgm:txPr/>
+    <dgm:style>
+      <a:lnRef idx="2">
+        <a:scrgbClr r="0" g="0" b="0"/>
+      </a:lnRef>
+      <a:fillRef idx="1">
+        <a:scrgbClr r="0" g="0" b="0"/>
+      </a:fillRef>
+      <a:effectRef idx="0">
+        <a:scrgbClr r="0" g="0" b="0"/>
+      </a:effectRef>
+      <a:fontRef idx="minor"/>
+    </dgm:style>
+  </dgm:styleLbl>
+  <dgm:styleLbl name="solidFgAcc1">
+    <dgm:scene3d>
+      <a:camera prst="orthographicFront"/>
+      <a:lightRig rig="threePt" dir="t"/>
+    </dgm:scene3d>
+    <dgm:sp3d/>
+    <dgm:txPr/>
+    <dgm:style>
+      <a:lnRef idx="2">
+        <a:scrgbClr r="0" g="0" b="0"/>
+      </a:lnRef>
+      <a:fillRef idx="1">
+        <a:scrgbClr r="0" g="0" b="0"/>
+      </a:fillRef>
+      <a:effectRef idx="0">
+        <a:scrgbClr r="0" g="0" b="0"/>
+      </a:effectRef>
+      <a:fontRef idx="minor"/>
+    </dgm:style>
+  </dgm:styleLbl>
+  <dgm:styleLbl name="solidAlignAcc1">
+    <dgm:scene3d>
+      <a:camera prst="orthographicFront"/>
+      <a:lightRig rig="threePt" dir="t"/>
+    </dgm:scene3d>
+    <dgm:sp3d/>
+    <dgm:txPr/>
+    <dgm:style>
+      <a:lnRef idx="2">
+        <a:scrgbClr r="0" g="0" b="0"/>
+      </a:lnRef>
+      <a:fillRef idx="1">
+        <a:scrgbClr r="0" g="0" b="0"/>
+      </a:fillRef>
+      <a:effectRef idx="0">
+        <a:scrgbClr r="0" g="0" b="0"/>
+      </a:effectRef>
+      <a:fontRef idx="minor"/>
+    </dgm:style>
+  </dgm:styleLbl>
+  <dgm:styleLbl name="solidBgAcc1">
+    <dgm:scene3d>
+      <a:camera prst="orthographicFront"/>
+      <a:lightRig rig="threePt" dir="t"/>
+    </dgm:scene3d>
+    <dgm:sp3d/>
+    <dgm:txPr/>
+    <dgm:style>
+      <a:lnRef idx="2">
+        <a:scrgbClr r="0" g="0" b="0"/>
+      </a:lnRef>
+      <a:fillRef idx="1">
+        <a:scrgbClr r="0" g="0" b="0"/>
+      </a:fillRef>
+      <a:effectRef idx="0">
+        <a:scrgbClr r="0" g="0" b="0"/>
+      </a:effectRef>
+      <a:fontRef idx="minor"/>
+    </dgm:style>
+  </dgm:styleLbl>
+  <dgm:styleLbl name="fgAccFollowNode1">
+    <dgm:scene3d>
+      <a:camera prst="orthographicFront"/>
+      <a:lightRig rig="threePt" dir="t"/>
+    </dgm:scene3d>
+    <dgm:sp3d/>
+    <dgm:txPr/>
+    <dgm:style>
+      <a:lnRef idx="2">
+        <a:scrgbClr r="0" g="0" b="0"/>
+      </a:lnRef>
+      <a:fillRef idx="1">
+        <a:scrgbClr r="0" g="0" b="0"/>
+      </a:fillRef>
+      <a:effectRef idx="0">
+        <a:scrgbClr r="0" g="0" b="0"/>
+      </a:effectRef>
+      <a:fontRef idx="minor"/>
+    </dgm:style>
+  </dgm:styleLbl>
+  <dgm:styleLbl name="alignAccFollowNode1">
+    <dgm:scene3d>
+      <a:camera prst="orthographicFront"/>
+      <a:lightRig rig="threePt" dir="t"/>
+    </dgm:scene3d>
+    <dgm:sp3d/>
+    <dgm:txPr/>
+    <dgm:style>
+      <a:lnRef idx="2">
+        <a:scrgbClr r="0" g="0" b="0"/>
+      </a:lnRef>
+      <a:fillRef idx="1">
+        <a:scrgbClr r="0" g="0" b="0"/>
+      </a:fillRef>
+      <a:effectRef idx="0">
+        <a:scrgbClr r="0" g="0" b="0"/>
+      </a:effectRef>
+      <a:fontRef idx="minor"/>
+    </dgm:style>
+  </dgm:styleLbl>
+  <dgm:styleLbl name="bgAccFollowNode1">
+    <dgm:scene3d>
+      <a:camera prst="orthographicFront"/>
+      <a:lightRig rig="threePt" dir="t"/>
+    </dgm:scene3d>
+    <dgm:sp3d/>
+    <dgm:txPr/>
+    <dgm:style>
+      <a:lnRef idx="2">
+        <a:scrgbClr r="0" g="0" b="0"/>
+      </a:lnRef>
+      <a:fillRef idx="1">
+        <a:scrgbClr r="0" g="0" b="0"/>
+      </a:fillRef>
+      <a:effectRef idx="0">
+        <a:scrgbClr r="0" g="0" b="0"/>
+      </a:effectRef>
+      <a:fontRef idx="minor"/>
+    </dgm:style>
+  </dgm:styleLbl>
+  <dgm:styleLbl name="fgAcc0">
+    <dgm:scene3d>
+      <a:camera prst="orthographicFront"/>
+      <a:lightRig rig="threePt" dir="t"/>
+    </dgm:scene3d>
+    <dgm:sp3d/>
+    <dgm:txPr/>
+    <dgm:style>
+      <a:lnRef idx="2">
+        <a:scrgbClr r="0" g="0" b="0"/>
+      </a:lnRef>
+      <a:fillRef idx="1">
+        <a:scrgbClr r="0" g="0" b="0"/>
+      </a:fillRef>
+      <a:effectRef idx="0">
+        <a:scrgbClr r="0" g="0" b="0"/>
+      </a:effectRef>
+      <a:fontRef idx="minor"/>
+    </dgm:style>
+  </dgm:styleLbl>
+  <dgm:styleLbl name="fgAcc2">
+    <dgm:scene3d>
+      <a:camera prst="orthographicFront"/>
+      <a:lightRig rig="threePt" dir="t"/>
+    </dgm:scene3d>
+    <dgm:sp3d/>
+    <dgm:txPr/>
+    <dgm:style>
+      <a:lnRef idx="2">
+        <a:scrgbClr r="0" g="0" b="0"/>
+      </a:lnRef>
+      <a:fillRef idx="1">
+        <a:scrgbClr r="0" g="0" b="0"/>
+      </a:fillRef>
+      <a:effectRef idx="0">
+        <a:scrgbClr r="0" g="0" b="0"/>
+      </a:effectRef>
+      <a:fontRef idx="minor"/>
+    </dgm:style>
+  </dgm:styleLbl>
+  <dgm:styleLbl name="fgAcc3">
+    <dgm:scene3d>
+      <a:camera prst="orthographicFront"/>
+      <a:lightRig rig="threePt" dir="t"/>
+    </dgm:scene3d>
+    <dgm:sp3d/>
+    <dgm:txPr/>
+    <dgm:style>
+      <a:lnRef idx="2">
+        <a:scrgbClr r="0" g="0" b="0"/>
+      </a:lnRef>
+      <a:fillRef idx="1">
+        <a:scrgbClr r="0" g="0" b="0"/>
+      </a:fillRef>
+      <a:effectRef idx="0">
+        <a:scrgbClr r="0" g="0" b="0"/>
+      </a:effectRef>
+      <a:fontRef idx="minor"/>
+    </dgm:style>
+  </dgm:styleLbl>
+  <dgm:styleLbl name="fgAcc4">
+    <dgm:scene3d>
+      <a:camera prst="orthographicFront"/>
+      <a:lightRig rig="threePt" dir="t"/>
+    </dgm:scene3d>
+    <dgm:sp3d/>
+    <dgm:txPr/>
+    <dgm:style>
+      <a:lnRef idx="2">
+        <a:scrgbClr r="0" g="0" b="0"/>
+      </a:lnRef>
+      <a:fillRef idx="1">
+        <a:scrgbClr r="0" g="0" b="0"/>
+      </a:fillRef>
+      <a:effectRef idx="0">
+        <a:scrgbClr r="0" g="0" b="0"/>
+      </a:effectRef>
+      <a:fontRef idx="minor"/>
+    </dgm:style>
+  </dgm:styleLbl>
+  <dgm:styleLbl name="bgShp">
+    <dgm:scene3d>
+      <a:camera prst="orthographicFront"/>
+      <a:lightRig rig="threePt" dir="t"/>
+    </dgm:scene3d>
+    <dgm:sp3d/>
+    <dgm:txPr/>
+    <dgm:style>
+      <a:lnRef idx="0">
+        <a:scrgbClr r="0" g="0" b="0"/>
+      </a:lnRef>
+      <a:fillRef idx="1">
+        <a:scrgbClr r="0" g="0" b="0"/>
+      </a:fillRef>
+      <a:effectRef idx="0">
+        <a:scrgbClr r="0" g="0" b="0"/>
+      </a:effectRef>
+      <a:fontRef idx="minor"/>
+    </dgm:style>
+  </dgm:styleLbl>
+  <dgm:styleLbl name="dkBgShp">
+    <dgm:scene3d>
+      <a:camera prst="orthographicFront"/>
+      <a:lightRig rig="threePt" dir="t"/>
+    </dgm:scene3d>
+    <dgm:sp3d/>
+    <dgm:txPr/>
+    <dgm:style>
+      <a:lnRef idx="0">
+        <a:scrgbClr r="0" g="0" b="0"/>
+      </a:lnRef>
+      <a:fillRef idx="1">
+        <a:scrgbClr r="0" g="0" b="0"/>
+      </a:fillRef>
+      <a:effectRef idx="0">
+        <a:scrgbClr r="0" g="0" b="0"/>
+      </a:effectRef>
+      <a:fontRef idx="minor"/>
+    </dgm:style>
+  </dgm:styleLbl>
+  <dgm:styleLbl name="trBgShp">
+    <dgm:scene3d>
+      <a:camera prst="orthographicFront"/>
+      <a:lightRig rig="threePt" dir="t"/>
+    </dgm:scene3d>
+    <dgm:sp3d/>
+    <dgm:txPr/>
+    <dgm:style>
+      <a:lnRef idx="0">
+        <a:scrgbClr r="0" g="0" b="0"/>
+      </a:lnRef>
+      <a:fillRef idx="1">
+        <a:scrgbClr r="0" g="0" b="0"/>
+      </a:fillRef>
+      <a:effectRef idx="0">
+        <a:scrgbClr r="0" g="0" b="0"/>
+      </a:effectRef>
+      <a:fontRef idx="minor"/>
+    </dgm:style>
+  </dgm:styleLbl>
+  <dgm:styleLbl name="fgShp">
+    <dgm:scene3d>
+      <a:camera prst="orthographicFront"/>
+      <a:lightRig rig="threePt" dir="t"/>
+    </dgm:scene3d>
+    <dgm:sp3d/>
+    <dgm:txPr/>
+    <dgm:style>
+      <a:lnRef idx="2">
+        <a:scrgbClr r="0" g="0" b="0"/>
+      </a:lnRef>
+      <a:fillRef idx="1">
+        <a:scrgbClr r="0" g="0" b="0"/>
+      </a:fillRef>
+      <a:effectRef idx="0">
+        <a:scrgbClr r="0" g="0" b="0"/>
+      </a:effectRef>
+      <a:fontRef idx="minor"/>
+    </dgm:style>
+  </dgm:styleLbl>
+  <dgm:styleLbl name="revTx">
+    <dgm:scene3d>
+      <a:camera prst="orthographicFront"/>
+      <a:lightRig rig="threePt" dir="t"/>
+    </dgm:scene3d>
+    <dgm:sp3d/>
+    <dgm:txPr/>
+    <dgm:style>
+      <a:lnRef idx="0">
+        <a:scrgbClr r="0" g="0" b="0"/>
+      </a:lnRef>
+      <a:fillRef idx="0">
+        <a:scrgbClr r="0" g="0" b="0"/>
+      </a:fillRef>
+      <a:effectRef idx="0">
+        <a:scrgbClr r="0" g="0" b="0"/>
+      </a:effectRef>
+      <a:fontRef idx="minor"/>
+    </dgm:style>
+  </dgm:styleLbl>
+</dgm:styleDef>
 </file>
 
 <file path=ppt/slideLayouts/slideLayout1.xml><?xml version="1.0" encoding="utf-8"?>
@@ -256,7 +4612,7 @@
           <a:p>
             <a:fld id="{1030931C-3A2D-4B42-AFD6-E3DA8B37626D}" type="datetimeFigureOut">
               <a:rPr lang="en-BE" smtClean="0"/>
-              <a:t>21/04/2022</a:t>
+              <a:t>22/04/2022</a:t>
             </a:fld>
             <a:endParaRPr lang="en-BE"/>
           </a:p>
@@ -456,7 +4812,7 @@
           <a:p>
             <a:fld id="{1030931C-3A2D-4B42-AFD6-E3DA8B37626D}" type="datetimeFigureOut">
               <a:rPr lang="en-BE" smtClean="0"/>
-              <a:t>21/04/2022</a:t>
+              <a:t>22/04/2022</a:t>
             </a:fld>
             <a:endParaRPr lang="en-BE"/>
           </a:p>
@@ -666,7 +5022,7 @@
           <a:p>
             <a:fld id="{1030931C-3A2D-4B42-AFD6-E3DA8B37626D}" type="datetimeFigureOut">
               <a:rPr lang="en-BE" smtClean="0"/>
-              <a:t>21/04/2022</a:t>
+              <a:t>22/04/2022</a:t>
             </a:fld>
             <a:endParaRPr lang="en-BE"/>
           </a:p>
@@ -866,7 +5222,7 @@
           <a:p>
             <a:fld id="{1030931C-3A2D-4B42-AFD6-E3DA8B37626D}" type="datetimeFigureOut">
               <a:rPr lang="en-BE" smtClean="0"/>
-              <a:t>21/04/2022</a:t>
+              <a:t>22/04/2022</a:t>
             </a:fld>
             <a:endParaRPr lang="en-BE"/>
           </a:p>
@@ -1142,7 +5498,7 @@
           <a:p>
             <a:fld id="{1030931C-3A2D-4B42-AFD6-E3DA8B37626D}" type="datetimeFigureOut">
               <a:rPr lang="en-BE" smtClean="0"/>
-              <a:t>21/04/2022</a:t>
+              <a:t>22/04/2022</a:t>
             </a:fld>
             <a:endParaRPr lang="en-BE"/>
           </a:p>
@@ -1410,7 +5766,7 @@
           <a:p>
             <a:fld id="{1030931C-3A2D-4B42-AFD6-E3DA8B37626D}" type="datetimeFigureOut">
               <a:rPr lang="en-BE" smtClean="0"/>
-              <a:t>21/04/2022</a:t>
+              <a:t>22/04/2022</a:t>
             </a:fld>
             <a:endParaRPr lang="en-BE"/>
           </a:p>
@@ -1825,7 +6181,7 @@
           <a:p>
             <a:fld id="{1030931C-3A2D-4B42-AFD6-E3DA8B37626D}" type="datetimeFigureOut">
               <a:rPr lang="en-BE" smtClean="0"/>
-              <a:t>21/04/2022</a:t>
+              <a:t>22/04/2022</a:t>
             </a:fld>
             <a:endParaRPr lang="en-BE"/>
           </a:p>
@@ -1967,7 +6323,7 @@
           <a:p>
             <a:fld id="{1030931C-3A2D-4B42-AFD6-E3DA8B37626D}" type="datetimeFigureOut">
               <a:rPr lang="en-BE" smtClean="0"/>
-              <a:t>21/04/2022</a:t>
+              <a:t>22/04/2022</a:t>
             </a:fld>
             <a:endParaRPr lang="en-BE"/>
           </a:p>
@@ -2080,7 +6436,7 @@
           <a:p>
             <a:fld id="{1030931C-3A2D-4B42-AFD6-E3DA8B37626D}" type="datetimeFigureOut">
               <a:rPr lang="en-BE" smtClean="0"/>
-              <a:t>21/04/2022</a:t>
+              <a:t>22/04/2022</a:t>
             </a:fld>
             <a:endParaRPr lang="en-BE"/>
           </a:p>
@@ -2393,7 +6749,7 @@
           <a:p>
             <a:fld id="{1030931C-3A2D-4B42-AFD6-E3DA8B37626D}" type="datetimeFigureOut">
               <a:rPr lang="en-BE" smtClean="0"/>
-              <a:t>21/04/2022</a:t>
+              <a:t>22/04/2022</a:t>
             </a:fld>
             <a:endParaRPr lang="en-BE"/>
           </a:p>
@@ -2682,7 +7038,7 @@
           <a:p>
             <a:fld id="{1030931C-3A2D-4B42-AFD6-E3DA8B37626D}" type="datetimeFigureOut">
               <a:rPr lang="en-BE" smtClean="0"/>
-              <a:t>21/04/2022</a:t>
+              <a:t>22/04/2022</a:t>
             </a:fld>
             <a:endParaRPr lang="en-BE"/>
           </a:p>
@@ -2925,7 +7281,7 @@
           <a:p>
             <a:fld id="{1030931C-3A2D-4B42-AFD6-E3DA8B37626D}" type="datetimeFigureOut">
               <a:rPr lang="en-BE" smtClean="0"/>
-              <a:t>21/04/2022</a:t>
+              <a:t>22/04/2022</a:t>
             </a:fld>
             <a:endParaRPr lang="en-BE"/>
           </a:p>
@@ -4567,6 +8923,201 @@
 </p:sld>
 </file>
 
+<file path=ppt/slides/slide2.xml><?xml version="1.0" encoding="utf-8"?>
+<p:sld xmlns:a="http://schemas.openxmlformats.org/drawingml/2006/main" xmlns:r="http://schemas.openxmlformats.org/officeDocument/2006/relationships" xmlns:p="http://schemas.openxmlformats.org/presentationml/2006/main">
+  <p:cSld>
+    <p:spTree>
+      <p:nvGrpSpPr>
+        <p:cNvPr id="1" name=""/>
+        <p:cNvGrpSpPr/>
+        <p:nvPr/>
+      </p:nvGrpSpPr>
+      <p:grpSpPr>
+        <a:xfrm>
+          <a:off x="0" y="0"/>
+          <a:ext cx="0" cy="0"/>
+          <a:chOff x="0" y="0"/>
+          <a:chExt cx="0" cy="0"/>
+        </a:xfrm>
+      </p:grpSpPr>
+      <p:sp>
+        <p:nvSpPr>
+          <p:cNvPr id="3" name="Rectangle: Rounded Corners 2">
+            <a:extLst>
+              <a:ext uri="{FF2B5EF4-FFF2-40B4-BE49-F238E27FC236}">
+                <a16:creationId xmlns:a16="http://schemas.microsoft.com/office/drawing/2014/main" id="{793FD5AC-0011-EBC3-4A1E-883709B7317B}"/>
+              </a:ext>
+            </a:extLst>
+          </p:cNvPr>
+          <p:cNvSpPr/>
+          <p:nvPr/>
+        </p:nvSpPr>
+        <p:spPr>
+          <a:xfrm>
+            <a:off x="3304674" y="312821"/>
+            <a:ext cx="8642684" cy="4884821"/>
+          </a:xfrm>
+          <a:prstGeom prst="roundRect">
+            <a:avLst>
+              <a:gd name="adj" fmla="val 6752"/>
+            </a:avLst>
+          </a:prstGeom>
+          <a:solidFill>
+            <a:schemeClr val="accent1">
+              <a:lumMod val="20000"/>
+              <a:lumOff val="80000"/>
+            </a:schemeClr>
+          </a:solidFill>
+        </p:spPr>
+        <p:style>
+          <a:lnRef idx="1">
+            <a:schemeClr val="accent3"/>
+          </a:lnRef>
+          <a:fillRef idx="2">
+            <a:schemeClr val="accent3"/>
+          </a:fillRef>
+          <a:effectRef idx="1">
+            <a:schemeClr val="accent3"/>
+          </a:effectRef>
+          <a:fontRef idx="minor">
+            <a:schemeClr val="dk1"/>
+          </a:fontRef>
+        </p:style>
+        <p:txBody>
+          <a:bodyPr rtlCol="0" anchor="b"/>
+          <a:lstStyle/>
+          <a:p>
+            <a:pPr algn="ctr"/>
+            <a:r>
+              <a:rPr lang="en-US" sz="1600" dirty="0" err="1">
+                <a:solidFill>
+                  <a:schemeClr val="tx2"/>
+                </a:solidFill>
+                <a:latin typeface="Segoe UI Semibold" panose="020B0702040204020203" pitchFamily="34" charset="0"/>
+                <a:cs typeface="Segoe UI Semibold" panose="020B0702040204020203" pitchFamily="34" charset="0"/>
+              </a:rPr>
+              <a:t>app.bicep</a:t>
+            </a:r>
+            <a:endParaRPr lang="en-BE" sz="1600" dirty="0">
+              <a:solidFill>
+                <a:schemeClr val="tx2"/>
+              </a:solidFill>
+              <a:latin typeface="Segoe UI Semibold" panose="020B0702040204020203" pitchFamily="34" charset="0"/>
+              <a:cs typeface="Segoe UI Semibold" panose="020B0702040204020203" pitchFamily="34" charset="0"/>
+            </a:endParaRPr>
+          </a:p>
+        </p:txBody>
+      </p:sp>
+      <p:sp>
+        <p:nvSpPr>
+          <p:cNvPr id="2" name="Rectangle: Rounded Corners 1">
+            <a:extLst>
+              <a:ext uri="{FF2B5EF4-FFF2-40B4-BE49-F238E27FC236}">
+                <a16:creationId xmlns:a16="http://schemas.microsoft.com/office/drawing/2014/main" id="{8A41896E-9E26-A5A1-51FC-E0F09FED0A71}"/>
+              </a:ext>
+            </a:extLst>
+          </p:cNvPr>
+          <p:cNvSpPr/>
+          <p:nvPr/>
+        </p:nvSpPr>
+        <p:spPr>
+          <a:xfrm>
+            <a:off x="348916" y="312821"/>
+            <a:ext cx="2737184" cy="4884821"/>
+          </a:xfrm>
+          <a:prstGeom prst="roundRect">
+            <a:avLst/>
+          </a:prstGeom>
+          <a:solidFill>
+            <a:schemeClr val="accent1">
+              <a:lumMod val="20000"/>
+              <a:lumOff val="80000"/>
+            </a:schemeClr>
+          </a:solidFill>
+        </p:spPr>
+        <p:style>
+          <a:lnRef idx="1">
+            <a:schemeClr val="accent3"/>
+          </a:lnRef>
+          <a:fillRef idx="2">
+            <a:schemeClr val="accent3"/>
+          </a:fillRef>
+          <a:effectRef idx="1">
+            <a:schemeClr val="accent3"/>
+          </a:effectRef>
+          <a:fontRef idx="minor">
+            <a:schemeClr val="dk1"/>
+          </a:fontRef>
+        </p:style>
+        <p:txBody>
+          <a:bodyPr rtlCol="0" anchor="b"/>
+          <a:lstStyle/>
+          <a:p>
+            <a:pPr algn="ctr"/>
+            <a:r>
+              <a:rPr lang="en-US" sz="1600" dirty="0" err="1">
+                <a:solidFill>
+                  <a:schemeClr val="tx2"/>
+                </a:solidFill>
+                <a:latin typeface="Segoe UI Semibold" panose="020B0702040204020203" pitchFamily="34" charset="0"/>
+                <a:cs typeface="Segoe UI Semibold" panose="020B0702040204020203" pitchFamily="34" charset="0"/>
+              </a:rPr>
+              <a:t>api-gateway.bicep</a:t>
+            </a:r>
+            <a:endParaRPr lang="en-BE" sz="1600" dirty="0">
+              <a:solidFill>
+                <a:schemeClr val="tx2"/>
+              </a:solidFill>
+              <a:latin typeface="Segoe UI Semibold" panose="020B0702040204020203" pitchFamily="34" charset="0"/>
+              <a:cs typeface="Segoe UI Semibold" panose="020B0702040204020203" pitchFamily="34" charset="0"/>
+            </a:endParaRPr>
+          </a:p>
+        </p:txBody>
+      </p:sp>
+      <p:graphicFrame>
+        <p:nvGraphicFramePr>
+          <p:cNvPr id="4" name="Content Placeholder 3">
+            <a:extLst>
+              <a:ext uri="{FF2B5EF4-FFF2-40B4-BE49-F238E27FC236}">
+                <a16:creationId xmlns:a16="http://schemas.microsoft.com/office/drawing/2014/main" id="{1AB475FC-3A25-0767-E526-8FDD8230C7E0}"/>
+              </a:ext>
+            </a:extLst>
+          </p:cNvPr>
+          <p:cNvGraphicFramePr>
+            <a:graphicFrameLocks noGrp="1"/>
+          </p:cNvGraphicFramePr>
+          <p:nvPr>
+            <p:ph idx="1"/>
+            <p:extLst>
+              <p:ext uri="{D42A27DB-BD31-4B8C-83A1-F6EECF244321}">
+                <p14:modId xmlns:p14="http://schemas.microsoft.com/office/powerpoint/2010/main" val="1702140766"/>
+              </p:ext>
+            </p:extLst>
+          </p:nvPr>
+        </p:nvGraphicFramePr>
+        <p:xfrm>
+          <a:off x="296778" y="766847"/>
+          <a:ext cx="11650580" cy="3552490"/>
+        </p:xfrm>
+        <a:graphic>
+          <a:graphicData uri="http://schemas.openxmlformats.org/drawingml/2006/diagram">
+            <dgm:relIds xmlns:dgm="http://schemas.openxmlformats.org/drawingml/2006/diagram" xmlns:r="http://schemas.openxmlformats.org/officeDocument/2006/relationships" r:dm="rId2" r:lo="rId3" r:qs="rId4" r:cs="rId5"/>
+          </a:graphicData>
+        </a:graphic>
+      </p:graphicFrame>
+    </p:spTree>
+    <p:extLst>
+      <p:ext uri="{BB962C8B-B14F-4D97-AF65-F5344CB8AC3E}">
+        <p14:creationId xmlns:p14="http://schemas.microsoft.com/office/powerpoint/2010/main" val="645238234"/>
+      </p:ext>
+    </p:extLst>
+  </p:cSld>
+  <p:clrMapOvr>
+    <a:masterClrMapping/>
+  </p:clrMapOvr>
+</p:sld>
+</file>
+
 <file path=ppt/theme/theme1.xml><?xml version="1.0" encoding="utf-8"?>
 <a:theme xmlns:a="http://schemas.openxmlformats.org/drawingml/2006/main" name="Office Theme">
   <a:themeElements>

</xml_diff>